<commit_message>
small adaptions to Stakeholder
</commit_message>
<xml_diff>
--- a/Stakeholder.pptx
+++ b/Stakeholder.pptx
@@ -104,6 +104,11 @@
       </a:defRPr>
     </a:lvl9pPr>
   </p:defaultTextStyle>
+  <p:extLst>
+    <p:ext uri="{EFAFB233-063F-42B5-8137-9DF3F51BA10A}">
+      <p15:sldGuideLst xmlns:p15="http://schemas.microsoft.com/office/powerpoint/2012/main"/>
+    </p:ext>
+  </p:extLst>
 </p:presentation>
 </file>
 
@@ -978,27 +983,42 @@
       </dgm:t>
     </dgm:pt>
     <dgm:pt modelId="{41E46601-254B-4CEC-8145-2773E7DAAEA2}">
-      <dgm:prSet phldrT="[Text]"/>
+      <dgm:prSet phldrT="[Text]" custT="1"/>
       <dgm:spPr/>
       <dgm:t>
         <a:bodyPr/>
         <a:lstStyle/>
         <a:p>
           <a:r>
-            <a:rPr lang="de-CH" dirty="0" smtClean="0"/>
+            <a:rPr lang="de-CH" sz="1200" dirty="0" smtClean="0"/>
             <a:t>Tankwart</a:t>
           </a:r>
         </a:p>
       </dgm:t>
     </dgm:pt>
     <dgm:pt modelId="{7E3F5D3F-CDF5-4467-88CC-6E6BD5FBA1C3}" type="parTrans" cxnId="{9015533B-A1D3-4CEC-85CA-267A2569AFD8}">
-      <dgm:prSet/>
+      <dgm:prSet>
+        <dgm:style>
+          <a:lnRef idx="3">
+            <a:schemeClr val="dk1"/>
+          </a:lnRef>
+          <a:fillRef idx="0">
+            <a:schemeClr val="dk1"/>
+          </a:fillRef>
+          <a:effectRef idx="2">
+            <a:schemeClr val="dk1"/>
+          </a:effectRef>
+          <a:fontRef idx="minor">
+            <a:schemeClr val="tx1"/>
+          </a:fontRef>
+        </dgm:style>
+      </dgm:prSet>
       <dgm:spPr/>
       <dgm:t>
         <a:bodyPr/>
         <a:lstStyle/>
         <a:p>
-          <a:endParaRPr lang="de-CH"/>
+          <a:endParaRPr lang="de-CH" dirty="0"/>
         </a:p>
       </dgm:t>
     </dgm:pt>
@@ -1149,80 +1169,6 @@
       </dgm:t>
     </dgm:pt>
     <dgm:pt modelId="{F7E6CC8E-A23B-442F-959C-627B61D2DCB4}" type="sibTrans" cxnId="{76B0831D-6054-4B8A-97D6-8DD159C66415}">
-      <dgm:prSet/>
-      <dgm:spPr/>
-      <dgm:t>
-        <a:bodyPr/>
-        <a:lstStyle/>
-        <a:p>
-          <a:endParaRPr lang="de-CH"/>
-        </a:p>
-      </dgm:t>
-    </dgm:pt>
-    <dgm:pt modelId="{E828015B-A268-482C-A45B-6A13D797C68B}">
-      <dgm:prSet phldrT="[Text]"/>
-      <dgm:spPr/>
-      <dgm:t>
-        <a:bodyPr/>
-        <a:lstStyle/>
-        <a:p>
-          <a:r>
-            <a:rPr lang="de-CH" dirty="0" smtClean="0"/>
-            <a:t>Tanksäulen-Techniker</a:t>
-          </a:r>
-          <a:endParaRPr lang="de-CH" dirty="0"/>
-        </a:p>
-      </dgm:t>
-    </dgm:pt>
-    <dgm:pt modelId="{0ADAD415-B552-494A-A483-92BB7A875ACC}" type="parTrans" cxnId="{1C46A95B-0DD5-4D78-A19A-6C1867FC3301}">
-      <dgm:prSet/>
-      <dgm:spPr/>
-      <dgm:t>
-        <a:bodyPr/>
-        <a:lstStyle/>
-        <a:p>
-          <a:endParaRPr lang="de-CH"/>
-        </a:p>
-      </dgm:t>
-    </dgm:pt>
-    <dgm:pt modelId="{98DD6C08-BEE1-4C35-818C-ED973D919C35}" type="sibTrans" cxnId="{1C46A95B-0DD5-4D78-A19A-6C1867FC3301}">
-      <dgm:prSet/>
-      <dgm:spPr/>
-      <dgm:t>
-        <a:bodyPr/>
-        <a:lstStyle/>
-        <a:p>
-          <a:endParaRPr lang="de-CH"/>
-        </a:p>
-      </dgm:t>
-    </dgm:pt>
-    <dgm:pt modelId="{D4B463BC-BB6B-4EF8-8542-7934A21AD527}">
-      <dgm:prSet phldrT="[Text]"/>
-      <dgm:spPr/>
-      <dgm:t>
-        <a:bodyPr/>
-        <a:lstStyle/>
-        <a:p>
-          <a:r>
-            <a:rPr lang="de-CH" dirty="0" smtClean="0"/>
-            <a:t>Informatiker</a:t>
-          </a:r>
-          <a:endParaRPr lang="de-CH" dirty="0"/>
-        </a:p>
-      </dgm:t>
-    </dgm:pt>
-    <dgm:pt modelId="{BBCF1E81-3C1F-4C1E-AF2A-DCB1ADFF3513}" type="parTrans" cxnId="{BAF44AA9-06BE-454B-84EF-54898FA3CC13}">
-      <dgm:prSet/>
-      <dgm:spPr/>
-      <dgm:t>
-        <a:bodyPr/>
-        <a:lstStyle/>
-        <a:p>
-          <a:endParaRPr lang="de-CH"/>
-        </a:p>
-      </dgm:t>
-    </dgm:pt>
-    <dgm:pt modelId="{256C4E22-903F-4683-9A0A-AD2641D53B76}" type="sibTrans" cxnId="{BAF44AA9-06BE-454B-84EF-54898FA3CC13}">
       <dgm:prSet/>
       <dgm:spPr/>
       <dgm:t>
@@ -1351,21 +1297,49 @@
         </dgm:presLayoutVars>
       </dgm:prSet>
       <dgm:spPr/>
+      <dgm:t>
+        <a:bodyPr/>
+        <a:lstStyle/>
+        <a:p>
+          <a:endParaRPr lang="de-CH"/>
+        </a:p>
+      </dgm:t>
     </dgm:pt>
     <dgm:pt modelId="{253E9043-395F-49ED-89BB-FFE97D2B7BEB}" type="pres">
       <dgm:prSet presAssocID="{ABA2A8E6-5BE2-4B1C-9B2B-C14EC82D48AE}" presName="centerShape" presStyleLbl="node0" presStyleIdx="0" presStyleCnt="1"/>
       <dgm:spPr/>
+      <dgm:t>
+        <a:bodyPr/>
+        <a:lstStyle/>
+        <a:p>
+          <a:endParaRPr lang="de-CH"/>
+        </a:p>
+      </dgm:t>
     </dgm:pt>
     <dgm:pt modelId="{67978505-1397-43C4-BA6B-6D9B5831A906}" type="pres">
-      <dgm:prSet presAssocID="{2A54B4C6-FCEC-4C17-BD8B-4650DB192800}" presName="Name9" presStyleLbl="parChTrans1D2" presStyleIdx="0" presStyleCnt="12"/>
+      <dgm:prSet presAssocID="{2A54B4C6-FCEC-4C17-BD8B-4650DB192800}" presName="Name9" presStyleLbl="parChTrans1D2" presStyleIdx="0" presStyleCnt="10"/>
       <dgm:spPr/>
+      <dgm:t>
+        <a:bodyPr/>
+        <a:lstStyle/>
+        <a:p>
+          <a:endParaRPr lang="de-CH"/>
+        </a:p>
+      </dgm:t>
     </dgm:pt>
     <dgm:pt modelId="{4E87FB4D-DB98-4FF0-91F7-3C56C4CFBD72}" type="pres">
-      <dgm:prSet presAssocID="{2A54B4C6-FCEC-4C17-BD8B-4650DB192800}" presName="connTx" presStyleLbl="parChTrans1D2" presStyleIdx="0" presStyleCnt="12"/>
+      <dgm:prSet presAssocID="{2A54B4C6-FCEC-4C17-BD8B-4650DB192800}" presName="connTx" presStyleLbl="parChTrans1D2" presStyleIdx="0" presStyleCnt="10"/>
       <dgm:spPr/>
+      <dgm:t>
+        <a:bodyPr/>
+        <a:lstStyle/>
+        <a:p>
+          <a:endParaRPr lang="de-CH"/>
+        </a:p>
+      </dgm:t>
     </dgm:pt>
     <dgm:pt modelId="{C87C41C2-E937-4321-B9AA-8AD92C412F49}" type="pres">
-      <dgm:prSet presAssocID="{FD965C98-CDC0-4CEF-B2F6-E24016E9D1BD}" presName="node" presStyleLbl="node1" presStyleIdx="0" presStyleCnt="12" custRadScaleRad="89735" custRadScaleInc="0">
+      <dgm:prSet presAssocID="{FD965C98-CDC0-4CEF-B2F6-E24016E9D1BD}" presName="node" presStyleLbl="node1" presStyleIdx="0" presStyleCnt="10" custRadScaleRad="88058" custRadScaleInc="37075">
         <dgm:presLayoutVars>
           <dgm:bulletEnabled val="1"/>
         </dgm:presLayoutVars>
@@ -1380,31 +1354,29 @@
       </dgm:t>
     </dgm:pt>
     <dgm:pt modelId="{72DA0D22-B4E7-4F48-9038-F63D24794E35}" type="pres">
-      <dgm:prSet presAssocID="{61EA2591-08CA-486F-8779-D291A3AB13ED}" presName="Name9" presStyleLbl="parChTrans1D2" presStyleIdx="1" presStyleCnt="12"/>
+      <dgm:prSet presAssocID="{61EA2591-08CA-486F-8779-D291A3AB13ED}" presName="Name9" presStyleLbl="parChTrans1D2" presStyleIdx="1" presStyleCnt="10"/>
       <dgm:spPr/>
+      <dgm:t>
+        <a:bodyPr/>
+        <a:lstStyle/>
+        <a:p>
+          <a:endParaRPr lang="de-CH"/>
+        </a:p>
+      </dgm:t>
     </dgm:pt>
     <dgm:pt modelId="{052CB578-7B3F-45E2-A76D-40E77AC67C7B}" type="pres">
-      <dgm:prSet presAssocID="{61EA2591-08CA-486F-8779-D291A3AB13ED}" presName="connTx" presStyleLbl="parChTrans1D2" presStyleIdx="1" presStyleCnt="12"/>
+      <dgm:prSet presAssocID="{61EA2591-08CA-486F-8779-D291A3AB13ED}" presName="connTx" presStyleLbl="parChTrans1D2" presStyleIdx="1" presStyleCnt="10"/>
       <dgm:spPr/>
+      <dgm:t>
+        <a:bodyPr/>
+        <a:lstStyle/>
+        <a:p>
+          <a:endParaRPr lang="de-CH"/>
+        </a:p>
+      </dgm:t>
     </dgm:pt>
     <dgm:pt modelId="{13328FA8-9A7E-4E77-B510-EBB989FD0427}" type="pres">
-      <dgm:prSet presAssocID="{6FB7F775-7FDB-4AC9-9E50-BF012053C1C3}" presName="node" presStyleLbl="node1" presStyleIdx="1" presStyleCnt="12">
-        <dgm:presLayoutVars>
-          <dgm:bulletEnabled val="1"/>
-        </dgm:presLayoutVars>
-      </dgm:prSet>
-      <dgm:spPr/>
-    </dgm:pt>
-    <dgm:pt modelId="{E89745EC-7C9C-4B3A-BDDE-4FED14C3FE0B}" type="pres">
-      <dgm:prSet presAssocID="{8DB5FD83-FCC0-4F58-9508-F11ECE372DD1}" presName="Name9" presStyleLbl="parChTrans1D2" presStyleIdx="2" presStyleCnt="12"/>
-      <dgm:spPr/>
-    </dgm:pt>
-    <dgm:pt modelId="{C474A470-C7E4-4751-B135-B5BDAB013C49}" type="pres">
-      <dgm:prSet presAssocID="{8DB5FD83-FCC0-4F58-9508-F11ECE372DD1}" presName="connTx" presStyleLbl="parChTrans1D2" presStyleIdx="2" presStyleCnt="12"/>
-      <dgm:spPr/>
-    </dgm:pt>
-    <dgm:pt modelId="{1E2E3932-484B-4D4E-B189-A5E9A6B9B96E}" type="pres">
-      <dgm:prSet presAssocID="{A91865F9-C54C-4CC5-B71A-7E9DF270B440}" presName="node" presStyleLbl="node1" presStyleIdx="2" presStyleCnt="12" custRadScaleRad="84366" custRadScaleInc="-33772">
+      <dgm:prSet presAssocID="{6FB7F775-7FDB-4AC9-9E50-BF012053C1C3}" presName="node" presStyleLbl="node1" presStyleIdx="1" presStyleCnt="10">
         <dgm:presLayoutVars>
           <dgm:bulletEnabled val="1"/>
         </dgm:presLayoutVars>
@@ -1418,16 +1390,30 @@
         </a:p>
       </dgm:t>
     </dgm:pt>
-    <dgm:pt modelId="{04003D1F-A720-4ED6-BF63-F06E487ED93B}" type="pres">
-      <dgm:prSet presAssocID="{7779DAFC-2072-4A74-8EF6-4C449FD50C76}" presName="Name9" presStyleLbl="parChTrans1D2" presStyleIdx="3" presStyleCnt="12"/>
+    <dgm:pt modelId="{E89745EC-7C9C-4B3A-BDDE-4FED14C3FE0B}" type="pres">
+      <dgm:prSet presAssocID="{8DB5FD83-FCC0-4F58-9508-F11ECE372DD1}" presName="Name9" presStyleLbl="parChTrans1D2" presStyleIdx="2" presStyleCnt="10"/>
       <dgm:spPr/>
+      <dgm:t>
+        <a:bodyPr/>
+        <a:lstStyle/>
+        <a:p>
+          <a:endParaRPr lang="de-CH"/>
+        </a:p>
+      </dgm:t>
     </dgm:pt>
-    <dgm:pt modelId="{080BA183-3039-4E40-8F35-D83CC092C28D}" type="pres">
-      <dgm:prSet presAssocID="{7779DAFC-2072-4A74-8EF6-4C449FD50C76}" presName="connTx" presStyleLbl="parChTrans1D2" presStyleIdx="3" presStyleCnt="12"/>
+    <dgm:pt modelId="{C474A470-C7E4-4751-B135-B5BDAB013C49}" type="pres">
+      <dgm:prSet presAssocID="{8DB5FD83-FCC0-4F58-9508-F11ECE372DD1}" presName="connTx" presStyleLbl="parChTrans1D2" presStyleIdx="2" presStyleCnt="10"/>
       <dgm:spPr/>
+      <dgm:t>
+        <a:bodyPr/>
+        <a:lstStyle/>
+        <a:p>
+          <a:endParaRPr lang="de-CH"/>
+        </a:p>
+      </dgm:t>
     </dgm:pt>
-    <dgm:pt modelId="{396D1756-1806-4E60-8EFB-AE6607BF146E}" type="pres">
-      <dgm:prSet presAssocID="{DCFE77C9-DC67-4002-BB6C-943C073AEFFD}" presName="node" presStyleLbl="node1" presStyleIdx="3" presStyleCnt="12" custRadScaleRad="75954" custRadScaleInc="-36752">
+    <dgm:pt modelId="{1E2E3932-484B-4D4E-B189-A5E9A6B9B96E}" type="pres">
+      <dgm:prSet presAssocID="{A91865F9-C54C-4CC5-B71A-7E9DF270B440}" presName="node" presStyleLbl="node1" presStyleIdx="2" presStyleCnt="10" custRadScaleRad="84366" custRadScaleInc="-33772">
         <dgm:presLayoutVars>
           <dgm:bulletEnabled val="1"/>
         </dgm:presLayoutVars>
@@ -1441,32 +1427,30 @@
         </a:p>
       </dgm:t>
     </dgm:pt>
-    <dgm:pt modelId="{FF73F48E-DBE3-491E-BBD8-817DF2781EF5}" type="pres">
-      <dgm:prSet presAssocID="{859EE249-9892-42B0-8673-06FADE8F37B5}" presName="Name9" presStyleLbl="parChTrans1D2" presStyleIdx="4" presStyleCnt="12"/>
+    <dgm:pt modelId="{04003D1F-A720-4ED6-BF63-F06E487ED93B}" type="pres">
+      <dgm:prSet presAssocID="{7779DAFC-2072-4A74-8EF6-4C449FD50C76}" presName="Name9" presStyleLbl="parChTrans1D2" presStyleIdx="3" presStyleCnt="10"/>
       <dgm:spPr/>
+      <dgm:t>
+        <a:bodyPr/>
+        <a:lstStyle/>
+        <a:p>
+          <a:endParaRPr lang="de-CH"/>
+        </a:p>
+      </dgm:t>
     </dgm:pt>
-    <dgm:pt modelId="{520B4BAF-AAEF-4C1A-9CAF-13D8D7F842E3}" type="pres">
-      <dgm:prSet presAssocID="{859EE249-9892-42B0-8673-06FADE8F37B5}" presName="connTx" presStyleLbl="parChTrans1D2" presStyleIdx="4" presStyleCnt="12"/>
+    <dgm:pt modelId="{080BA183-3039-4E40-8F35-D83CC092C28D}" type="pres">
+      <dgm:prSet presAssocID="{7779DAFC-2072-4A74-8EF6-4C449FD50C76}" presName="connTx" presStyleLbl="parChTrans1D2" presStyleIdx="3" presStyleCnt="10"/>
       <dgm:spPr/>
+      <dgm:t>
+        <a:bodyPr/>
+        <a:lstStyle/>
+        <a:p>
+          <a:endParaRPr lang="de-CH"/>
+        </a:p>
+      </dgm:t>
     </dgm:pt>
-    <dgm:pt modelId="{E9003DBF-681F-46D8-AC9A-B2AD218C89BD}" type="pres">
-      <dgm:prSet presAssocID="{C7EFF620-3989-402C-BF0C-C72EBCCAC402}" presName="node" presStyleLbl="node1" presStyleIdx="4" presStyleCnt="12" custRadScaleRad="87021" custRadScaleInc="-29771">
-        <dgm:presLayoutVars>
-          <dgm:bulletEnabled val="1"/>
-        </dgm:presLayoutVars>
-      </dgm:prSet>
-      <dgm:spPr/>
-    </dgm:pt>
-    <dgm:pt modelId="{E279DBEE-53F1-4E6F-9D42-67AC6649107E}" type="pres">
-      <dgm:prSet presAssocID="{7E3F5D3F-CDF5-4467-88CC-6E6BD5FBA1C3}" presName="Name9" presStyleLbl="parChTrans1D2" presStyleIdx="5" presStyleCnt="12"/>
-      <dgm:spPr/>
-    </dgm:pt>
-    <dgm:pt modelId="{2108D07E-3BA8-4958-9BE3-FDD1A801E9F9}" type="pres">
-      <dgm:prSet presAssocID="{7E3F5D3F-CDF5-4467-88CC-6E6BD5FBA1C3}" presName="connTx" presStyleLbl="parChTrans1D2" presStyleIdx="5" presStyleCnt="12"/>
-      <dgm:spPr/>
-    </dgm:pt>
-    <dgm:pt modelId="{2820D07E-EB23-4218-A66B-9A30725ADF7A}" type="pres">
-      <dgm:prSet presAssocID="{41E46601-254B-4CEC-8145-2773E7DAAEA2}" presName="node" presStyleLbl="node1" presStyleIdx="5" presStyleCnt="12" custRadScaleRad="57588" custRadScaleInc="-12690">
+    <dgm:pt modelId="{396D1756-1806-4E60-8EFB-AE6607BF146E}" type="pres">
+      <dgm:prSet presAssocID="{DCFE77C9-DC67-4002-BB6C-943C073AEFFD}" presName="node" presStyleLbl="node1" presStyleIdx="3" presStyleCnt="10" custRadScaleRad="75954" custRadScaleInc="-36752">
         <dgm:presLayoutVars>
           <dgm:bulletEnabled val="1"/>
         </dgm:presLayoutVars>
@@ -1480,16 +1464,30 @@
         </a:p>
       </dgm:t>
     </dgm:pt>
-    <dgm:pt modelId="{F5938934-26F6-4438-84F0-E37598DE5627}" type="pres">
-      <dgm:prSet presAssocID="{5FD42421-315B-436E-B6F0-AF709CD4118D}" presName="Name9" presStyleLbl="parChTrans1D2" presStyleIdx="6" presStyleCnt="12"/>
+    <dgm:pt modelId="{FF73F48E-DBE3-491E-BBD8-817DF2781EF5}" type="pres">
+      <dgm:prSet presAssocID="{859EE249-9892-42B0-8673-06FADE8F37B5}" presName="Name9" presStyleLbl="parChTrans1D2" presStyleIdx="4" presStyleCnt="10"/>
       <dgm:spPr/>
+      <dgm:t>
+        <a:bodyPr/>
+        <a:lstStyle/>
+        <a:p>
+          <a:endParaRPr lang="de-CH"/>
+        </a:p>
+      </dgm:t>
     </dgm:pt>
-    <dgm:pt modelId="{750ABD90-0500-4686-8B8F-A73BEE1B2BB2}" type="pres">
-      <dgm:prSet presAssocID="{5FD42421-315B-436E-B6F0-AF709CD4118D}" presName="connTx" presStyleLbl="parChTrans1D2" presStyleIdx="6" presStyleCnt="12"/>
+    <dgm:pt modelId="{520B4BAF-AAEF-4C1A-9CAF-13D8D7F842E3}" type="pres">
+      <dgm:prSet presAssocID="{859EE249-9892-42B0-8673-06FADE8F37B5}" presName="connTx" presStyleLbl="parChTrans1D2" presStyleIdx="4" presStyleCnt="10"/>
       <dgm:spPr/>
+      <dgm:t>
+        <a:bodyPr/>
+        <a:lstStyle/>
+        <a:p>
+          <a:endParaRPr lang="de-CH"/>
+        </a:p>
+      </dgm:t>
     </dgm:pt>
-    <dgm:pt modelId="{1643F6E8-A7EB-49BE-AB1F-0F6201B0979C}" type="pres">
-      <dgm:prSet presAssocID="{C6048AE7-17C9-4954-86AF-EE225F62B516}" presName="node" presStyleLbl="node1" presStyleIdx="6" presStyleCnt="12" custRadScaleRad="75975" custRadScaleInc="27045">
+    <dgm:pt modelId="{E9003DBF-681F-46D8-AC9A-B2AD218C89BD}" type="pres">
+      <dgm:prSet presAssocID="{C7EFF620-3989-402C-BF0C-C72EBCCAC402}" presName="node" presStyleLbl="node1" presStyleIdx="4" presStyleCnt="10" custRadScaleRad="87021" custRadScaleInc="-29771">
         <dgm:presLayoutVars>
           <dgm:bulletEnabled val="1"/>
         </dgm:presLayoutVars>
@@ -1503,16 +1501,30 @@
         </a:p>
       </dgm:t>
     </dgm:pt>
-    <dgm:pt modelId="{57A0A247-32B4-470E-A002-3ACC323FF423}" type="pres">
-      <dgm:prSet presAssocID="{C23B5222-784D-4F37-9766-B728A9144611}" presName="Name9" presStyleLbl="parChTrans1D2" presStyleIdx="7" presStyleCnt="12"/>
+    <dgm:pt modelId="{E279DBEE-53F1-4E6F-9D42-67AC6649107E}" type="pres">
+      <dgm:prSet presAssocID="{7E3F5D3F-CDF5-4467-88CC-6E6BD5FBA1C3}" presName="Name9" presStyleLbl="parChTrans1D2" presStyleIdx="5" presStyleCnt="10" custScaleY="2000000"/>
       <dgm:spPr/>
+      <dgm:t>
+        <a:bodyPr/>
+        <a:lstStyle/>
+        <a:p>
+          <a:endParaRPr lang="de-CH"/>
+        </a:p>
+      </dgm:t>
     </dgm:pt>
-    <dgm:pt modelId="{752F705B-E2DC-4AAE-8455-7EA77A18509C}" type="pres">
-      <dgm:prSet presAssocID="{C23B5222-784D-4F37-9766-B728A9144611}" presName="connTx" presStyleLbl="parChTrans1D2" presStyleIdx="7" presStyleCnt="12"/>
+    <dgm:pt modelId="{2108D07E-3BA8-4958-9BE3-FDD1A801E9F9}" type="pres">
+      <dgm:prSet presAssocID="{7E3F5D3F-CDF5-4467-88CC-6E6BD5FBA1C3}" presName="connTx" presStyleLbl="parChTrans1D2" presStyleIdx="5" presStyleCnt="10"/>
       <dgm:spPr/>
+      <dgm:t>
+        <a:bodyPr/>
+        <a:lstStyle/>
+        <a:p>
+          <a:endParaRPr lang="de-CH"/>
+        </a:p>
+      </dgm:t>
     </dgm:pt>
-    <dgm:pt modelId="{36731F56-C670-4217-8319-F8EDAC9AED3D}" type="pres">
-      <dgm:prSet presAssocID="{D229CB6F-46C1-4CC5-82DE-DF9A645642DF}" presName="node" presStyleLbl="node1" presStyleIdx="7" presStyleCnt="12" custRadScaleRad="77710" custRadScaleInc="33450">
+    <dgm:pt modelId="{2820D07E-EB23-4218-A66B-9A30725ADF7A}" type="pres">
+      <dgm:prSet presAssocID="{41E46601-254B-4CEC-8145-2773E7DAAEA2}" presName="node" presStyleLbl="node1" presStyleIdx="5" presStyleCnt="10" custRadScaleRad="56939" custRadScaleInc="-23446">
         <dgm:presLayoutVars>
           <dgm:bulletEnabled val="1"/>
         </dgm:presLayoutVars>
@@ -1526,32 +1538,30 @@
         </a:p>
       </dgm:t>
     </dgm:pt>
-    <dgm:pt modelId="{C8D35826-983C-498B-BB81-C2E055925FDE}" type="pres">
-      <dgm:prSet presAssocID="{0ADAD415-B552-494A-A483-92BB7A875ACC}" presName="Name9" presStyleLbl="parChTrans1D2" presStyleIdx="8" presStyleCnt="12"/>
+    <dgm:pt modelId="{F5938934-26F6-4438-84F0-E37598DE5627}" type="pres">
+      <dgm:prSet presAssocID="{5FD42421-315B-436E-B6F0-AF709CD4118D}" presName="Name9" presStyleLbl="parChTrans1D2" presStyleIdx="6" presStyleCnt="10"/>
       <dgm:spPr/>
+      <dgm:t>
+        <a:bodyPr/>
+        <a:lstStyle/>
+        <a:p>
+          <a:endParaRPr lang="de-CH"/>
+        </a:p>
+      </dgm:t>
     </dgm:pt>
-    <dgm:pt modelId="{42311485-06EB-407E-B135-BDDFF37209F5}" type="pres">
-      <dgm:prSet presAssocID="{0ADAD415-B552-494A-A483-92BB7A875ACC}" presName="connTx" presStyleLbl="parChTrans1D2" presStyleIdx="8" presStyleCnt="12"/>
+    <dgm:pt modelId="{750ABD90-0500-4686-8B8F-A73BEE1B2BB2}" type="pres">
+      <dgm:prSet presAssocID="{5FD42421-315B-436E-B6F0-AF709CD4118D}" presName="connTx" presStyleLbl="parChTrans1D2" presStyleIdx="6" presStyleCnt="10"/>
       <dgm:spPr/>
+      <dgm:t>
+        <a:bodyPr/>
+        <a:lstStyle/>
+        <a:p>
+          <a:endParaRPr lang="de-CH"/>
+        </a:p>
+      </dgm:t>
     </dgm:pt>
-    <dgm:pt modelId="{1D085E6A-9CDB-4D36-A26A-CD5B931E1170}" type="pres">
-      <dgm:prSet presAssocID="{E828015B-A268-482C-A45B-6A13D797C68B}" presName="node" presStyleLbl="node1" presStyleIdx="8" presStyleCnt="12" custRadScaleRad="99988" custRadScaleInc="18237">
-        <dgm:presLayoutVars>
-          <dgm:bulletEnabled val="1"/>
-        </dgm:presLayoutVars>
-      </dgm:prSet>
-      <dgm:spPr/>
-    </dgm:pt>
-    <dgm:pt modelId="{255640C7-42AD-41CB-B390-BC7231523B34}" type="pres">
-      <dgm:prSet presAssocID="{BBCF1E81-3C1F-4C1E-AF2A-DCB1ADFF3513}" presName="Name9" presStyleLbl="parChTrans1D2" presStyleIdx="9" presStyleCnt="12"/>
-      <dgm:spPr/>
-    </dgm:pt>
-    <dgm:pt modelId="{109ABE61-5304-4C0B-B332-B0126AB4AD1B}" type="pres">
-      <dgm:prSet presAssocID="{BBCF1E81-3C1F-4C1E-AF2A-DCB1ADFF3513}" presName="connTx" presStyleLbl="parChTrans1D2" presStyleIdx="9" presStyleCnt="12"/>
-      <dgm:spPr/>
-    </dgm:pt>
-    <dgm:pt modelId="{2E26A752-646F-4235-8D28-9523DCB6CDC8}" type="pres">
-      <dgm:prSet presAssocID="{D4B463BC-BB6B-4EF8-8542-7934A21AD527}" presName="node" presStyleLbl="node1" presStyleIdx="9" presStyleCnt="12" custRadScaleRad="86272" custRadScaleInc="-17092">
+    <dgm:pt modelId="{1643F6E8-A7EB-49BE-AB1F-0F6201B0979C}" type="pres">
+      <dgm:prSet presAssocID="{C6048AE7-17C9-4954-86AF-EE225F62B516}" presName="node" presStyleLbl="node1" presStyleIdx="6" presStyleCnt="10" custRadScaleRad="71600" custRadScaleInc="17266">
         <dgm:presLayoutVars>
           <dgm:bulletEnabled val="1"/>
         </dgm:presLayoutVars>
@@ -1565,16 +1575,30 @@
         </a:p>
       </dgm:t>
     </dgm:pt>
-    <dgm:pt modelId="{2419DFE4-9B14-401E-A90E-EF438F2786C7}" type="pres">
-      <dgm:prSet presAssocID="{3AA1FA2B-CDA3-43C0-B025-C72022D9207B}" presName="Name9" presStyleLbl="parChTrans1D2" presStyleIdx="10" presStyleCnt="12"/>
+    <dgm:pt modelId="{57A0A247-32B4-470E-A002-3ACC323FF423}" type="pres">
+      <dgm:prSet presAssocID="{C23B5222-784D-4F37-9766-B728A9144611}" presName="Name9" presStyleLbl="parChTrans1D2" presStyleIdx="7" presStyleCnt="10"/>
       <dgm:spPr/>
+      <dgm:t>
+        <a:bodyPr/>
+        <a:lstStyle/>
+        <a:p>
+          <a:endParaRPr lang="de-CH"/>
+        </a:p>
+      </dgm:t>
     </dgm:pt>
-    <dgm:pt modelId="{F6F5CCF8-56D0-4FF5-AA9F-D0563BC6B882}" type="pres">
-      <dgm:prSet presAssocID="{3AA1FA2B-CDA3-43C0-B025-C72022D9207B}" presName="connTx" presStyleLbl="parChTrans1D2" presStyleIdx="10" presStyleCnt="12"/>
+    <dgm:pt modelId="{752F705B-E2DC-4AAE-8455-7EA77A18509C}" type="pres">
+      <dgm:prSet presAssocID="{C23B5222-784D-4F37-9766-B728A9144611}" presName="connTx" presStyleLbl="parChTrans1D2" presStyleIdx="7" presStyleCnt="10"/>
       <dgm:spPr/>
+      <dgm:t>
+        <a:bodyPr/>
+        <a:lstStyle/>
+        <a:p>
+          <a:endParaRPr lang="de-CH"/>
+        </a:p>
+      </dgm:t>
     </dgm:pt>
-    <dgm:pt modelId="{C27A88B3-4722-46D0-A005-01966C4A79EB}" type="pres">
-      <dgm:prSet presAssocID="{C2D3B850-0E26-4E2B-BB79-F2BF8777AB32}" presName="node" presStyleLbl="node1" presStyleIdx="10" presStyleCnt="12" custRadScaleRad="61558" custRadScaleInc="-30177">
+    <dgm:pt modelId="{36731F56-C670-4217-8319-F8EDAC9AED3D}" type="pres">
+      <dgm:prSet presAssocID="{D229CB6F-46C1-4CC5-82DE-DF9A645642DF}" presName="node" presStyleLbl="node1" presStyleIdx="7" presStyleCnt="10" custRadScaleRad="78863" custRadScaleInc="26602">
         <dgm:presLayoutVars>
           <dgm:bulletEnabled val="1"/>
         </dgm:presLayoutVars>
@@ -1588,75 +1612,125 @@
         </a:p>
       </dgm:t>
     </dgm:pt>
-    <dgm:pt modelId="{07D48153-ADA1-4540-9842-4665B49EFAED}" type="pres">
-      <dgm:prSet presAssocID="{11D5FD57-DAF2-4D76-878D-3C25A1C9932A}" presName="Name9" presStyleLbl="parChTrans1D2" presStyleIdx="11" presStyleCnt="12"/>
+    <dgm:pt modelId="{2419DFE4-9B14-401E-A90E-EF438F2786C7}" type="pres">
+      <dgm:prSet presAssocID="{3AA1FA2B-CDA3-43C0-B025-C72022D9207B}" presName="Name9" presStyleLbl="parChTrans1D2" presStyleIdx="8" presStyleCnt="10"/>
       <dgm:spPr/>
+      <dgm:t>
+        <a:bodyPr/>
+        <a:lstStyle/>
+        <a:p>
+          <a:endParaRPr lang="de-CH"/>
+        </a:p>
+      </dgm:t>
     </dgm:pt>
-    <dgm:pt modelId="{07C5C1DA-97A9-429B-97B7-436B21F78E4C}" type="pres">
-      <dgm:prSet presAssocID="{11D5FD57-DAF2-4D76-878D-3C25A1C9932A}" presName="connTx" presStyleLbl="parChTrans1D2" presStyleIdx="11" presStyleCnt="12"/>
+    <dgm:pt modelId="{F6F5CCF8-56D0-4FF5-AA9F-D0563BC6B882}" type="pres">
+      <dgm:prSet presAssocID="{3AA1FA2B-CDA3-43C0-B025-C72022D9207B}" presName="connTx" presStyleLbl="parChTrans1D2" presStyleIdx="8" presStyleCnt="10"/>
       <dgm:spPr/>
+      <dgm:t>
+        <a:bodyPr/>
+        <a:lstStyle/>
+        <a:p>
+          <a:endParaRPr lang="de-CH"/>
+        </a:p>
+      </dgm:t>
     </dgm:pt>
-    <dgm:pt modelId="{56AB0F57-412B-4437-8190-87BB72D5D7E1}" type="pres">
-      <dgm:prSet presAssocID="{76902F48-F9E7-4DFF-9A31-977209D36290}" presName="node" presStyleLbl="node1" presStyleIdx="11" presStyleCnt="12" custRadScaleRad="82332" custRadScaleInc="-15160">
+    <dgm:pt modelId="{C27A88B3-4722-46D0-A005-01966C4A79EB}" type="pres">
+      <dgm:prSet presAssocID="{C2D3B850-0E26-4E2B-BB79-F2BF8777AB32}" presName="node" presStyleLbl="node1" presStyleIdx="8" presStyleCnt="10" custRadScaleRad="69912" custRadScaleInc="41532">
         <dgm:presLayoutVars>
           <dgm:bulletEnabled val="1"/>
         </dgm:presLayoutVars>
       </dgm:prSet>
       <dgm:spPr/>
+      <dgm:t>
+        <a:bodyPr/>
+        <a:lstStyle/>
+        <a:p>
+          <a:endParaRPr lang="de-CH"/>
+        </a:p>
+      </dgm:t>
+    </dgm:pt>
+    <dgm:pt modelId="{07D48153-ADA1-4540-9842-4665B49EFAED}" type="pres">
+      <dgm:prSet presAssocID="{11D5FD57-DAF2-4D76-878D-3C25A1C9932A}" presName="Name9" presStyleLbl="parChTrans1D2" presStyleIdx="9" presStyleCnt="10"/>
+      <dgm:spPr/>
+      <dgm:t>
+        <a:bodyPr/>
+        <a:lstStyle/>
+        <a:p>
+          <a:endParaRPr lang="de-CH"/>
+        </a:p>
+      </dgm:t>
+    </dgm:pt>
+    <dgm:pt modelId="{07C5C1DA-97A9-429B-97B7-436B21F78E4C}" type="pres">
+      <dgm:prSet presAssocID="{11D5FD57-DAF2-4D76-878D-3C25A1C9932A}" presName="connTx" presStyleLbl="parChTrans1D2" presStyleIdx="9" presStyleCnt="10"/>
+      <dgm:spPr/>
+      <dgm:t>
+        <a:bodyPr/>
+        <a:lstStyle/>
+        <a:p>
+          <a:endParaRPr lang="de-CH"/>
+        </a:p>
+      </dgm:t>
+    </dgm:pt>
+    <dgm:pt modelId="{56AB0F57-412B-4437-8190-87BB72D5D7E1}" type="pres">
+      <dgm:prSet presAssocID="{76902F48-F9E7-4DFF-9A31-977209D36290}" presName="node" presStyleLbl="node1" presStyleIdx="9" presStyleCnt="10" custRadScaleRad="79982" custRadScaleInc="48134">
+        <dgm:presLayoutVars>
+          <dgm:bulletEnabled val="1"/>
+        </dgm:presLayoutVars>
+      </dgm:prSet>
+      <dgm:spPr/>
+      <dgm:t>
+        <a:bodyPr/>
+        <a:lstStyle/>
+        <a:p>
+          <a:endParaRPr lang="de-CH"/>
+        </a:p>
+      </dgm:t>
     </dgm:pt>
   </dgm:ptLst>
   <dgm:cxnLst>
+    <dgm:cxn modelId="{57CDE90F-BC53-4F56-A296-3182E861BE3D}" type="presOf" srcId="{FD965C98-CDC0-4CEF-B2F6-E24016E9D1BD}" destId="{C87C41C2-E937-4321-B9AA-8AD92C412F49}" srcOrd="0" destOrd="0" presId="urn:microsoft.com/office/officeart/2005/8/layout/radial1"/>
+    <dgm:cxn modelId="{0103B071-3473-4DB2-BEF0-F2904CAD30DA}" srcId="{ABA2A8E6-5BE2-4B1C-9B2B-C14EC82D48AE}" destId="{C7EFF620-3989-402C-BF0C-C72EBCCAC402}" srcOrd="4" destOrd="0" parTransId="{859EE249-9892-42B0-8673-06FADE8F37B5}" sibTransId="{9B7977B7-D6DD-4BCD-BC53-441B90570B8E}"/>
+    <dgm:cxn modelId="{8D24285F-5A4D-4B8F-912A-4170BECEF7F2}" type="presOf" srcId="{C6048AE7-17C9-4954-86AF-EE225F62B516}" destId="{1643F6E8-A7EB-49BE-AB1F-0F6201B0979C}" srcOrd="0" destOrd="0" presId="urn:microsoft.com/office/officeart/2005/8/layout/radial1"/>
+    <dgm:cxn modelId="{51D26EA7-09E8-492B-9ED6-A4A08389670F}" type="presOf" srcId="{C23B5222-784D-4F37-9766-B728A9144611}" destId="{57A0A247-32B4-470E-A002-3ACC323FF423}" srcOrd="0" destOrd="0" presId="urn:microsoft.com/office/officeart/2005/8/layout/radial1"/>
+    <dgm:cxn modelId="{CD5A1706-7936-4EEA-8B69-DB818B1032CE}" srcId="{ABA2A8E6-5BE2-4B1C-9B2B-C14EC82D48AE}" destId="{FD965C98-CDC0-4CEF-B2F6-E24016E9D1BD}" srcOrd="0" destOrd="0" parTransId="{2A54B4C6-FCEC-4C17-BD8B-4650DB192800}" sibTransId="{AF975FA8-0A36-4F55-863C-85CAED2DD1CB}"/>
+    <dgm:cxn modelId="{B06A3317-9C7B-4DD5-B05F-CD89C7C850CF}" type="presOf" srcId="{8DB5FD83-FCC0-4F58-9508-F11ECE372DD1}" destId="{C474A470-C7E4-4751-B135-B5BDAB013C49}" srcOrd="1" destOrd="0" presId="urn:microsoft.com/office/officeart/2005/8/layout/radial1"/>
+    <dgm:cxn modelId="{25DC8982-A863-4849-9C67-FBD7121DA50E}" type="presOf" srcId="{7E3F5D3F-CDF5-4467-88CC-6E6BD5FBA1C3}" destId="{E279DBEE-53F1-4E6F-9D42-67AC6649107E}" srcOrd="0" destOrd="0" presId="urn:microsoft.com/office/officeart/2005/8/layout/radial1"/>
+    <dgm:cxn modelId="{F8C176DD-0C77-4123-B83D-FFB02E148A4C}" type="presOf" srcId="{D229CB6F-46C1-4CC5-82DE-DF9A645642DF}" destId="{36731F56-C670-4217-8319-F8EDAC9AED3D}" srcOrd="0" destOrd="0" presId="urn:microsoft.com/office/officeart/2005/8/layout/radial1"/>
+    <dgm:cxn modelId="{63F963AE-B8D1-4CAE-BD92-F665DE9D76FB}" type="presOf" srcId="{B55B276A-A828-4BFC-97EE-168AA0EE6B5B}" destId="{CB46EB00-4528-4B9B-ADCE-4B63D79D0ADA}" srcOrd="0" destOrd="0" presId="urn:microsoft.com/office/officeart/2005/8/layout/radial1"/>
+    <dgm:cxn modelId="{28299D17-4C7C-49C0-9340-B608E0AAE189}" srcId="{ABA2A8E6-5BE2-4B1C-9B2B-C14EC82D48AE}" destId="{C2D3B850-0E26-4E2B-BB79-F2BF8777AB32}" srcOrd="8" destOrd="0" parTransId="{3AA1FA2B-CDA3-43C0-B025-C72022D9207B}" sibTransId="{CCEEE707-01A2-476F-B07E-8A1B2863C13B}"/>
+    <dgm:cxn modelId="{9A7879E1-2ED0-45A5-82FC-BCCE33BCCB6A}" srcId="{ABA2A8E6-5BE2-4B1C-9B2B-C14EC82D48AE}" destId="{D229CB6F-46C1-4CC5-82DE-DF9A645642DF}" srcOrd="7" destOrd="0" parTransId="{C23B5222-784D-4F37-9766-B728A9144611}" sibTransId="{2741167B-FCDF-41FF-A85A-411DC1E06026}"/>
+    <dgm:cxn modelId="{209BC9CB-5EE9-4B91-B277-11E9BD5A7506}" type="presOf" srcId="{3AA1FA2B-CDA3-43C0-B025-C72022D9207B}" destId="{2419DFE4-9B14-401E-A90E-EF438F2786C7}" srcOrd="0" destOrd="0" presId="urn:microsoft.com/office/officeart/2005/8/layout/radial1"/>
+    <dgm:cxn modelId="{05D13EF9-E661-46A4-A519-0A5B381BFC81}" type="presOf" srcId="{2A54B4C6-FCEC-4C17-BD8B-4650DB192800}" destId="{4E87FB4D-DB98-4FF0-91F7-3C56C4CFBD72}" srcOrd="1" destOrd="0" presId="urn:microsoft.com/office/officeart/2005/8/layout/radial1"/>
+    <dgm:cxn modelId="{C8A7A869-1AF3-467C-BFE4-5CB7593835D2}" type="presOf" srcId="{5FD42421-315B-436E-B6F0-AF709CD4118D}" destId="{F5938934-26F6-4438-84F0-E37598DE5627}" srcOrd="0" destOrd="0" presId="urn:microsoft.com/office/officeart/2005/8/layout/radial1"/>
+    <dgm:cxn modelId="{412A9265-E653-4CCE-B032-4CB808563824}" type="presOf" srcId="{A91865F9-C54C-4CC5-B71A-7E9DF270B440}" destId="{1E2E3932-484B-4D4E-B189-A5E9A6B9B96E}" srcOrd="0" destOrd="0" presId="urn:microsoft.com/office/officeart/2005/8/layout/radial1"/>
+    <dgm:cxn modelId="{1426B331-B2E0-48F8-A783-E9FBC1FD70B4}" type="presOf" srcId="{41E46601-254B-4CEC-8145-2773E7DAAEA2}" destId="{2820D07E-EB23-4218-A66B-9A30725ADF7A}" srcOrd="0" destOrd="0" presId="urn:microsoft.com/office/officeart/2005/8/layout/radial1"/>
+    <dgm:cxn modelId="{C84DF758-BEE4-4CAF-BA3E-8A9A6C3B0779}" type="presOf" srcId="{11D5FD57-DAF2-4D76-878D-3C25A1C9932A}" destId="{07D48153-ADA1-4540-9842-4665B49EFAED}" srcOrd="0" destOrd="0" presId="urn:microsoft.com/office/officeart/2005/8/layout/radial1"/>
+    <dgm:cxn modelId="{C636ED53-426C-4281-9ACF-C7CA25C6BBE7}" srcId="{B55B276A-A828-4BFC-97EE-168AA0EE6B5B}" destId="{ABA2A8E6-5BE2-4B1C-9B2B-C14EC82D48AE}" srcOrd="0" destOrd="0" parTransId="{731C6584-0D45-4E04-A025-35B5302C2851}" sibTransId="{5FF15FD8-8ED8-48A0-A670-21498DC29655}"/>
+    <dgm:cxn modelId="{703077FF-B3F5-4B3F-AF12-21AB2EF068B7}" type="presOf" srcId="{3AA1FA2B-CDA3-43C0-B025-C72022D9207B}" destId="{F6F5CCF8-56D0-4FF5-AA9F-D0563BC6B882}" srcOrd="1" destOrd="0" presId="urn:microsoft.com/office/officeart/2005/8/layout/radial1"/>
+    <dgm:cxn modelId="{FA3D365C-2385-47F5-BBAD-876AA58E62F3}" type="presOf" srcId="{C23B5222-784D-4F37-9766-B728A9144611}" destId="{752F705B-E2DC-4AAE-8455-7EA77A18509C}" srcOrd="1" destOrd="0" presId="urn:microsoft.com/office/officeart/2005/8/layout/radial1"/>
+    <dgm:cxn modelId="{B627F615-5DFA-4550-8E69-375D043EEB42}" type="presOf" srcId="{5FD42421-315B-436E-B6F0-AF709CD4118D}" destId="{750ABD90-0500-4686-8B8F-A73BEE1B2BB2}" srcOrd="1" destOrd="0" presId="urn:microsoft.com/office/officeart/2005/8/layout/radial1"/>
+    <dgm:cxn modelId="{9015533B-A1D3-4CEC-85CA-267A2569AFD8}" srcId="{ABA2A8E6-5BE2-4B1C-9B2B-C14EC82D48AE}" destId="{41E46601-254B-4CEC-8145-2773E7DAAEA2}" srcOrd="5" destOrd="0" parTransId="{7E3F5D3F-CDF5-4467-88CC-6E6BD5FBA1C3}" sibTransId="{F0158FF2-80EA-4C41-999A-3E792EF2A090}"/>
+    <dgm:cxn modelId="{CE0D44C7-9FFB-4919-A54C-8D916C0FBC77}" type="presOf" srcId="{859EE249-9892-42B0-8673-06FADE8F37B5}" destId="{520B4BAF-AAEF-4C1A-9CAF-13D8D7F842E3}" srcOrd="1" destOrd="0" presId="urn:microsoft.com/office/officeart/2005/8/layout/radial1"/>
+    <dgm:cxn modelId="{97A22297-F05C-478F-A489-942F482032C6}" type="presOf" srcId="{859EE249-9892-42B0-8673-06FADE8F37B5}" destId="{FF73F48E-DBE3-491E-BBD8-817DF2781EF5}" srcOrd="0" destOrd="0" presId="urn:microsoft.com/office/officeart/2005/8/layout/radial1"/>
+    <dgm:cxn modelId="{296EC995-8E07-4877-BE43-3AEA00D6F0CE}" srcId="{ABA2A8E6-5BE2-4B1C-9B2B-C14EC82D48AE}" destId="{76902F48-F9E7-4DFF-9A31-977209D36290}" srcOrd="9" destOrd="0" parTransId="{11D5FD57-DAF2-4D76-878D-3C25A1C9932A}" sibTransId="{B9CD4816-C675-49D2-AC7A-72A628D5A2C1}"/>
+    <dgm:cxn modelId="{70ED5F0A-541E-452A-AB39-94C33EF14446}" type="presOf" srcId="{7E3F5D3F-CDF5-4467-88CC-6E6BD5FBA1C3}" destId="{2108D07E-3BA8-4958-9BE3-FDD1A801E9F9}" srcOrd="1" destOrd="0" presId="urn:microsoft.com/office/officeart/2005/8/layout/radial1"/>
+    <dgm:cxn modelId="{1117ADA7-A8A7-4972-9BCC-C0B7E16DB436}" srcId="{ABA2A8E6-5BE2-4B1C-9B2B-C14EC82D48AE}" destId="{C6048AE7-17C9-4954-86AF-EE225F62B516}" srcOrd="6" destOrd="0" parTransId="{5FD42421-315B-436E-B6F0-AF709CD4118D}" sibTransId="{81B1076C-66BC-4950-94E4-EC508AF8DADC}"/>
     <dgm:cxn modelId="{5A897222-F1E5-4C2A-ABC4-89090CF31436}" srcId="{ABA2A8E6-5BE2-4B1C-9B2B-C14EC82D48AE}" destId="{A91865F9-C54C-4CC5-B71A-7E9DF270B440}" srcOrd="2" destOrd="0" parTransId="{8DB5FD83-FCC0-4F58-9508-F11ECE372DD1}" sibTransId="{6165CA4E-AFB8-4827-BBA5-473DED496CCD}"/>
+    <dgm:cxn modelId="{275C5D2B-3278-4283-85EC-1256271C6979}" type="presOf" srcId="{ABA2A8E6-5BE2-4B1C-9B2B-C14EC82D48AE}" destId="{253E9043-395F-49ED-89BB-FFE97D2B7BEB}" srcOrd="0" destOrd="0" presId="urn:microsoft.com/office/officeart/2005/8/layout/radial1"/>
+    <dgm:cxn modelId="{68642124-FCD9-42BE-8EA5-58DD71B6D7DC}" type="presOf" srcId="{2A54B4C6-FCEC-4C17-BD8B-4650DB192800}" destId="{67978505-1397-43C4-BA6B-6D9B5831A906}" srcOrd="0" destOrd="0" presId="urn:microsoft.com/office/officeart/2005/8/layout/radial1"/>
+    <dgm:cxn modelId="{8B8DEC8F-7D0F-4640-A7C1-7CD08C6961DC}" type="presOf" srcId="{76902F48-F9E7-4DFF-9A31-977209D36290}" destId="{56AB0F57-412B-4437-8190-87BB72D5D7E1}" srcOrd="0" destOrd="0" presId="urn:microsoft.com/office/officeart/2005/8/layout/radial1"/>
+    <dgm:cxn modelId="{CB562C78-48DB-49AE-87EA-073F711A450F}" type="presOf" srcId="{C7EFF620-3989-402C-BF0C-C72EBCCAC402}" destId="{E9003DBF-681F-46D8-AC9A-B2AD218C89BD}" srcOrd="0" destOrd="0" presId="urn:microsoft.com/office/officeart/2005/8/layout/radial1"/>
+    <dgm:cxn modelId="{A45E6B3D-A9B5-4B05-8CAF-21D8F1EEC693}" type="presOf" srcId="{61EA2591-08CA-486F-8779-D291A3AB13ED}" destId="{72DA0D22-B4E7-4F48-9038-F63D24794E35}" srcOrd="0" destOrd="0" presId="urn:microsoft.com/office/officeart/2005/8/layout/radial1"/>
+    <dgm:cxn modelId="{BD1F1F50-29E0-42F4-A76B-1906A677E756}" type="presOf" srcId="{8DB5FD83-FCC0-4F58-9508-F11ECE372DD1}" destId="{E89745EC-7C9C-4B3A-BDDE-4FED14C3FE0B}" srcOrd="0" destOrd="0" presId="urn:microsoft.com/office/officeart/2005/8/layout/radial1"/>
+    <dgm:cxn modelId="{43F70656-1B38-457B-87A5-E5A61CA7794E}" type="presOf" srcId="{7779DAFC-2072-4A74-8EF6-4C449FD50C76}" destId="{080BA183-3039-4E40-8F35-D83CC092C28D}" srcOrd="1" destOrd="0" presId="urn:microsoft.com/office/officeart/2005/8/layout/radial1"/>
     <dgm:cxn modelId="{76B0831D-6054-4B8A-97D6-8DD159C66415}" srcId="{ABA2A8E6-5BE2-4B1C-9B2B-C14EC82D48AE}" destId="{DCFE77C9-DC67-4002-BB6C-943C073AEFFD}" srcOrd="3" destOrd="0" parTransId="{7779DAFC-2072-4A74-8EF6-4C449FD50C76}" sibTransId="{F7E6CC8E-A23B-442F-959C-627B61D2DCB4}"/>
-    <dgm:cxn modelId="{1C46A95B-0DD5-4D78-A19A-6C1867FC3301}" srcId="{ABA2A8E6-5BE2-4B1C-9B2B-C14EC82D48AE}" destId="{E828015B-A268-482C-A45B-6A13D797C68B}" srcOrd="8" destOrd="0" parTransId="{0ADAD415-B552-494A-A483-92BB7A875ACC}" sibTransId="{98DD6C08-BEE1-4C35-818C-ED973D919C35}"/>
-    <dgm:cxn modelId="{05D13EF9-E661-46A4-A519-0A5B381BFC81}" type="presOf" srcId="{2A54B4C6-FCEC-4C17-BD8B-4650DB192800}" destId="{4E87FB4D-DB98-4FF0-91F7-3C56C4CFBD72}" srcOrd="1" destOrd="0" presId="urn:microsoft.com/office/officeart/2005/8/layout/radial1"/>
-    <dgm:cxn modelId="{8FE52CF1-AD97-4025-9EE8-7FAC3CBFCC1E}" type="presOf" srcId="{BBCF1E81-3C1F-4C1E-AF2A-DCB1ADFF3513}" destId="{109ABE61-5304-4C0B-B332-B0126AB4AD1B}" srcOrd="1" destOrd="0" presId="urn:microsoft.com/office/officeart/2005/8/layout/radial1"/>
+    <dgm:cxn modelId="{7BE8D55A-4908-4E24-84FB-69FAAF62B1E8}" type="presOf" srcId="{C2D3B850-0E26-4E2B-BB79-F2BF8777AB32}" destId="{C27A88B3-4722-46D0-A005-01966C4A79EB}" srcOrd="0" destOrd="0" presId="urn:microsoft.com/office/officeart/2005/8/layout/radial1"/>
+    <dgm:cxn modelId="{54D77CDF-38E1-4529-97B4-5D89191A3030}" srcId="{ABA2A8E6-5BE2-4B1C-9B2B-C14EC82D48AE}" destId="{6FB7F775-7FDB-4AC9-9E50-BF012053C1C3}" srcOrd="1" destOrd="0" parTransId="{61EA2591-08CA-486F-8779-D291A3AB13ED}" sibTransId="{B19A1E6E-8B1D-404C-BA2D-387B6F3CDBB5}"/>
+    <dgm:cxn modelId="{A5DEAE57-F186-485D-B546-3712295651AC}" type="presOf" srcId="{7779DAFC-2072-4A74-8EF6-4C449FD50C76}" destId="{04003D1F-A720-4ED6-BF63-F06E487ED93B}" srcOrd="0" destOrd="0" presId="urn:microsoft.com/office/officeart/2005/8/layout/radial1"/>
     <dgm:cxn modelId="{9F14D4A8-36DF-4EE2-9ECD-7AFC6879D678}" type="presOf" srcId="{6FB7F775-7FDB-4AC9-9E50-BF012053C1C3}" destId="{13328FA8-9A7E-4E77-B510-EBB989FD0427}" srcOrd="0" destOrd="0" presId="urn:microsoft.com/office/officeart/2005/8/layout/radial1"/>
-    <dgm:cxn modelId="{CD5A1706-7936-4EEA-8B69-DB818B1032CE}" srcId="{ABA2A8E6-5BE2-4B1C-9B2B-C14EC82D48AE}" destId="{FD965C98-CDC0-4CEF-B2F6-E24016E9D1BD}" srcOrd="0" destOrd="0" parTransId="{2A54B4C6-FCEC-4C17-BD8B-4650DB192800}" sibTransId="{AF975FA8-0A36-4F55-863C-85CAED2DD1CB}"/>
-    <dgm:cxn modelId="{CED43C84-77DB-4B30-9331-4C9592654E2C}" type="presOf" srcId="{D4B463BC-BB6B-4EF8-8542-7934A21AD527}" destId="{2E26A752-646F-4235-8D28-9523DCB6CDC8}" srcOrd="0" destOrd="0" presId="urn:microsoft.com/office/officeart/2005/8/layout/radial1"/>
-    <dgm:cxn modelId="{25DC8982-A863-4849-9C67-FBD7121DA50E}" type="presOf" srcId="{7E3F5D3F-CDF5-4467-88CC-6E6BD5FBA1C3}" destId="{E279DBEE-53F1-4E6F-9D42-67AC6649107E}" srcOrd="0" destOrd="0" presId="urn:microsoft.com/office/officeart/2005/8/layout/radial1"/>
-    <dgm:cxn modelId="{9015533B-A1D3-4CEC-85CA-267A2569AFD8}" srcId="{ABA2A8E6-5BE2-4B1C-9B2B-C14EC82D48AE}" destId="{41E46601-254B-4CEC-8145-2773E7DAAEA2}" srcOrd="5" destOrd="0" parTransId="{7E3F5D3F-CDF5-4467-88CC-6E6BD5FBA1C3}" sibTransId="{F0158FF2-80EA-4C41-999A-3E792EF2A090}"/>
-    <dgm:cxn modelId="{1117ADA7-A8A7-4972-9BCC-C0B7E16DB436}" srcId="{ABA2A8E6-5BE2-4B1C-9B2B-C14EC82D48AE}" destId="{C6048AE7-17C9-4954-86AF-EE225F62B516}" srcOrd="6" destOrd="0" parTransId="{5FD42421-315B-436E-B6F0-AF709CD4118D}" sibTransId="{81B1076C-66BC-4950-94E4-EC508AF8DADC}"/>
-    <dgm:cxn modelId="{68642124-FCD9-42BE-8EA5-58DD71B6D7DC}" type="presOf" srcId="{2A54B4C6-FCEC-4C17-BD8B-4650DB192800}" destId="{67978505-1397-43C4-BA6B-6D9B5831A906}" srcOrd="0" destOrd="0" presId="urn:microsoft.com/office/officeart/2005/8/layout/radial1"/>
-    <dgm:cxn modelId="{BD1F1F50-29E0-42F4-A76B-1906A677E756}" type="presOf" srcId="{8DB5FD83-FCC0-4F58-9508-F11ECE372DD1}" destId="{E89745EC-7C9C-4B3A-BDDE-4FED14C3FE0B}" srcOrd="0" destOrd="0" presId="urn:microsoft.com/office/officeart/2005/8/layout/radial1"/>
-    <dgm:cxn modelId="{0103B071-3473-4DB2-BEF0-F2904CAD30DA}" srcId="{ABA2A8E6-5BE2-4B1C-9B2B-C14EC82D48AE}" destId="{C7EFF620-3989-402C-BF0C-C72EBCCAC402}" srcOrd="4" destOrd="0" parTransId="{859EE249-9892-42B0-8673-06FADE8F37B5}" sibTransId="{9B7977B7-D6DD-4BCD-BC53-441B90570B8E}"/>
     <dgm:cxn modelId="{A7F82F88-7737-421B-867E-595C6CBF44B6}" type="presOf" srcId="{DCFE77C9-DC67-4002-BB6C-943C073AEFFD}" destId="{396D1756-1806-4E60-8EFB-AE6607BF146E}" srcOrd="0" destOrd="0" presId="urn:microsoft.com/office/officeart/2005/8/layout/radial1"/>
-    <dgm:cxn modelId="{51D26EA7-09E8-492B-9ED6-A4A08389670F}" type="presOf" srcId="{C23B5222-784D-4F37-9766-B728A9144611}" destId="{57A0A247-32B4-470E-A002-3ACC323FF423}" srcOrd="0" destOrd="0" presId="urn:microsoft.com/office/officeart/2005/8/layout/radial1"/>
-    <dgm:cxn modelId="{8D24285F-5A4D-4B8F-912A-4170BECEF7F2}" type="presOf" srcId="{C6048AE7-17C9-4954-86AF-EE225F62B516}" destId="{1643F6E8-A7EB-49BE-AB1F-0F6201B0979C}" srcOrd="0" destOrd="0" presId="urn:microsoft.com/office/officeart/2005/8/layout/radial1"/>
+    <dgm:cxn modelId="{ED3AC5D3-26D8-4ADC-9D1F-396F859FA117}" type="presOf" srcId="{11D5FD57-DAF2-4D76-878D-3C25A1C9932A}" destId="{07C5C1DA-97A9-429B-97B7-436B21F78E4C}" srcOrd="1" destOrd="0" presId="urn:microsoft.com/office/officeart/2005/8/layout/radial1"/>
     <dgm:cxn modelId="{FFE494EC-5EC9-488D-9D56-C6C6948DEE5B}" type="presOf" srcId="{61EA2591-08CA-486F-8779-D291A3AB13ED}" destId="{052CB578-7B3F-45E2-A76D-40E77AC67C7B}" srcOrd="1" destOrd="0" presId="urn:microsoft.com/office/officeart/2005/8/layout/radial1"/>
-    <dgm:cxn modelId="{7BE8D55A-4908-4E24-84FB-69FAAF62B1E8}" type="presOf" srcId="{C2D3B850-0E26-4E2B-BB79-F2BF8777AB32}" destId="{C27A88B3-4722-46D0-A005-01966C4A79EB}" srcOrd="0" destOrd="0" presId="urn:microsoft.com/office/officeart/2005/8/layout/radial1"/>
-    <dgm:cxn modelId="{45787518-FDE5-43F5-AFAD-3DFE9DBB16C8}" type="presOf" srcId="{BBCF1E81-3C1F-4C1E-AF2A-DCB1ADFF3513}" destId="{255640C7-42AD-41CB-B390-BC7231523B34}" srcOrd="0" destOrd="0" presId="urn:microsoft.com/office/officeart/2005/8/layout/radial1"/>
-    <dgm:cxn modelId="{A45E6B3D-A9B5-4B05-8CAF-21D8F1EEC693}" type="presOf" srcId="{61EA2591-08CA-486F-8779-D291A3AB13ED}" destId="{72DA0D22-B4E7-4F48-9038-F63D24794E35}" srcOrd="0" destOrd="0" presId="urn:microsoft.com/office/officeart/2005/8/layout/radial1"/>
-    <dgm:cxn modelId="{70ED5F0A-541E-452A-AB39-94C33EF14446}" type="presOf" srcId="{7E3F5D3F-CDF5-4467-88CC-6E6BD5FBA1C3}" destId="{2108D07E-3BA8-4958-9BE3-FDD1A801E9F9}" srcOrd="1" destOrd="0" presId="urn:microsoft.com/office/officeart/2005/8/layout/radial1"/>
-    <dgm:cxn modelId="{1426B331-B2E0-48F8-A783-E9FBC1FD70B4}" type="presOf" srcId="{41E46601-254B-4CEC-8145-2773E7DAAEA2}" destId="{2820D07E-EB23-4218-A66B-9A30725ADF7A}" srcOrd="0" destOrd="0" presId="urn:microsoft.com/office/officeart/2005/8/layout/radial1"/>
-    <dgm:cxn modelId="{F8C176DD-0C77-4123-B83D-FFB02E148A4C}" type="presOf" srcId="{D229CB6F-46C1-4CC5-82DE-DF9A645642DF}" destId="{36731F56-C670-4217-8319-F8EDAC9AED3D}" srcOrd="0" destOrd="0" presId="urn:microsoft.com/office/officeart/2005/8/layout/radial1"/>
-    <dgm:cxn modelId="{8B8DEC8F-7D0F-4640-A7C1-7CD08C6961DC}" type="presOf" srcId="{76902F48-F9E7-4DFF-9A31-977209D36290}" destId="{56AB0F57-412B-4437-8190-87BB72D5D7E1}" srcOrd="0" destOrd="0" presId="urn:microsoft.com/office/officeart/2005/8/layout/radial1"/>
-    <dgm:cxn modelId="{7442204E-0BFB-497A-AB24-45BE2D91AB4C}" type="presOf" srcId="{0ADAD415-B552-494A-A483-92BB7A875ACC}" destId="{42311485-06EB-407E-B135-BDDFF37209F5}" srcOrd="1" destOrd="0" presId="urn:microsoft.com/office/officeart/2005/8/layout/radial1"/>
-    <dgm:cxn modelId="{C84DF758-BEE4-4CAF-BA3E-8A9A6C3B0779}" type="presOf" srcId="{11D5FD57-DAF2-4D76-878D-3C25A1C9932A}" destId="{07D48153-ADA1-4540-9842-4665B49EFAED}" srcOrd="0" destOrd="0" presId="urn:microsoft.com/office/officeart/2005/8/layout/radial1"/>
-    <dgm:cxn modelId="{209BC9CB-5EE9-4B91-B277-11E9BD5A7506}" type="presOf" srcId="{3AA1FA2B-CDA3-43C0-B025-C72022D9207B}" destId="{2419DFE4-9B14-401E-A90E-EF438F2786C7}" srcOrd="0" destOrd="0" presId="urn:microsoft.com/office/officeart/2005/8/layout/radial1"/>
-    <dgm:cxn modelId="{B627F615-5DFA-4550-8E69-375D043EEB42}" type="presOf" srcId="{5FD42421-315B-436E-B6F0-AF709CD4118D}" destId="{750ABD90-0500-4686-8B8F-A73BEE1B2BB2}" srcOrd="1" destOrd="0" presId="urn:microsoft.com/office/officeart/2005/8/layout/radial1"/>
-    <dgm:cxn modelId="{C636ED53-426C-4281-9ACF-C7CA25C6BBE7}" srcId="{B55B276A-A828-4BFC-97EE-168AA0EE6B5B}" destId="{ABA2A8E6-5BE2-4B1C-9B2B-C14EC82D48AE}" srcOrd="0" destOrd="0" parTransId="{731C6584-0D45-4E04-A025-35B5302C2851}" sibTransId="{5FF15FD8-8ED8-48A0-A670-21498DC29655}"/>
-    <dgm:cxn modelId="{275C5D2B-3278-4283-85EC-1256271C6979}" type="presOf" srcId="{ABA2A8E6-5BE2-4B1C-9B2B-C14EC82D48AE}" destId="{253E9043-395F-49ED-89BB-FFE97D2B7BEB}" srcOrd="0" destOrd="0" presId="urn:microsoft.com/office/officeart/2005/8/layout/radial1"/>
-    <dgm:cxn modelId="{296EC995-8E07-4877-BE43-3AEA00D6F0CE}" srcId="{ABA2A8E6-5BE2-4B1C-9B2B-C14EC82D48AE}" destId="{76902F48-F9E7-4DFF-9A31-977209D36290}" srcOrd="11" destOrd="0" parTransId="{11D5FD57-DAF2-4D76-878D-3C25A1C9932A}" sibTransId="{B9CD4816-C675-49D2-AC7A-72A628D5A2C1}"/>
-    <dgm:cxn modelId="{FA3D365C-2385-47F5-BBAD-876AA58E62F3}" type="presOf" srcId="{C23B5222-784D-4F37-9766-B728A9144611}" destId="{752F705B-E2DC-4AAE-8455-7EA77A18509C}" srcOrd="1" destOrd="0" presId="urn:microsoft.com/office/officeart/2005/8/layout/radial1"/>
-    <dgm:cxn modelId="{1A84193D-81AB-4E41-A2DC-64AC30527FCD}" type="presOf" srcId="{0ADAD415-B552-494A-A483-92BB7A875ACC}" destId="{C8D35826-983C-498B-BB81-C2E055925FDE}" srcOrd="0" destOrd="0" presId="urn:microsoft.com/office/officeart/2005/8/layout/radial1"/>
-    <dgm:cxn modelId="{BAF44AA9-06BE-454B-84EF-54898FA3CC13}" srcId="{ABA2A8E6-5BE2-4B1C-9B2B-C14EC82D48AE}" destId="{D4B463BC-BB6B-4EF8-8542-7934A21AD527}" srcOrd="9" destOrd="0" parTransId="{BBCF1E81-3C1F-4C1E-AF2A-DCB1ADFF3513}" sibTransId="{256C4E22-903F-4683-9A0A-AD2641D53B76}"/>
-    <dgm:cxn modelId="{4BCD5234-008E-4242-B63B-DDBA22C4FF4C}" type="presOf" srcId="{E828015B-A268-482C-A45B-6A13D797C68B}" destId="{1D085E6A-9CDB-4D36-A26A-CD5B931E1170}" srcOrd="0" destOrd="0" presId="urn:microsoft.com/office/officeart/2005/8/layout/radial1"/>
-    <dgm:cxn modelId="{28299D17-4C7C-49C0-9340-B608E0AAE189}" srcId="{ABA2A8E6-5BE2-4B1C-9B2B-C14EC82D48AE}" destId="{C2D3B850-0E26-4E2B-BB79-F2BF8777AB32}" srcOrd="10" destOrd="0" parTransId="{3AA1FA2B-CDA3-43C0-B025-C72022D9207B}" sibTransId="{CCEEE707-01A2-476F-B07E-8A1B2863C13B}"/>
-    <dgm:cxn modelId="{C8A7A869-1AF3-467C-BFE4-5CB7593835D2}" type="presOf" srcId="{5FD42421-315B-436E-B6F0-AF709CD4118D}" destId="{F5938934-26F6-4438-84F0-E37598DE5627}" srcOrd="0" destOrd="0" presId="urn:microsoft.com/office/officeart/2005/8/layout/radial1"/>
-    <dgm:cxn modelId="{63F963AE-B8D1-4CAE-BD92-F665DE9D76FB}" type="presOf" srcId="{B55B276A-A828-4BFC-97EE-168AA0EE6B5B}" destId="{CB46EB00-4528-4B9B-ADCE-4B63D79D0ADA}" srcOrd="0" destOrd="0" presId="urn:microsoft.com/office/officeart/2005/8/layout/radial1"/>
-    <dgm:cxn modelId="{57CDE90F-BC53-4F56-A296-3182E861BE3D}" type="presOf" srcId="{FD965C98-CDC0-4CEF-B2F6-E24016E9D1BD}" destId="{C87C41C2-E937-4321-B9AA-8AD92C412F49}" srcOrd="0" destOrd="0" presId="urn:microsoft.com/office/officeart/2005/8/layout/radial1"/>
-    <dgm:cxn modelId="{97A22297-F05C-478F-A489-942F482032C6}" type="presOf" srcId="{859EE249-9892-42B0-8673-06FADE8F37B5}" destId="{FF73F48E-DBE3-491E-BBD8-817DF2781EF5}" srcOrd="0" destOrd="0" presId="urn:microsoft.com/office/officeart/2005/8/layout/radial1"/>
-    <dgm:cxn modelId="{43F70656-1B38-457B-87A5-E5A61CA7794E}" type="presOf" srcId="{7779DAFC-2072-4A74-8EF6-4C449FD50C76}" destId="{080BA183-3039-4E40-8F35-D83CC092C28D}" srcOrd="1" destOrd="0" presId="urn:microsoft.com/office/officeart/2005/8/layout/radial1"/>
-    <dgm:cxn modelId="{A5DEAE57-F186-485D-B546-3712295651AC}" type="presOf" srcId="{7779DAFC-2072-4A74-8EF6-4C449FD50C76}" destId="{04003D1F-A720-4ED6-BF63-F06E487ED93B}" srcOrd="0" destOrd="0" presId="urn:microsoft.com/office/officeart/2005/8/layout/radial1"/>
-    <dgm:cxn modelId="{9A7879E1-2ED0-45A5-82FC-BCCE33BCCB6A}" srcId="{ABA2A8E6-5BE2-4B1C-9B2B-C14EC82D48AE}" destId="{D229CB6F-46C1-4CC5-82DE-DF9A645642DF}" srcOrd="7" destOrd="0" parTransId="{C23B5222-784D-4F37-9766-B728A9144611}" sibTransId="{2741167B-FCDF-41FF-A85A-411DC1E06026}"/>
-    <dgm:cxn modelId="{412A9265-E653-4CCE-B032-4CB808563824}" type="presOf" srcId="{A91865F9-C54C-4CC5-B71A-7E9DF270B440}" destId="{1E2E3932-484B-4D4E-B189-A5E9A6B9B96E}" srcOrd="0" destOrd="0" presId="urn:microsoft.com/office/officeart/2005/8/layout/radial1"/>
-    <dgm:cxn modelId="{ED3AC5D3-26D8-4ADC-9D1F-396F859FA117}" type="presOf" srcId="{11D5FD57-DAF2-4D76-878D-3C25A1C9932A}" destId="{07C5C1DA-97A9-429B-97B7-436B21F78E4C}" srcOrd="1" destOrd="0" presId="urn:microsoft.com/office/officeart/2005/8/layout/radial1"/>
-    <dgm:cxn modelId="{CB562C78-48DB-49AE-87EA-073F711A450F}" type="presOf" srcId="{C7EFF620-3989-402C-BF0C-C72EBCCAC402}" destId="{E9003DBF-681F-46D8-AC9A-B2AD218C89BD}" srcOrd="0" destOrd="0" presId="urn:microsoft.com/office/officeart/2005/8/layout/radial1"/>
-    <dgm:cxn modelId="{B06A3317-9C7B-4DD5-B05F-CD89C7C850CF}" type="presOf" srcId="{8DB5FD83-FCC0-4F58-9508-F11ECE372DD1}" destId="{C474A470-C7E4-4751-B135-B5BDAB013C49}" srcOrd="1" destOrd="0" presId="urn:microsoft.com/office/officeart/2005/8/layout/radial1"/>
-    <dgm:cxn modelId="{703077FF-B3F5-4B3F-AF12-21AB2EF068B7}" type="presOf" srcId="{3AA1FA2B-CDA3-43C0-B025-C72022D9207B}" destId="{F6F5CCF8-56D0-4FF5-AA9F-D0563BC6B882}" srcOrd="1" destOrd="0" presId="urn:microsoft.com/office/officeart/2005/8/layout/radial1"/>
-    <dgm:cxn modelId="{CE0D44C7-9FFB-4919-A54C-8D916C0FBC77}" type="presOf" srcId="{859EE249-9892-42B0-8673-06FADE8F37B5}" destId="{520B4BAF-AAEF-4C1A-9CAF-13D8D7F842E3}" srcOrd="1" destOrd="0" presId="urn:microsoft.com/office/officeart/2005/8/layout/radial1"/>
-    <dgm:cxn modelId="{54D77CDF-38E1-4529-97B4-5D89191A3030}" srcId="{ABA2A8E6-5BE2-4B1C-9B2B-C14EC82D48AE}" destId="{6FB7F775-7FDB-4AC9-9E50-BF012053C1C3}" srcOrd="1" destOrd="0" parTransId="{61EA2591-08CA-486F-8779-D291A3AB13ED}" sibTransId="{B19A1E6E-8B1D-404C-BA2D-387B6F3CDBB5}"/>
     <dgm:cxn modelId="{80594FE8-7B9E-41C6-B8C6-CFC4759C7A13}" type="presParOf" srcId="{CB46EB00-4528-4B9B-ADCE-4B63D79D0ADA}" destId="{253E9043-395F-49ED-89BB-FFE97D2B7BEB}" srcOrd="0" destOrd="0" presId="urn:microsoft.com/office/officeart/2005/8/layout/radial1"/>
     <dgm:cxn modelId="{0CBFE164-9E34-42E6-9B42-1C30324DAC4A}" type="presParOf" srcId="{CB46EB00-4528-4B9B-ADCE-4B63D79D0ADA}" destId="{67978505-1397-43C4-BA6B-6D9B5831A906}" srcOrd="1" destOrd="0" presId="urn:microsoft.com/office/officeart/2005/8/layout/radial1"/>
     <dgm:cxn modelId="{AD7BE687-3A56-437D-BE3F-C550C1CFA1DC}" type="presParOf" srcId="{67978505-1397-43C4-BA6B-6D9B5831A906}" destId="{4E87FB4D-DB98-4FF0-91F7-3C56C4CFBD72}" srcOrd="0" destOrd="0" presId="urn:microsoft.com/office/officeart/2005/8/layout/radial1"/>
@@ -1682,18 +1756,12 @@
     <dgm:cxn modelId="{479E7116-B7FB-421B-89B1-EF980F051E94}" type="presParOf" srcId="{CB46EB00-4528-4B9B-ADCE-4B63D79D0ADA}" destId="{57A0A247-32B4-470E-A002-3ACC323FF423}" srcOrd="15" destOrd="0" presId="urn:microsoft.com/office/officeart/2005/8/layout/radial1"/>
     <dgm:cxn modelId="{7D639EE9-4ADF-4AC0-AEBA-E609CE86E33C}" type="presParOf" srcId="{57A0A247-32B4-470E-A002-3ACC323FF423}" destId="{752F705B-E2DC-4AAE-8455-7EA77A18509C}" srcOrd="0" destOrd="0" presId="urn:microsoft.com/office/officeart/2005/8/layout/radial1"/>
     <dgm:cxn modelId="{A18E092B-5D79-4904-8BAC-3DDE5F915958}" type="presParOf" srcId="{CB46EB00-4528-4B9B-ADCE-4B63D79D0ADA}" destId="{36731F56-C670-4217-8319-F8EDAC9AED3D}" srcOrd="16" destOrd="0" presId="urn:microsoft.com/office/officeart/2005/8/layout/radial1"/>
-    <dgm:cxn modelId="{15A5399C-754C-4942-A4D6-2D611EFD820E}" type="presParOf" srcId="{CB46EB00-4528-4B9B-ADCE-4B63D79D0ADA}" destId="{C8D35826-983C-498B-BB81-C2E055925FDE}" srcOrd="17" destOrd="0" presId="urn:microsoft.com/office/officeart/2005/8/layout/radial1"/>
-    <dgm:cxn modelId="{A8B6A8E3-9755-47A2-B872-2688DD9B262B}" type="presParOf" srcId="{C8D35826-983C-498B-BB81-C2E055925FDE}" destId="{42311485-06EB-407E-B135-BDDFF37209F5}" srcOrd="0" destOrd="0" presId="urn:microsoft.com/office/officeart/2005/8/layout/radial1"/>
-    <dgm:cxn modelId="{343BCE20-0B65-4273-84B3-C6B1959768E8}" type="presParOf" srcId="{CB46EB00-4528-4B9B-ADCE-4B63D79D0ADA}" destId="{1D085E6A-9CDB-4D36-A26A-CD5B931E1170}" srcOrd="18" destOrd="0" presId="urn:microsoft.com/office/officeart/2005/8/layout/radial1"/>
-    <dgm:cxn modelId="{59703D7D-E511-43DF-9FE6-5A7C479CDAD7}" type="presParOf" srcId="{CB46EB00-4528-4B9B-ADCE-4B63D79D0ADA}" destId="{255640C7-42AD-41CB-B390-BC7231523B34}" srcOrd="19" destOrd="0" presId="urn:microsoft.com/office/officeart/2005/8/layout/radial1"/>
-    <dgm:cxn modelId="{1412D142-3E78-4FA1-A7B7-D5F79952B6FB}" type="presParOf" srcId="{255640C7-42AD-41CB-B390-BC7231523B34}" destId="{109ABE61-5304-4C0B-B332-B0126AB4AD1B}" srcOrd="0" destOrd="0" presId="urn:microsoft.com/office/officeart/2005/8/layout/radial1"/>
-    <dgm:cxn modelId="{6EAFD70F-F1D9-4FC0-A122-C87D8F8C5BA1}" type="presParOf" srcId="{CB46EB00-4528-4B9B-ADCE-4B63D79D0ADA}" destId="{2E26A752-646F-4235-8D28-9523DCB6CDC8}" srcOrd="20" destOrd="0" presId="urn:microsoft.com/office/officeart/2005/8/layout/radial1"/>
-    <dgm:cxn modelId="{1416B684-9711-42E0-AE09-BEBFFF0EB28A}" type="presParOf" srcId="{CB46EB00-4528-4B9B-ADCE-4B63D79D0ADA}" destId="{2419DFE4-9B14-401E-A90E-EF438F2786C7}" srcOrd="21" destOrd="0" presId="urn:microsoft.com/office/officeart/2005/8/layout/radial1"/>
+    <dgm:cxn modelId="{1416B684-9711-42E0-AE09-BEBFFF0EB28A}" type="presParOf" srcId="{CB46EB00-4528-4B9B-ADCE-4B63D79D0ADA}" destId="{2419DFE4-9B14-401E-A90E-EF438F2786C7}" srcOrd="17" destOrd="0" presId="urn:microsoft.com/office/officeart/2005/8/layout/radial1"/>
     <dgm:cxn modelId="{30B8BEC2-2CED-4939-8BAC-725C07158A4F}" type="presParOf" srcId="{2419DFE4-9B14-401E-A90E-EF438F2786C7}" destId="{F6F5CCF8-56D0-4FF5-AA9F-D0563BC6B882}" srcOrd="0" destOrd="0" presId="urn:microsoft.com/office/officeart/2005/8/layout/radial1"/>
-    <dgm:cxn modelId="{E3A16579-3AB5-498F-8942-B8C7D51E51B9}" type="presParOf" srcId="{CB46EB00-4528-4B9B-ADCE-4B63D79D0ADA}" destId="{C27A88B3-4722-46D0-A005-01966C4A79EB}" srcOrd="22" destOrd="0" presId="urn:microsoft.com/office/officeart/2005/8/layout/radial1"/>
-    <dgm:cxn modelId="{4B628F38-E8C4-41D5-9B80-4A82BAEF232E}" type="presParOf" srcId="{CB46EB00-4528-4B9B-ADCE-4B63D79D0ADA}" destId="{07D48153-ADA1-4540-9842-4665B49EFAED}" srcOrd="23" destOrd="0" presId="urn:microsoft.com/office/officeart/2005/8/layout/radial1"/>
+    <dgm:cxn modelId="{E3A16579-3AB5-498F-8942-B8C7D51E51B9}" type="presParOf" srcId="{CB46EB00-4528-4B9B-ADCE-4B63D79D0ADA}" destId="{C27A88B3-4722-46D0-A005-01966C4A79EB}" srcOrd="18" destOrd="0" presId="urn:microsoft.com/office/officeart/2005/8/layout/radial1"/>
+    <dgm:cxn modelId="{4B628F38-E8C4-41D5-9B80-4A82BAEF232E}" type="presParOf" srcId="{CB46EB00-4528-4B9B-ADCE-4B63D79D0ADA}" destId="{07D48153-ADA1-4540-9842-4665B49EFAED}" srcOrd="19" destOrd="0" presId="urn:microsoft.com/office/officeart/2005/8/layout/radial1"/>
     <dgm:cxn modelId="{94DB6983-C0D4-4DEA-A945-0EAD601B5810}" type="presParOf" srcId="{07D48153-ADA1-4540-9842-4665B49EFAED}" destId="{07C5C1DA-97A9-429B-97B7-436B21F78E4C}" srcOrd="0" destOrd="0" presId="urn:microsoft.com/office/officeart/2005/8/layout/radial1"/>
-    <dgm:cxn modelId="{55168997-F68C-40BA-8740-846F9ACEFCAF}" type="presParOf" srcId="{CB46EB00-4528-4B9B-ADCE-4B63D79D0ADA}" destId="{56AB0F57-412B-4437-8190-87BB72D5D7E1}" srcOrd="24" destOrd="0" presId="urn:microsoft.com/office/officeart/2005/8/layout/radial1"/>
+    <dgm:cxn modelId="{55168997-F68C-40BA-8740-846F9ACEFCAF}" type="presParOf" srcId="{CB46EB00-4528-4B9B-ADCE-4B63D79D0ADA}" destId="{56AB0F57-412B-4437-8190-87BB72D5D7E1}" srcOrd="20" destOrd="0" presId="urn:microsoft.com/office/officeart/2005/8/layout/radial1"/>
   </dgm:cxnLst>
   <dgm:bg/>
   <dgm:whole/>
@@ -1720,8 +1788,1115 @@
       </dsp:nvSpPr>
       <dsp:spPr>
         <a:xfrm>
-          <a:off x="3618050" y="2263383"/>
-          <a:ext cx="891899" cy="891899"/>
+          <a:off x="3548155" y="2193489"/>
+          <a:ext cx="1031688" cy="1031688"/>
+        </a:xfrm>
+        <a:prstGeom prst="ellipse">
+          <a:avLst/>
+        </a:prstGeom>
+        <a:gradFill rotWithShape="0">
+          <a:gsLst>
+            <a:gs pos="0">
+              <a:schemeClr val="accent3">
+                <a:hueOff val="0"/>
+                <a:satOff val="0"/>
+                <a:lumOff val="0"/>
+                <a:alphaOff val="0"/>
+                <a:lumMod val="110000"/>
+                <a:satMod val="105000"/>
+                <a:tint val="67000"/>
+              </a:schemeClr>
+            </a:gs>
+            <a:gs pos="50000">
+              <a:schemeClr val="accent3">
+                <a:hueOff val="0"/>
+                <a:satOff val="0"/>
+                <a:lumOff val="0"/>
+                <a:alphaOff val="0"/>
+                <a:lumMod val="105000"/>
+                <a:satMod val="103000"/>
+                <a:tint val="73000"/>
+              </a:schemeClr>
+            </a:gs>
+            <a:gs pos="100000">
+              <a:schemeClr val="accent3">
+                <a:hueOff val="0"/>
+                <a:satOff val="0"/>
+                <a:lumOff val="0"/>
+                <a:alphaOff val="0"/>
+                <a:lumMod val="105000"/>
+                <a:satMod val="109000"/>
+                <a:tint val="81000"/>
+              </a:schemeClr>
+            </a:gs>
+          </a:gsLst>
+          <a:lin ang="5400000" scaled="0"/>
+        </a:gradFill>
+        <a:ln>
+          <a:noFill/>
+        </a:ln>
+        <a:effectLst/>
+        <a:scene3d>
+          <a:camera prst="orthographicFront"/>
+          <a:lightRig rig="flat" dir="t"/>
+        </a:scene3d>
+        <a:sp3d prstMaterial="dkEdge">
+          <a:bevelT w="8200" h="38100"/>
+        </a:sp3d>
+      </dsp:spPr>
+      <dsp:style>
+        <a:lnRef idx="0">
+          <a:scrgbClr r="0" g="0" b="0"/>
+        </a:lnRef>
+        <a:fillRef idx="2">
+          <a:scrgbClr r="0" g="0" b="0"/>
+        </a:fillRef>
+        <a:effectRef idx="1">
+          <a:scrgbClr r="0" g="0" b="0"/>
+        </a:effectRef>
+        <a:fontRef idx="minor">
+          <a:schemeClr val="dk1"/>
+        </a:fontRef>
+      </dsp:style>
+      <dsp:txBody>
+        <a:bodyPr spcFirstLastPara="0" vert="horz" wrap="square" lIns="8255" tIns="8255" rIns="8255" bIns="8255" numCol="1" spcCol="1270" anchor="ctr" anchorCtr="0">
+          <a:noAutofit/>
+        </a:bodyPr>
+        <a:lstStyle/>
+        <a:p>
+          <a:pPr lvl="0" algn="ctr" defTabSz="577850">
+            <a:lnSpc>
+              <a:spcPct val="90000"/>
+            </a:lnSpc>
+            <a:spcBef>
+              <a:spcPct val="0"/>
+            </a:spcBef>
+            <a:spcAft>
+              <a:spcPct val="35000"/>
+            </a:spcAft>
+          </a:pPr>
+          <a:r>
+            <a:rPr lang="de-CH" sz="1300" kern="1200" dirty="0" smtClean="0"/>
+            <a:t>Tankstelle</a:t>
+          </a:r>
+          <a:endParaRPr lang="de-CH" sz="1300" kern="1200" dirty="0"/>
+        </a:p>
+      </dsp:txBody>
+      <dsp:txXfrm>
+        <a:off x="3699242" y="2344576"/>
+        <a:ext cx="729514" cy="729514"/>
+      </dsp:txXfrm>
+    </dsp:sp>
+    <dsp:sp modelId="{67978505-1397-43C4-BA6B-6D9B5831A906}">
+      <dsp:nvSpPr>
+        <dsp:cNvPr id="0" name=""/>
+        <dsp:cNvSpPr/>
+      </dsp:nvSpPr>
+      <dsp:spPr>
+        <a:xfrm rot="16600410">
+          <a:off x="3734071" y="1747407"/>
+          <a:ext cx="882282" cy="22847"/>
+        </a:xfrm>
+        <a:custGeom>
+          <a:avLst/>
+          <a:gdLst/>
+          <a:ahLst/>
+          <a:cxnLst/>
+          <a:rect l="0" t="0" r="0" b="0"/>
+          <a:pathLst>
+            <a:path>
+              <a:moveTo>
+                <a:pt x="0" y="11423"/>
+              </a:moveTo>
+              <a:lnTo>
+                <a:pt x="882282" y="11423"/>
+              </a:lnTo>
+            </a:path>
+          </a:pathLst>
+        </a:custGeom>
+        <a:noFill/>
+        <a:ln w="12700" cap="flat" cmpd="sng" algn="ctr">
+          <a:solidFill>
+            <a:schemeClr val="accent3">
+              <a:shade val="60000"/>
+              <a:hueOff val="0"/>
+              <a:satOff val="0"/>
+              <a:lumOff val="0"/>
+              <a:alphaOff val="0"/>
+            </a:schemeClr>
+          </a:solidFill>
+          <a:prstDash val="solid"/>
+          <a:miter lim="800000"/>
+        </a:ln>
+        <a:effectLst/>
+      </dsp:spPr>
+      <dsp:style>
+        <a:lnRef idx="2">
+          <a:scrgbClr r="0" g="0" b="0"/>
+        </a:lnRef>
+        <a:fillRef idx="0">
+          <a:scrgbClr r="0" g="0" b="0"/>
+        </a:fillRef>
+        <a:effectRef idx="0">
+          <a:scrgbClr r="0" g="0" b="0"/>
+        </a:effectRef>
+        <a:fontRef idx="minor"/>
+      </dsp:style>
+      <dsp:txBody>
+        <a:bodyPr spcFirstLastPara="0" vert="horz" wrap="square" lIns="12700" tIns="0" rIns="12700" bIns="0" numCol="1" spcCol="1270" anchor="ctr" anchorCtr="0">
+          <a:noAutofit/>
+        </a:bodyPr>
+        <a:lstStyle/>
+        <a:p>
+          <a:pPr lvl="0" algn="ctr" defTabSz="222250">
+            <a:lnSpc>
+              <a:spcPct val="90000"/>
+            </a:lnSpc>
+            <a:spcBef>
+              <a:spcPct val="0"/>
+            </a:spcBef>
+            <a:spcAft>
+              <a:spcPct val="35000"/>
+            </a:spcAft>
+          </a:pPr>
+          <a:endParaRPr lang="de-CH" sz="500" kern="1200"/>
+        </a:p>
+      </dsp:txBody>
+      <dsp:txXfrm>
+        <a:off x="4153155" y="1736774"/>
+        <a:ext cx="44114" cy="44114"/>
+      </dsp:txXfrm>
+    </dsp:sp>
+    <dsp:sp modelId="{C87C41C2-E937-4321-B9AA-8AD92C412F49}">
+      <dsp:nvSpPr>
+        <dsp:cNvPr id="0" name=""/>
+        <dsp:cNvSpPr/>
+      </dsp:nvSpPr>
+      <dsp:spPr>
+        <a:xfrm>
+          <a:off x="3770580" y="292485"/>
+          <a:ext cx="1031688" cy="1031688"/>
+        </a:xfrm>
+        <a:prstGeom prst="ellipse">
+          <a:avLst/>
+        </a:prstGeom>
+        <a:gradFill rotWithShape="0">
+          <a:gsLst>
+            <a:gs pos="0">
+              <a:schemeClr val="accent3">
+                <a:hueOff val="0"/>
+                <a:satOff val="0"/>
+                <a:lumOff val="0"/>
+                <a:alphaOff val="0"/>
+                <a:lumMod val="110000"/>
+                <a:satMod val="105000"/>
+                <a:tint val="67000"/>
+              </a:schemeClr>
+            </a:gs>
+            <a:gs pos="50000">
+              <a:schemeClr val="accent3">
+                <a:hueOff val="0"/>
+                <a:satOff val="0"/>
+                <a:lumOff val="0"/>
+                <a:alphaOff val="0"/>
+                <a:lumMod val="105000"/>
+                <a:satMod val="103000"/>
+                <a:tint val="73000"/>
+              </a:schemeClr>
+            </a:gs>
+            <a:gs pos="100000">
+              <a:schemeClr val="accent3">
+                <a:hueOff val="0"/>
+                <a:satOff val="0"/>
+                <a:lumOff val="0"/>
+                <a:alphaOff val="0"/>
+                <a:lumMod val="105000"/>
+                <a:satMod val="109000"/>
+                <a:tint val="81000"/>
+              </a:schemeClr>
+            </a:gs>
+          </a:gsLst>
+          <a:lin ang="5400000" scaled="0"/>
+        </a:gradFill>
+        <a:ln>
+          <a:noFill/>
+        </a:ln>
+        <a:effectLst/>
+        <a:scene3d>
+          <a:camera prst="orthographicFront"/>
+          <a:lightRig rig="flat" dir="t"/>
+        </a:scene3d>
+        <a:sp3d prstMaterial="dkEdge">
+          <a:bevelT w="8200" h="38100"/>
+        </a:sp3d>
+      </dsp:spPr>
+      <dsp:style>
+        <a:lnRef idx="0">
+          <a:scrgbClr r="0" g="0" b="0"/>
+        </a:lnRef>
+        <a:fillRef idx="2">
+          <a:scrgbClr r="0" g="0" b="0"/>
+        </a:fillRef>
+        <a:effectRef idx="1">
+          <a:scrgbClr r="0" g="0" b="0"/>
+        </a:effectRef>
+        <a:fontRef idx="minor">
+          <a:schemeClr val="dk1"/>
+        </a:fontRef>
+      </dsp:style>
+      <dsp:txBody>
+        <a:bodyPr spcFirstLastPara="0" vert="horz" wrap="square" lIns="4445" tIns="4445" rIns="4445" bIns="4445" numCol="1" spcCol="1270" anchor="ctr" anchorCtr="0">
+          <a:noAutofit/>
+        </a:bodyPr>
+        <a:lstStyle/>
+        <a:p>
+          <a:pPr lvl="0" algn="ctr" defTabSz="311150">
+            <a:lnSpc>
+              <a:spcPct val="90000"/>
+            </a:lnSpc>
+            <a:spcBef>
+              <a:spcPct val="0"/>
+            </a:spcBef>
+            <a:spcAft>
+              <a:spcPct val="35000"/>
+            </a:spcAft>
+          </a:pPr>
+          <a:r>
+            <a:rPr lang="de-CH" sz="700" kern="1200" dirty="0" smtClean="0"/>
+            <a:t>Management</a:t>
+          </a:r>
+        </a:p>
+      </dsp:txBody>
+      <dsp:txXfrm>
+        <a:off x="3921667" y="443572"/>
+        <a:ext cx="729514" cy="729514"/>
+      </dsp:txXfrm>
+    </dsp:sp>
+    <dsp:sp modelId="{72DA0D22-B4E7-4F48-9038-F63D24794E35}">
+      <dsp:nvSpPr>
+        <dsp:cNvPr id="0" name=""/>
+        <dsp:cNvSpPr/>
+      </dsp:nvSpPr>
+      <dsp:spPr>
+        <a:xfrm rot="18360000">
+          <a:off x="4131862" y="1818696"/>
+          <a:ext cx="1141846" cy="22847"/>
+        </a:xfrm>
+        <a:custGeom>
+          <a:avLst/>
+          <a:gdLst/>
+          <a:ahLst/>
+          <a:cxnLst/>
+          <a:rect l="0" t="0" r="0" b="0"/>
+          <a:pathLst>
+            <a:path>
+              <a:moveTo>
+                <a:pt x="0" y="11423"/>
+              </a:moveTo>
+              <a:lnTo>
+                <a:pt x="1141846" y="11423"/>
+              </a:lnTo>
+            </a:path>
+          </a:pathLst>
+        </a:custGeom>
+        <a:noFill/>
+        <a:ln w="12700" cap="flat" cmpd="sng" algn="ctr">
+          <a:solidFill>
+            <a:schemeClr val="accent3">
+              <a:shade val="60000"/>
+              <a:hueOff val="0"/>
+              <a:satOff val="0"/>
+              <a:lumOff val="0"/>
+              <a:alphaOff val="0"/>
+            </a:schemeClr>
+          </a:solidFill>
+          <a:prstDash val="solid"/>
+          <a:miter lim="800000"/>
+        </a:ln>
+        <a:effectLst/>
+      </dsp:spPr>
+      <dsp:style>
+        <a:lnRef idx="2">
+          <a:scrgbClr r="0" g="0" b="0"/>
+        </a:lnRef>
+        <a:fillRef idx="0">
+          <a:scrgbClr r="0" g="0" b="0"/>
+        </a:fillRef>
+        <a:effectRef idx="0">
+          <a:scrgbClr r="0" g="0" b="0"/>
+        </a:effectRef>
+        <a:fontRef idx="minor"/>
+      </dsp:style>
+      <dsp:txBody>
+        <a:bodyPr spcFirstLastPara="0" vert="horz" wrap="square" lIns="12700" tIns="0" rIns="12700" bIns="0" numCol="1" spcCol="1270" anchor="ctr" anchorCtr="0">
+          <a:noAutofit/>
+        </a:bodyPr>
+        <a:lstStyle/>
+        <a:p>
+          <a:pPr lvl="0" algn="ctr" defTabSz="222250">
+            <a:lnSpc>
+              <a:spcPct val="90000"/>
+            </a:lnSpc>
+            <a:spcBef>
+              <a:spcPct val="0"/>
+            </a:spcBef>
+            <a:spcAft>
+              <a:spcPct val="35000"/>
+            </a:spcAft>
+          </a:pPr>
+          <a:endParaRPr lang="de-CH" sz="500" kern="1200"/>
+        </a:p>
+      </dsp:txBody>
+      <dsp:txXfrm>
+        <a:off x="4674239" y="1801573"/>
+        <a:ext cx="57092" cy="57092"/>
+      </dsp:txXfrm>
+    </dsp:sp>
+    <dsp:sp modelId="{13328FA8-9A7E-4E77-B510-EBB989FD0427}">
+      <dsp:nvSpPr>
+        <dsp:cNvPr id="0" name=""/>
+        <dsp:cNvSpPr/>
+      </dsp:nvSpPr>
+      <dsp:spPr>
+        <a:xfrm>
+          <a:off x="4825727" y="435061"/>
+          <a:ext cx="1031688" cy="1031688"/>
+        </a:xfrm>
+        <a:prstGeom prst="ellipse">
+          <a:avLst/>
+        </a:prstGeom>
+        <a:gradFill rotWithShape="0">
+          <a:gsLst>
+            <a:gs pos="0">
+              <a:schemeClr val="accent3">
+                <a:hueOff val="0"/>
+                <a:satOff val="0"/>
+                <a:lumOff val="0"/>
+                <a:alphaOff val="0"/>
+                <a:lumMod val="110000"/>
+                <a:satMod val="105000"/>
+                <a:tint val="67000"/>
+              </a:schemeClr>
+            </a:gs>
+            <a:gs pos="50000">
+              <a:schemeClr val="accent3">
+                <a:hueOff val="0"/>
+                <a:satOff val="0"/>
+                <a:lumOff val="0"/>
+                <a:alphaOff val="0"/>
+                <a:lumMod val="105000"/>
+                <a:satMod val="103000"/>
+                <a:tint val="73000"/>
+              </a:schemeClr>
+            </a:gs>
+            <a:gs pos="100000">
+              <a:schemeClr val="accent3">
+                <a:hueOff val="0"/>
+                <a:satOff val="0"/>
+                <a:lumOff val="0"/>
+                <a:alphaOff val="0"/>
+                <a:lumMod val="105000"/>
+                <a:satMod val="109000"/>
+                <a:tint val="81000"/>
+              </a:schemeClr>
+            </a:gs>
+          </a:gsLst>
+          <a:lin ang="5400000" scaled="0"/>
+        </a:gradFill>
+        <a:ln>
+          <a:noFill/>
+        </a:ln>
+        <a:effectLst/>
+        <a:scene3d>
+          <a:camera prst="orthographicFront"/>
+          <a:lightRig rig="flat" dir="t"/>
+        </a:scene3d>
+        <a:sp3d prstMaterial="dkEdge">
+          <a:bevelT w="8200" h="38100"/>
+        </a:sp3d>
+      </dsp:spPr>
+      <dsp:style>
+        <a:lnRef idx="0">
+          <a:scrgbClr r="0" g="0" b="0"/>
+        </a:lnRef>
+        <a:fillRef idx="2">
+          <a:scrgbClr r="0" g="0" b="0"/>
+        </a:fillRef>
+        <a:effectRef idx="1">
+          <a:scrgbClr r="0" g="0" b="0"/>
+        </a:effectRef>
+        <a:fontRef idx="minor">
+          <a:schemeClr val="dk1"/>
+        </a:fontRef>
+      </dsp:style>
+      <dsp:txBody>
+        <a:bodyPr spcFirstLastPara="0" vert="horz" wrap="square" lIns="4445" tIns="4445" rIns="4445" bIns="4445" numCol="1" spcCol="1270" anchor="ctr" anchorCtr="0">
+          <a:noAutofit/>
+        </a:bodyPr>
+        <a:lstStyle/>
+        <a:p>
+          <a:pPr lvl="0" algn="ctr" defTabSz="311150">
+            <a:lnSpc>
+              <a:spcPct val="90000"/>
+            </a:lnSpc>
+            <a:spcBef>
+              <a:spcPct val="0"/>
+            </a:spcBef>
+            <a:spcAft>
+              <a:spcPct val="35000"/>
+            </a:spcAft>
+          </a:pPr>
+          <a:r>
+            <a:rPr lang="de-CH" sz="700" kern="1200" dirty="0" smtClean="0"/>
+            <a:t>Inhaber</a:t>
+          </a:r>
+        </a:p>
+      </dsp:txBody>
+      <dsp:txXfrm>
+        <a:off x="4976814" y="586148"/>
+        <a:ext cx="729514" cy="729514"/>
+      </dsp:txXfrm>
+    </dsp:sp>
+    <dsp:sp modelId="{E89745EC-7C9C-4B3A-BDDE-4FED14C3FE0B}">
+      <dsp:nvSpPr>
+        <dsp:cNvPr id="0" name=""/>
+        <dsp:cNvSpPr/>
+      </dsp:nvSpPr>
+      <dsp:spPr>
+        <a:xfrm rot="20155262">
+          <a:off x="4500062" y="2323834"/>
+          <a:ext cx="802035" cy="22847"/>
+        </a:xfrm>
+        <a:custGeom>
+          <a:avLst/>
+          <a:gdLst/>
+          <a:ahLst/>
+          <a:cxnLst/>
+          <a:rect l="0" t="0" r="0" b="0"/>
+          <a:pathLst>
+            <a:path>
+              <a:moveTo>
+                <a:pt x="0" y="11423"/>
+              </a:moveTo>
+              <a:lnTo>
+                <a:pt x="802035" y="11423"/>
+              </a:lnTo>
+            </a:path>
+          </a:pathLst>
+        </a:custGeom>
+        <a:noFill/>
+        <a:ln w="12700" cap="flat" cmpd="sng" algn="ctr">
+          <a:solidFill>
+            <a:schemeClr val="accent3">
+              <a:shade val="60000"/>
+              <a:hueOff val="0"/>
+              <a:satOff val="0"/>
+              <a:lumOff val="0"/>
+              <a:alphaOff val="0"/>
+            </a:schemeClr>
+          </a:solidFill>
+          <a:prstDash val="solid"/>
+          <a:miter lim="800000"/>
+        </a:ln>
+        <a:effectLst/>
+      </dsp:spPr>
+      <dsp:style>
+        <a:lnRef idx="2">
+          <a:scrgbClr r="0" g="0" b="0"/>
+        </a:lnRef>
+        <a:fillRef idx="0">
+          <a:scrgbClr r="0" g="0" b="0"/>
+        </a:fillRef>
+        <a:effectRef idx="0">
+          <a:scrgbClr r="0" g="0" b="0"/>
+        </a:effectRef>
+        <a:fontRef idx="minor"/>
+      </dsp:style>
+      <dsp:txBody>
+        <a:bodyPr spcFirstLastPara="0" vert="horz" wrap="square" lIns="12700" tIns="0" rIns="12700" bIns="0" numCol="1" spcCol="1270" anchor="ctr" anchorCtr="0">
+          <a:noAutofit/>
+        </a:bodyPr>
+        <a:lstStyle/>
+        <a:p>
+          <a:pPr lvl="0" algn="ctr" defTabSz="222250">
+            <a:lnSpc>
+              <a:spcPct val="90000"/>
+            </a:lnSpc>
+            <a:spcBef>
+              <a:spcPct val="0"/>
+            </a:spcBef>
+            <a:spcAft>
+              <a:spcPct val="35000"/>
+            </a:spcAft>
+          </a:pPr>
+          <a:endParaRPr lang="de-CH" sz="500" kern="1200"/>
+        </a:p>
+      </dsp:txBody>
+      <dsp:txXfrm>
+        <a:off x="4881029" y="2315207"/>
+        <a:ext cx="40101" cy="40101"/>
+      </dsp:txXfrm>
+    </dsp:sp>
+    <dsp:sp modelId="{1E2E3932-484B-4D4E-B189-A5E9A6B9B96E}">
+      <dsp:nvSpPr>
+        <dsp:cNvPr id="0" name=""/>
+        <dsp:cNvSpPr/>
+      </dsp:nvSpPr>
+      <dsp:spPr>
+        <a:xfrm>
+          <a:off x="5222317" y="1445338"/>
+          <a:ext cx="1031688" cy="1031688"/>
+        </a:xfrm>
+        <a:prstGeom prst="ellipse">
+          <a:avLst/>
+        </a:prstGeom>
+        <a:gradFill rotWithShape="0">
+          <a:gsLst>
+            <a:gs pos="0">
+              <a:schemeClr val="accent3">
+                <a:hueOff val="0"/>
+                <a:satOff val="0"/>
+                <a:lumOff val="0"/>
+                <a:alphaOff val="0"/>
+                <a:lumMod val="110000"/>
+                <a:satMod val="105000"/>
+                <a:tint val="67000"/>
+              </a:schemeClr>
+            </a:gs>
+            <a:gs pos="50000">
+              <a:schemeClr val="accent3">
+                <a:hueOff val="0"/>
+                <a:satOff val="0"/>
+                <a:lumOff val="0"/>
+                <a:alphaOff val="0"/>
+                <a:lumMod val="105000"/>
+                <a:satMod val="103000"/>
+                <a:tint val="73000"/>
+              </a:schemeClr>
+            </a:gs>
+            <a:gs pos="100000">
+              <a:schemeClr val="accent3">
+                <a:hueOff val="0"/>
+                <a:satOff val="0"/>
+                <a:lumOff val="0"/>
+                <a:alphaOff val="0"/>
+                <a:lumMod val="105000"/>
+                <a:satMod val="109000"/>
+                <a:tint val="81000"/>
+              </a:schemeClr>
+            </a:gs>
+          </a:gsLst>
+          <a:lin ang="5400000" scaled="0"/>
+        </a:gradFill>
+        <a:ln>
+          <a:noFill/>
+        </a:ln>
+        <a:effectLst/>
+        <a:scene3d>
+          <a:camera prst="orthographicFront"/>
+          <a:lightRig rig="flat" dir="t"/>
+        </a:scene3d>
+        <a:sp3d prstMaterial="dkEdge">
+          <a:bevelT w="8200" h="38100"/>
+        </a:sp3d>
+      </dsp:spPr>
+      <dsp:style>
+        <a:lnRef idx="0">
+          <a:scrgbClr r="0" g="0" b="0"/>
+        </a:lnRef>
+        <a:fillRef idx="2">
+          <a:scrgbClr r="0" g="0" b="0"/>
+        </a:fillRef>
+        <a:effectRef idx="1">
+          <a:scrgbClr r="0" g="0" b="0"/>
+        </a:effectRef>
+        <a:fontRef idx="minor">
+          <a:schemeClr val="dk1"/>
+        </a:fontRef>
+      </dsp:style>
+      <dsp:txBody>
+        <a:bodyPr spcFirstLastPara="0" vert="horz" wrap="square" lIns="4445" tIns="4445" rIns="4445" bIns="4445" numCol="1" spcCol="1270" anchor="ctr" anchorCtr="0">
+          <a:noAutofit/>
+        </a:bodyPr>
+        <a:lstStyle/>
+        <a:p>
+          <a:pPr lvl="0" algn="ctr" defTabSz="311150">
+            <a:lnSpc>
+              <a:spcPct val="90000"/>
+            </a:lnSpc>
+            <a:spcBef>
+              <a:spcPct val="0"/>
+            </a:spcBef>
+            <a:spcAft>
+              <a:spcPct val="35000"/>
+            </a:spcAft>
+          </a:pPr>
+          <a:r>
+            <a:rPr lang="de-CH" sz="700" kern="1200" dirty="0" smtClean="0"/>
+            <a:t>Buchhaltung</a:t>
+          </a:r>
+        </a:p>
+      </dsp:txBody>
+      <dsp:txXfrm>
+        <a:off x="5373404" y="1596425"/>
+        <a:ext cx="729514" cy="729514"/>
+      </dsp:txXfrm>
+    </dsp:sp>
+    <dsp:sp modelId="{04003D1F-A720-4ED6-BF63-F06E487ED93B}">
+      <dsp:nvSpPr>
+        <dsp:cNvPr id="0" name=""/>
+        <dsp:cNvSpPr/>
+      </dsp:nvSpPr>
+      <dsp:spPr>
+        <a:xfrm rot="683078">
+          <a:off x="4563603" y="2860847"/>
+          <a:ext cx="619198" cy="22847"/>
+        </a:xfrm>
+        <a:custGeom>
+          <a:avLst/>
+          <a:gdLst/>
+          <a:ahLst/>
+          <a:cxnLst/>
+          <a:rect l="0" t="0" r="0" b="0"/>
+          <a:pathLst>
+            <a:path>
+              <a:moveTo>
+                <a:pt x="0" y="11423"/>
+              </a:moveTo>
+              <a:lnTo>
+                <a:pt x="619198" y="11423"/>
+              </a:lnTo>
+            </a:path>
+          </a:pathLst>
+        </a:custGeom>
+        <a:noFill/>
+        <a:ln w="12700" cap="flat" cmpd="sng" algn="ctr">
+          <a:solidFill>
+            <a:schemeClr val="accent3">
+              <a:shade val="60000"/>
+              <a:hueOff val="0"/>
+              <a:satOff val="0"/>
+              <a:lumOff val="0"/>
+              <a:alphaOff val="0"/>
+            </a:schemeClr>
+          </a:solidFill>
+          <a:prstDash val="solid"/>
+          <a:miter lim="800000"/>
+        </a:ln>
+        <a:effectLst/>
+      </dsp:spPr>
+      <dsp:style>
+        <a:lnRef idx="2">
+          <a:scrgbClr r="0" g="0" b="0"/>
+        </a:lnRef>
+        <a:fillRef idx="0">
+          <a:scrgbClr r="0" g="0" b="0"/>
+        </a:fillRef>
+        <a:effectRef idx="0">
+          <a:scrgbClr r="0" g="0" b="0"/>
+        </a:effectRef>
+        <a:fontRef idx="minor"/>
+      </dsp:style>
+      <dsp:txBody>
+        <a:bodyPr spcFirstLastPara="0" vert="horz" wrap="square" lIns="12700" tIns="0" rIns="12700" bIns="0" numCol="1" spcCol="1270" anchor="ctr" anchorCtr="0">
+          <a:noAutofit/>
+        </a:bodyPr>
+        <a:lstStyle/>
+        <a:p>
+          <a:pPr lvl="0" algn="ctr" defTabSz="222250">
+            <a:lnSpc>
+              <a:spcPct val="90000"/>
+            </a:lnSpc>
+            <a:spcBef>
+              <a:spcPct val="0"/>
+            </a:spcBef>
+            <a:spcAft>
+              <a:spcPct val="35000"/>
+            </a:spcAft>
+          </a:pPr>
+          <a:endParaRPr lang="de-CH" sz="500" kern="1200"/>
+        </a:p>
+      </dsp:txBody>
+      <dsp:txXfrm>
+        <a:off x="4857722" y="2856791"/>
+        <a:ext cx="30959" cy="30959"/>
+      </dsp:txXfrm>
+    </dsp:sp>
+    <dsp:sp modelId="{396D1756-1806-4E60-8EFB-AE6607BF146E}">
+      <dsp:nvSpPr>
+        <dsp:cNvPr id="0" name=""/>
+        <dsp:cNvSpPr/>
+      </dsp:nvSpPr>
+      <dsp:spPr>
+        <a:xfrm>
+          <a:off x="5166559" y="2519365"/>
+          <a:ext cx="1031688" cy="1031688"/>
+        </a:xfrm>
+        <a:prstGeom prst="ellipse">
+          <a:avLst/>
+        </a:prstGeom>
+        <a:gradFill rotWithShape="0">
+          <a:gsLst>
+            <a:gs pos="0">
+              <a:schemeClr val="accent3">
+                <a:hueOff val="0"/>
+                <a:satOff val="0"/>
+                <a:lumOff val="0"/>
+                <a:alphaOff val="0"/>
+                <a:lumMod val="110000"/>
+                <a:satMod val="105000"/>
+                <a:tint val="67000"/>
+              </a:schemeClr>
+            </a:gs>
+            <a:gs pos="50000">
+              <a:schemeClr val="accent3">
+                <a:hueOff val="0"/>
+                <a:satOff val="0"/>
+                <a:lumOff val="0"/>
+                <a:alphaOff val="0"/>
+                <a:lumMod val="105000"/>
+                <a:satMod val="103000"/>
+                <a:tint val="73000"/>
+              </a:schemeClr>
+            </a:gs>
+            <a:gs pos="100000">
+              <a:schemeClr val="accent3">
+                <a:hueOff val="0"/>
+                <a:satOff val="0"/>
+                <a:lumOff val="0"/>
+                <a:alphaOff val="0"/>
+                <a:lumMod val="105000"/>
+                <a:satMod val="109000"/>
+                <a:tint val="81000"/>
+              </a:schemeClr>
+            </a:gs>
+          </a:gsLst>
+          <a:lin ang="5400000" scaled="0"/>
+        </a:gradFill>
+        <a:ln>
+          <a:noFill/>
+        </a:ln>
+        <a:effectLst/>
+        <a:scene3d>
+          <a:camera prst="orthographicFront"/>
+          <a:lightRig rig="flat" dir="t"/>
+        </a:scene3d>
+        <a:sp3d prstMaterial="dkEdge">
+          <a:bevelT w="8200" h="38100"/>
+        </a:sp3d>
+      </dsp:spPr>
+      <dsp:style>
+        <a:lnRef idx="0">
+          <a:scrgbClr r="0" g="0" b="0"/>
+        </a:lnRef>
+        <a:fillRef idx="2">
+          <a:scrgbClr r="0" g="0" b="0"/>
+        </a:fillRef>
+        <a:effectRef idx="1">
+          <a:scrgbClr r="0" g="0" b="0"/>
+        </a:effectRef>
+        <a:fontRef idx="minor">
+          <a:schemeClr val="dk1"/>
+        </a:fontRef>
+      </dsp:style>
+      <dsp:txBody>
+        <a:bodyPr spcFirstLastPara="0" vert="horz" wrap="square" lIns="4445" tIns="4445" rIns="4445" bIns="4445" numCol="1" spcCol="1270" anchor="ctr" anchorCtr="0">
+          <a:noAutofit/>
+        </a:bodyPr>
+        <a:lstStyle/>
+        <a:p>
+          <a:pPr lvl="0" algn="ctr" defTabSz="311150">
+            <a:lnSpc>
+              <a:spcPct val="90000"/>
+            </a:lnSpc>
+            <a:spcBef>
+              <a:spcPct val="0"/>
+            </a:spcBef>
+            <a:spcAft>
+              <a:spcPct val="35000"/>
+            </a:spcAft>
+          </a:pPr>
+          <a:r>
+            <a:rPr lang="de-CH" sz="700" kern="1200" dirty="0" smtClean="0"/>
+            <a:t>Personalabteilung</a:t>
+          </a:r>
+        </a:p>
+      </dsp:txBody>
+      <dsp:txXfrm>
+        <a:off x="5317646" y="2670452"/>
+        <a:ext cx="729514" cy="729514"/>
+      </dsp:txXfrm>
+    </dsp:sp>
+    <dsp:sp modelId="{FF73F48E-DBE3-491E-BBD8-817DF2781EF5}">
+      <dsp:nvSpPr>
+        <dsp:cNvPr id="0" name=""/>
+        <dsp:cNvSpPr/>
+      </dsp:nvSpPr>
+      <dsp:spPr>
+        <a:xfrm rot="2918473">
+          <a:off x="4259031" y="3407751"/>
+          <a:ext cx="859743" cy="22847"/>
+        </a:xfrm>
+        <a:custGeom>
+          <a:avLst/>
+          <a:gdLst/>
+          <a:ahLst/>
+          <a:cxnLst/>
+          <a:rect l="0" t="0" r="0" b="0"/>
+          <a:pathLst>
+            <a:path>
+              <a:moveTo>
+                <a:pt x="0" y="11423"/>
+              </a:moveTo>
+              <a:lnTo>
+                <a:pt x="859743" y="11423"/>
+              </a:lnTo>
+            </a:path>
+          </a:pathLst>
+        </a:custGeom>
+        <a:noFill/>
+        <a:ln w="12700" cap="flat" cmpd="sng" algn="ctr">
+          <a:solidFill>
+            <a:schemeClr val="accent3">
+              <a:shade val="60000"/>
+              <a:hueOff val="0"/>
+              <a:satOff val="0"/>
+              <a:lumOff val="0"/>
+              <a:alphaOff val="0"/>
+            </a:schemeClr>
+          </a:solidFill>
+          <a:prstDash val="solid"/>
+          <a:miter lim="800000"/>
+        </a:ln>
+        <a:effectLst/>
+      </dsp:spPr>
+      <dsp:style>
+        <a:lnRef idx="2">
+          <a:scrgbClr r="0" g="0" b="0"/>
+        </a:lnRef>
+        <a:fillRef idx="0">
+          <a:scrgbClr r="0" g="0" b="0"/>
+        </a:fillRef>
+        <a:effectRef idx="0">
+          <a:scrgbClr r="0" g="0" b="0"/>
+        </a:effectRef>
+        <a:fontRef idx="minor"/>
+      </dsp:style>
+      <dsp:txBody>
+        <a:bodyPr spcFirstLastPara="0" vert="horz" wrap="square" lIns="12700" tIns="0" rIns="12700" bIns="0" numCol="1" spcCol="1270" anchor="ctr" anchorCtr="0">
+          <a:noAutofit/>
+        </a:bodyPr>
+        <a:lstStyle/>
+        <a:p>
+          <a:pPr lvl="0" algn="ctr" defTabSz="222250">
+            <a:lnSpc>
+              <a:spcPct val="90000"/>
+            </a:lnSpc>
+            <a:spcBef>
+              <a:spcPct val="0"/>
+            </a:spcBef>
+            <a:spcAft>
+              <a:spcPct val="35000"/>
+            </a:spcAft>
+          </a:pPr>
+          <a:endParaRPr lang="de-CH" sz="500" kern="1200"/>
+        </a:p>
+      </dsp:txBody>
+      <dsp:txXfrm>
+        <a:off x="4667409" y="3397681"/>
+        <a:ext cx="42987" cy="42987"/>
+      </dsp:txXfrm>
+    </dsp:sp>
+    <dsp:sp modelId="{E9003DBF-681F-46D8-AC9A-B2AD218C89BD}">
+      <dsp:nvSpPr>
+        <dsp:cNvPr id="0" name=""/>
+        <dsp:cNvSpPr/>
+      </dsp:nvSpPr>
+      <dsp:spPr>
+        <a:xfrm>
+          <a:off x="4797961" y="3613172"/>
+          <a:ext cx="1031688" cy="1031688"/>
+        </a:xfrm>
+        <a:prstGeom prst="ellipse">
+          <a:avLst/>
+        </a:prstGeom>
+        <a:gradFill rotWithShape="0">
+          <a:gsLst>
+            <a:gs pos="0">
+              <a:schemeClr val="accent3">
+                <a:hueOff val="0"/>
+                <a:satOff val="0"/>
+                <a:lumOff val="0"/>
+                <a:alphaOff val="0"/>
+                <a:lumMod val="110000"/>
+                <a:satMod val="105000"/>
+                <a:tint val="67000"/>
+              </a:schemeClr>
+            </a:gs>
+            <a:gs pos="50000">
+              <a:schemeClr val="accent3">
+                <a:hueOff val="0"/>
+                <a:satOff val="0"/>
+                <a:lumOff val="0"/>
+                <a:alphaOff val="0"/>
+                <a:lumMod val="105000"/>
+                <a:satMod val="103000"/>
+                <a:tint val="73000"/>
+              </a:schemeClr>
+            </a:gs>
+            <a:gs pos="100000">
+              <a:schemeClr val="accent3">
+                <a:hueOff val="0"/>
+                <a:satOff val="0"/>
+                <a:lumOff val="0"/>
+                <a:alphaOff val="0"/>
+                <a:lumMod val="105000"/>
+                <a:satMod val="109000"/>
+                <a:tint val="81000"/>
+              </a:schemeClr>
+            </a:gs>
+          </a:gsLst>
+          <a:lin ang="5400000" scaled="0"/>
+        </a:gradFill>
+        <a:ln>
+          <a:noFill/>
+        </a:ln>
+        <a:effectLst/>
+        <a:scene3d>
+          <a:camera prst="orthographicFront"/>
+          <a:lightRig rig="flat" dir="t"/>
+        </a:scene3d>
+        <a:sp3d prstMaterial="dkEdge">
+          <a:bevelT w="8200" h="38100"/>
+        </a:sp3d>
+      </dsp:spPr>
+      <dsp:style>
+        <a:lnRef idx="0">
+          <a:scrgbClr r="0" g="0" b="0"/>
+        </a:lnRef>
+        <a:fillRef idx="2">
+          <a:scrgbClr r="0" g="0" b="0"/>
+        </a:fillRef>
+        <a:effectRef idx="1">
+          <a:scrgbClr r="0" g="0" b="0"/>
+        </a:effectRef>
+        <a:fontRef idx="minor">
+          <a:schemeClr val="dk1"/>
+        </a:fontRef>
+      </dsp:style>
+      <dsp:txBody>
+        <a:bodyPr spcFirstLastPara="0" vert="horz" wrap="square" lIns="4445" tIns="4445" rIns="4445" bIns="4445" numCol="1" spcCol="1270" anchor="ctr" anchorCtr="0">
+          <a:noAutofit/>
+        </a:bodyPr>
+        <a:lstStyle/>
+        <a:p>
+          <a:pPr lvl="0" algn="ctr" defTabSz="311150">
+            <a:lnSpc>
+              <a:spcPct val="90000"/>
+            </a:lnSpc>
+            <a:spcBef>
+              <a:spcPct val="0"/>
+            </a:spcBef>
+            <a:spcAft>
+              <a:spcPct val="35000"/>
+            </a:spcAft>
+          </a:pPr>
+          <a:r>
+            <a:rPr lang="de-CH" sz="700" kern="1200" dirty="0" smtClean="0"/>
+            <a:t>Fahrzeugabteilung</a:t>
+          </a:r>
+        </a:p>
+      </dsp:txBody>
+      <dsp:txXfrm>
+        <a:off x="4949048" y="3764259"/>
+        <a:ext cx="729514" cy="729514"/>
+      </dsp:txXfrm>
+    </dsp:sp>
+    <dsp:sp modelId="{E279DBEE-53F1-4E6F-9D42-67AC6649107E}">
+      <dsp:nvSpPr>
+        <dsp:cNvPr id="0" name=""/>
+        <dsp:cNvSpPr/>
+      </dsp:nvSpPr>
+      <dsp:spPr>
+        <a:xfrm rot="5146783">
+          <a:off x="4006587" y="3315026"/>
+          <a:ext cx="205900" cy="22847"/>
+        </a:xfrm>
+        <a:custGeom>
+          <a:avLst/>
+          <a:gdLst/>
+          <a:ahLst/>
+          <a:cxnLst/>
+          <a:rect l="0" t="0" r="0" b="0"/>
+          <a:pathLst>
+            <a:path>
+              <a:moveTo>
+                <a:pt x="0" y="11423"/>
+              </a:moveTo>
+              <a:lnTo>
+                <a:pt x="205900" y="11423"/>
+              </a:lnTo>
+            </a:path>
+          </a:pathLst>
+        </a:custGeom>
+        <a:noFill/>
+        <a:ln w="19050" cap="flat" cmpd="sng" algn="ctr">
+          <a:solidFill>
+            <a:schemeClr val="dk1"/>
+          </a:solidFill>
+          <a:prstDash val="solid"/>
+          <a:miter lim="800000"/>
+        </a:ln>
+        <a:effectLst/>
+      </dsp:spPr>
+      <dsp:style>
+        <a:lnRef idx="3">
+          <a:schemeClr val="dk1"/>
+        </a:lnRef>
+        <a:fillRef idx="0">
+          <a:schemeClr val="dk1"/>
+        </a:fillRef>
+        <a:effectRef idx="2">
+          <a:schemeClr val="dk1"/>
+        </a:effectRef>
+        <a:fontRef idx="minor">
+          <a:schemeClr val="tx1"/>
+        </a:fontRef>
+      </dsp:style>
+      <dsp:txBody>
+        <a:bodyPr spcFirstLastPara="0" vert="horz" wrap="square" lIns="12700" tIns="0" rIns="12700" bIns="0" numCol="1" spcCol="1270" anchor="ctr" anchorCtr="0">
+          <a:noAutofit/>
+        </a:bodyPr>
+        <a:lstStyle/>
+        <a:p>
+          <a:pPr lvl="0" algn="ctr" defTabSz="444500">
+            <a:lnSpc>
+              <a:spcPct val="90000"/>
+            </a:lnSpc>
+            <a:spcBef>
+              <a:spcPct val="0"/>
+            </a:spcBef>
+            <a:spcAft>
+              <a:spcPct val="35000"/>
+            </a:spcAft>
+          </a:pPr>
+          <a:endParaRPr lang="de-CH" sz="1000" kern="1200" dirty="0"/>
+        </a:p>
+      </dsp:txBody>
+      <dsp:txXfrm>
+        <a:off x="4104390" y="3223500"/>
+        <a:ext cx="10295" cy="205900"/>
+      </dsp:txXfrm>
+    </dsp:sp>
+    <dsp:sp modelId="{2820D07E-EB23-4218-A66B-9A30725ADF7A}">
+      <dsp:nvSpPr>
+        <dsp:cNvPr id="0" name=""/>
+        <dsp:cNvSpPr/>
+      </dsp:nvSpPr>
+      <dsp:spPr>
+        <a:xfrm>
+          <a:off x="3639231" y="3427722"/>
+          <a:ext cx="1031688" cy="1031688"/>
         </a:xfrm>
         <a:prstGeom prst="ellipse">
           <a:avLst/>
@@ -1809,25 +2984,24 @@
           </a:pPr>
           <a:r>
             <a:rPr lang="de-CH" sz="1200" kern="1200" dirty="0" smtClean="0"/>
-            <a:t>Tankstelle</a:t>
+            <a:t>Tankwart</a:t>
           </a:r>
-          <a:endParaRPr lang="de-CH" sz="1200" kern="1200" dirty="0"/>
         </a:p>
       </dsp:txBody>
       <dsp:txXfrm>
-        <a:off x="3748666" y="2393999"/>
-        <a:ext cx="630667" cy="630667"/>
+        <a:off x="3790318" y="3578809"/>
+        <a:ext cx="729514" cy="729514"/>
       </dsp:txXfrm>
     </dsp:sp>
-    <dsp:sp modelId="{67978505-1397-43C4-BA6B-6D9B5831A906}">
+    <dsp:sp modelId="{F5938934-26F6-4438-84F0-E37598DE5627}">
       <dsp:nvSpPr>
         <dsp:cNvPr id="0" name=""/>
         <dsp:cNvSpPr/>
       </dsp:nvSpPr>
       <dsp:spPr>
-        <a:xfrm rot="16200000">
-          <a:off x="3503765" y="1693273"/>
-          <a:ext cx="1120468" cy="19751"/>
+        <a:xfrm rot="7746473">
+          <a:off x="3310890" y="3301703"/>
+          <a:ext cx="524562" cy="22847"/>
         </a:xfrm>
         <a:custGeom>
           <a:avLst/>
@@ -1838,10 +3012,10 @@
           <a:pathLst>
             <a:path>
               <a:moveTo>
-                <a:pt x="0" y="9875"/>
+                <a:pt x="0" y="11423"/>
               </a:moveTo>
               <a:lnTo>
-                <a:pt x="1120468" y="9875"/>
+                <a:pt x="524562" y="11423"/>
               </a:lnTo>
             </a:path>
           </a:pathLst>
@@ -1894,20 +3068,20 @@
           <a:endParaRPr lang="de-CH" sz="500" kern="1200"/>
         </a:p>
       </dsp:txBody>
-      <dsp:txXfrm>
-        <a:off x="4035988" y="1675137"/>
-        <a:ext cx="56023" cy="56023"/>
+      <dsp:txXfrm rot="10800000">
+        <a:off x="3560057" y="3300013"/>
+        <a:ext cx="26228" cy="26228"/>
       </dsp:txXfrm>
     </dsp:sp>
-    <dsp:sp modelId="{C87C41C2-E937-4321-B9AA-8AD92C412F49}">
+    <dsp:sp modelId="{1643F6E8-A7EB-49BE-AB1F-0F6201B0979C}">
       <dsp:nvSpPr>
         <dsp:cNvPr id="0" name=""/>
         <dsp:cNvSpPr/>
       </dsp:nvSpPr>
       <dsp:spPr>
         <a:xfrm>
-          <a:off x="3618050" y="251016"/>
-          <a:ext cx="891899" cy="891899"/>
+          <a:off x="2566499" y="3401077"/>
+          <a:ext cx="1031688" cy="1031688"/>
         </a:xfrm>
         <a:prstGeom prst="ellipse">
           <a:avLst/>
@@ -1977,12 +3151,12 @@
         </a:fontRef>
       </dsp:style>
       <dsp:txBody>
-        <a:bodyPr spcFirstLastPara="0" vert="horz" wrap="square" lIns="3810" tIns="3810" rIns="3810" bIns="3810" numCol="1" spcCol="1270" anchor="ctr" anchorCtr="0">
+        <a:bodyPr spcFirstLastPara="0" vert="horz" wrap="square" lIns="4445" tIns="4445" rIns="4445" bIns="4445" numCol="1" spcCol="1270" anchor="ctr" anchorCtr="0">
           <a:noAutofit/>
         </a:bodyPr>
         <a:lstStyle/>
         <a:p>
-          <a:pPr lvl="0" algn="ctr" defTabSz="266700">
+          <a:pPr lvl="0" algn="ctr" defTabSz="311150">
             <a:lnSpc>
               <a:spcPct val="90000"/>
             </a:lnSpc>
@@ -1994,25 +3168,25 @@
             </a:spcAft>
           </a:pPr>
           <a:r>
-            <a:rPr lang="de-CH" sz="600" kern="1200" dirty="0" smtClean="0"/>
-            <a:t>Management</a:t>
+            <a:rPr lang="de-CH" sz="700" kern="1200" dirty="0" smtClean="0"/>
+            <a:t>Lieferant</a:t>
           </a:r>
         </a:p>
       </dsp:txBody>
       <dsp:txXfrm>
-        <a:off x="3748666" y="381632"/>
-        <a:ext cx="630667" cy="630667"/>
+        <a:off x="2717586" y="3552164"/>
+        <a:ext cx="729514" cy="729514"/>
       </dsp:txXfrm>
     </dsp:sp>
-    <dsp:sp modelId="{72DA0D22-B4E7-4F48-9038-F63D24794E35}">
+    <dsp:sp modelId="{57A0A247-32B4-470E-A002-3ACC323FF423}">
       <dsp:nvSpPr>
         <dsp:cNvPr id="0" name=""/>
         <dsp:cNvSpPr/>
       </dsp:nvSpPr>
       <dsp:spPr>
-        <a:xfrm rot="18000000">
-          <a:off x="3949307" y="1728397"/>
-          <a:ext cx="1350668" cy="19751"/>
+        <a:xfrm rot="10007302">
+          <a:off x="2888413" y="2893789"/>
+          <a:ext cx="682426" cy="22847"/>
         </a:xfrm>
         <a:custGeom>
           <a:avLst/>
@@ -2023,10 +3197,10 @@
           <a:pathLst>
             <a:path>
               <a:moveTo>
-                <a:pt x="0" y="9875"/>
+                <a:pt x="0" y="11423"/>
               </a:moveTo>
               <a:lnTo>
-                <a:pt x="1350668" y="9875"/>
+                <a:pt x="682426" y="11423"/>
               </a:lnTo>
             </a:path>
           </a:pathLst>
@@ -2079,20 +3253,20 @@
           <a:endParaRPr lang="de-CH" sz="500" kern="1200"/>
         </a:p>
       </dsp:txBody>
-      <dsp:txXfrm>
-        <a:off x="4590875" y="1704506"/>
-        <a:ext cx="67533" cy="67533"/>
+      <dsp:txXfrm rot="10800000">
+        <a:off x="3212565" y="2888152"/>
+        <a:ext cx="34121" cy="34121"/>
       </dsp:txXfrm>
     </dsp:sp>
-    <dsp:sp modelId="{13328FA8-9A7E-4E77-B510-EBB989FD0427}">
+    <dsp:sp modelId="{36731F56-C670-4217-8319-F8EDAC9AED3D}">
       <dsp:nvSpPr>
         <dsp:cNvPr id="0" name=""/>
         <dsp:cNvSpPr/>
       </dsp:nvSpPr>
       <dsp:spPr>
         <a:xfrm>
-          <a:off x="4739334" y="321263"/>
-          <a:ext cx="891899" cy="891899"/>
+          <a:off x="1879408" y="2585247"/>
+          <a:ext cx="1031688" cy="1031688"/>
         </a:xfrm>
         <a:prstGeom prst="ellipse">
           <a:avLst/>
@@ -2162,12 +3336,12 @@
         </a:fontRef>
       </dsp:style>
       <dsp:txBody>
-        <a:bodyPr spcFirstLastPara="0" vert="horz" wrap="square" lIns="3810" tIns="3810" rIns="3810" bIns="3810" numCol="1" spcCol="1270" anchor="ctr" anchorCtr="0">
+        <a:bodyPr spcFirstLastPara="0" vert="horz" wrap="square" lIns="4445" tIns="4445" rIns="4445" bIns="4445" numCol="1" spcCol="1270" anchor="ctr" anchorCtr="0">
           <a:noAutofit/>
         </a:bodyPr>
         <a:lstStyle/>
         <a:p>
-          <a:pPr lvl="0" algn="ctr" defTabSz="266700">
+          <a:pPr lvl="0" algn="ctr" defTabSz="311150">
             <a:lnSpc>
               <a:spcPct val="90000"/>
             </a:lnSpc>
@@ -2179,25 +3353,25 @@
             </a:spcAft>
           </a:pPr>
           <a:r>
-            <a:rPr lang="de-CH" sz="600" kern="1200" dirty="0" smtClean="0"/>
-            <a:t>Inhaber</a:t>
+            <a:rPr lang="de-CH" sz="700" kern="1200" dirty="0" smtClean="0"/>
+            <a:t>Zahlungsstelle</a:t>
           </a:r>
         </a:p>
       </dsp:txBody>
       <dsp:txXfrm>
-        <a:off x="4869950" y="451879"/>
-        <a:ext cx="630667" cy="630667"/>
+        <a:off x="2030495" y="2736334"/>
+        <a:ext cx="729514" cy="729514"/>
       </dsp:txXfrm>
     </dsp:sp>
-    <dsp:sp modelId="{E89745EC-7C9C-4B3A-BDDE-4FED14C3FE0B}">
+    <dsp:sp modelId="{2419DFE4-9B14-401E-A90E-EF438F2786C7}">
       <dsp:nvSpPr>
         <dsp:cNvPr id="0" name=""/>
         <dsp:cNvSpPr/>
       </dsp:nvSpPr>
       <dsp:spPr>
-        <a:xfrm rot="19496052">
-          <a:off x="4338246" y="2155974"/>
-          <a:ext cx="1000065" cy="19751"/>
+        <a:xfrm rot="12328546">
+          <a:off x="3134157" y="2371105"/>
+          <a:ext cx="487873" cy="22847"/>
         </a:xfrm>
         <a:custGeom>
           <a:avLst/>
@@ -2208,10 +3382,10 @@
           <a:pathLst>
             <a:path>
               <a:moveTo>
-                <a:pt x="0" y="9875"/>
+                <a:pt x="0" y="11423"/>
               </a:moveTo>
               <a:lnTo>
-                <a:pt x="1000065" y="9875"/>
+                <a:pt x="487873" y="11423"/>
               </a:lnTo>
             </a:path>
           </a:pathLst>
@@ -2264,20 +3438,20 @@
           <a:endParaRPr lang="de-CH" sz="500" kern="1200"/>
         </a:p>
       </dsp:txBody>
-      <dsp:txXfrm>
-        <a:off x="4813277" y="2140849"/>
-        <a:ext cx="50003" cy="50003"/>
+      <dsp:txXfrm rot="10800000">
+        <a:off x="3365897" y="2370332"/>
+        <a:ext cx="24393" cy="24393"/>
       </dsp:txXfrm>
     </dsp:sp>
-    <dsp:sp modelId="{1E2E3932-484B-4D4E-B189-A5E9A6B9B96E}">
+    <dsp:sp modelId="{C27A88B3-4722-46D0-A005-01966C4A79EB}">
       <dsp:nvSpPr>
         <dsp:cNvPr id="0" name=""/>
         <dsp:cNvSpPr/>
       </dsp:nvSpPr>
       <dsp:spPr>
         <a:xfrm>
-          <a:off x="5166609" y="1176418"/>
-          <a:ext cx="891899" cy="891899"/>
+          <a:off x="2176344" y="1539880"/>
+          <a:ext cx="1031688" cy="1031688"/>
         </a:xfrm>
         <a:prstGeom prst="ellipse">
           <a:avLst/>
@@ -2347,12 +3521,12 @@
         </a:fontRef>
       </dsp:style>
       <dsp:txBody>
-        <a:bodyPr spcFirstLastPara="0" vert="horz" wrap="square" lIns="3810" tIns="3810" rIns="3810" bIns="3810" numCol="1" spcCol="1270" anchor="ctr" anchorCtr="0">
+        <a:bodyPr spcFirstLastPara="0" vert="horz" wrap="square" lIns="4445" tIns="4445" rIns="4445" bIns="4445" numCol="1" spcCol="1270" anchor="ctr" anchorCtr="0">
           <a:noAutofit/>
         </a:bodyPr>
         <a:lstStyle/>
         <a:p>
-          <a:pPr lvl="0" algn="ctr" defTabSz="266700">
+          <a:pPr lvl="0" algn="ctr" defTabSz="311150">
             <a:lnSpc>
               <a:spcPct val="90000"/>
             </a:lnSpc>
@@ -2364,25 +3538,26 @@
             </a:spcAft>
           </a:pPr>
           <a:r>
-            <a:rPr lang="de-CH" sz="600" kern="1200" dirty="0" smtClean="0"/>
-            <a:t>Buchhaltung</a:t>
+            <a:rPr lang="de-CH" sz="700" kern="1200" dirty="0" smtClean="0"/>
+            <a:t>Angestellte</a:t>
           </a:r>
+          <a:endParaRPr lang="de-CH" sz="700" kern="1200" dirty="0"/>
         </a:p>
       </dsp:txBody>
       <dsp:txXfrm>
-        <a:off x="5297225" y="1307034"/>
-        <a:ext cx="630667" cy="630667"/>
+        <a:off x="2327431" y="1690967"/>
+        <a:ext cx="729514" cy="729514"/>
       </dsp:txXfrm>
     </dsp:sp>
-    <dsp:sp modelId="{04003D1F-A720-4ED6-BF63-F06E487ED93B}">
+    <dsp:sp modelId="{07D48153-ADA1-4540-9842-4665B49EFAED}">
       <dsp:nvSpPr>
         <dsp:cNvPr id="0" name=""/>
         <dsp:cNvSpPr/>
       </dsp:nvSpPr>
       <dsp:spPr>
-        <a:xfrm rot="21269232">
-          <a:off x="4506010" y="2617640"/>
-          <a:ext cx="811420" cy="19751"/>
+        <a:xfrm rot="14559847">
+          <a:off x="3311475" y="1925756"/>
+          <a:ext cx="706748" cy="22847"/>
         </a:xfrm>
         <a:custGeom>
           <a:avLst/>
@@ -2393,10 +3568,10 @@
           <a:pathLst>
             <a:path>
               <a:moveTo>
-                <a:pt x="0" y="9875"/>
+                <a:pt x="0" y="11423"/>
               </a:moveTo>
               <a:lnTo>
-                <a:pt x="811420" y="9875"/>
+                <a:pt x="706748" y="11423"/>
               </a:lnTo>
             </a:path>
           </a:pathLst>
@@ -2449,20 +3624,20 @@
           <a:endParaRPr lang="de-CH" sz="500" kern="1200"/>
         </a:p>
       </dsp:txBody>
-      <dsp:txXfrm>
-        <a:off x="4891435" y="2607230"/>
-        <a:ext cx="40571" cy="40571"/>
+      <dsp:txXfrm rot="10800000">
+        <a:off x="3647180" y="1919512"/>
+        <a:ext cx="35337" cy="35337"/>
       </dsp:txXfrm>
     </dsp:sp>
-    <dsp:sp modelId="{396D1756-1806-4E60-8EFB-AE6607BF146E}">
+    <dsp:sp modelId="{56AB0F57-412B-4437-8190-87BB72D5D7E1}">
       <dsp:nvSpPr>
         <dsp:cNvPr id="0" name=""/>
         <dsp:cNvSpPr/>
       </dsp:nvSpPr>
       <dsp:spPr>
         <a:xfrm>
-          <a:off x="5313491" y="2099749"/>
-          <a:ext cx="891899" cy="891899"/>
+          <a:off x="2749854" y="649183"/>
+          <a:ext cx="1031688" cy="1031688"/>
         </a:xfrm>
         <a:prstGeom prst="ellipse">
           <a:avLst/>
@@ -2532,12 +3707,12 @@
         </a:fontRef>
       </dsp:style>
       <dsp:txBody>
-        <a:bodyPr spcFirstLastPara="0" vert="horz" wrap="square" lIns="3810" tIns="3810" rIns="3810" bIns="3810" numCol="1" spcCol="1270" anchor="ctr" anchorCtr="0">
+        <a:bodyPr spcFirstLastPara="0" vert="horz" wrap="square" lIns="4445" tIns="4445" rIns="4445" bIns="4445" numCol="1" spcCol="1270" anchor="ctr" anchorCtr="0">
           <a:noAutofit/>
         </a:bodyPr>
         <a:lstStyle/>
         <a:p>
-          <a:pPr lvl="0" algn="ctr" defTabSz="266700">
+          <a:pPr lvl="0" algn="ctr" defTabSz="311150">
             <a:lnSpc>
               <a:spcPct val="90000"/>
             </a:lnSpc>
@@ -2549,1498 +3724,15 @@
             </a:spcAft>
           </a:pPr>
           <a:r>
-            <a:rPr lang="de-CH" sz="600" kern="1200" dirty="0" smtClean="0"/>
-            <a:t>Personalabteilung</a:t>
+            <a:rPr lang="de-CH" sz="700" kern="1200" dirty="0" smtClean="0"/>
+            <a:t>Angehörige der Angestellten</a:t>
           </a:r>
+          <a:endParaRPr lang="de-CH" sz="700" kern="1200" dirty="0"/>
         </a:p>
       </dsp:txBody>
       <dsp:txXfrm>
-        <a:off x="5444107" y="2230365"/>
-        <a:ext cx="630667" cy="630667"/>
-      </dsp:txXfrm>
-    </dsp:sp>
-    <dsp:sp modelId="{FF73F48E-DBE3-491E-BBD8-817DF2781EF5}">
-      <dsp:nvSpPr>
-        <dsp:cNvPr id="0" name=""/>
-        <dsp:cNvSpPr/>
-      </dsp:nvSpPr>
-      <dsp:spPr>
-        <a:xfrm rot="1532061">
-          <a:off x="4414644" y="3120057"/>
-          <a:ext cx="1059605" cy="19751"/>
-        </a:xfrm>
-        <a:custGeom>
-          <a:avLst/>
-          <a:gdLst/>
-          <a:ahLst/>
-          <a:cxnLst/>
-          <a:rect l="0" t="0" r="0" b="0"/>
-          <a:pathLst>
-            <a:path>
-              <a:moveTo>
-                <a:pt x="0" y="9875"/>
-              </a:moveTo>
-              <a:lnTo>
-                <a:pt x="1059605" y="9875"/>
-              </a:lnTo>
-            </a:path>
-          </a:pathLst>
-        </a:custGeom>
-        <a:noFill/>
-        <a:ln w="12700" cap="flat" cmpd="sng" algn="ctr">
-          <a:solidFill>
-            <a:schemeClr val="accent3">
-              <a:shade val="60000"/>
-              <a:hueOff val="0"/>
-              <a:satOff val="0"/>
-              <a:lumOff val="0"/>
-              <a:alphaOff val="0"/>
-            </a:schemeClr>
-          </a:solidFill>
-          <a:prstDash val="solid"/>
-          <a:miter lim="800000"/>
-        </a:ln>
-        <a:effectLst/>
-      </dsp:spPr>
-      <dsp:style>
-        <a:lnRef idx="2">
-          <a:scrgbClr r="0" g="0" b="0"/>
-        </a:lnRef>
-        <a:fillRef idx="0">
-          <a:scrgbClr r="0" g="0" b="0"/>
-        </a:fillRef>
-        <a:effectRef idx="0">
-          <a:scrgbClr r="0" g="0" b="0"/>
-        </a:effectRef>
-        <a:fontRef idx="minor"/>
-      </dsp:style>
-      <dsp:txBody>
-        <a:bodyPr spcFirstLastPara="0" vert="horz" wrap="square" lIns="12700" tIns="0" rIns="12700" bIns="0" numCol="1" spcCol="1270" anchor="ctr" anchorCtr="0">
-          <a:noAutofit/>
-        </a:bodyPr>
-        <a:lstStyle/>
-        <a:p>
-          <a:pPr lvl="0" algn="ctr" defTabSz="222250">
-            <a:lnSpc>
-              <a:spcPct val="90000"/>
-            </a:lnSpc>
-            <a:spcBef>
-              <a:spcPct val="0"/>
-            </a:spcBef>
-            <a:spcAft>
-              <a:spcPct val="35000"/>
-            </a:spcAft>
-          </a:pPr>
-          <a:endParaRPr lang="de-CH" sz="500" kern="1200"/>
-        </a:p>
-      </dsp:txBody>
-      <dsp:txXfrm>
-        <a:off x="4917957" y="3103443"/>
-        <a:ext cx="52980" cy="52980"/>
-      </dsp:txXfrm>
-    </dsp:sp>
-    <dsp:sp modelId="{E9003DBF-681F-46D8-AC9A-B2AD218C89BD}">
-      <dsp:nvSpPr>
-        <dsp:cNvPr id="0" name=""/>
-        <dsp:cNvSpPr/>
-      </dsp:nvSpPr>
-      <dsp:spPr>
-        <a:xfrm>
-          <a:off x="5378945" y="3104584"/>
-          <a:ext cx="891899" cy="891899"/>
-        </a:xfrm>
-        <a:prstGeom prst="ellipse">
-          <a:avLst/>
-        </a:prstGeom>
-        <a:gradFill rotWithShape="0">
-          <a:gsLst>
-            <a:gs pos="0">
-              <a:schemeClr val="accent3">
-                <a:hueOff val="0"/>
-                <a:satOff val="0"/>
-                <a:lumOff val="0"/>
-                <a:alphaOff val="0"/>
-                <a:lumMod val="110000"/>
-                <a:satMod val="105000"/>
-                <a:tint val="67000"/>
-              </a:schemeClr>
-            </a:gs>
-            <a:gs pos="50000">
-              <a:schemeClr val="accent3">
-                <a:hueOff val="0"/>
-                <a:satOff val="0"/>
-                <a:lumOff val="0"/>
-                <a:alphaOff val="0"/>
-                <a:lumMod val="105000"/>
-                <a:satMod val="103000"/>
-                <a:tint val="73000"/>
-              </a:schemeClr>
-            </a:gs>
-            <a:gs pos="100000">
-              <a:schemeClr val="accent3">
-                <a:hueOff val="0"/>
-                <a:satOff val="0"/>
-                <a:lumOff val="0"/>
-                <a:alphaOff val="0"/>
-                <a:lumMod val="105000"/>
-                <a:satMod val="109000"/>
-                <a:tint val="81000"/>
-              </a:schemeClr>
-            </a:gs>
-          </a:gsLst>
-          <a:lin ang="5400000" scaled="0"/>
-        </a:gradFill>
-        <a:ln>
-          <a:noFill/>
-        </a:ln>
-        <a:effectLst/>
-        <a:scene3d>
-          <a:camera prst="orthographicFront"/>
-          <a:lightRig rig="flat" dir="t"/>
-        </a:scene3d>
-        <a:sp3d prstMaterial="dkEdge">
-          <a:bevelT w="8200" h="38100"/>
-        </a:sp3d>
-      </dsp:spPr>
-      <dsp:style>
-        <a:lnRef idx="0">
-          <a:scrgbClr r="0" g="0" b="0"/>
-        </a:lnRef>
-        <a:fillRef idx="2">
-          <a:scrgbClr r="0" g="0" b="0"/>
-        </a:fillRef>
-        <a:effectRef idx="1">
-          <a:scrgbClr r="0" g="0" b="0"/>
-        </a:effectRef>
-        <a:fontRef idx="minor">
-          <a:schemeClr val="dk1"/>
-        </a:fontRef>
-      </dsp:style>
-      <dsp:txBody>
-        <a:bodyPr spcFirstLastPara="0" vert="horz" wrap="square" lIns="3810" tIns="3810" rIns="3810" bIns="3810" numCol="1" spcCol="1270" anchor="ctr" anchorCtr="0">
-          <a:noAutofit/>
-        </a:bodyPr>
-        <a:lstStyle/>
-        <a:p>
-          <a:pPr lvl="0" algn="ctr" defTabSz="266700">
-            <a:lnSpc>
-              <a:spcPct val="90000"/>
-            </a:lnSpc>
-            <a:spcBef>
-              <a:spcPct val="0"/>
-            </a:spcBef>
-            <a:spcAft>
-              <a:spcPct val="35000"/>
-            </a:spcAft>
-          </a:pPr>
-          <a:r>
-            <a:rPr lang="de-CH" sz="600" kern="1200" dirty="0" smtClean="0"/>
-            <a:t>Fahrzeugabteilung</a:t>
-          </a:r>
-        </a:p>
-      </dsp:txBody>
-      <dsp:txXfrm>
-        <a:off x="5509561" y="3235200"/>
-        <a:ext cx="630667" cy="630667"/>
-      </dsp:txXfrm>
-    </dsp:sp>
-    <dsp:sp modelId="{E279DBEE-53F1-4E6F-9D42-67AC6649107E}">
-      <dsp:nvSpPr>
-        <dsp:cNvPr id="0" name=""/>
-        <dsp:cNvSpPr/>
-      </dsp:nvSpPr>
-      <dsp:spPr>
-        <a:xfrm rot="3485790">
-          <a:off x="4205483" y="3247638"/>
-          <a:ext cx="399550" cy="19751"/>
-        </a:xfrm>
-        <a:custGeom>
-          <a:avLst/>
-          <a:gdLst/>
-          <a:ahLst/>
-          <a:cxnLst/>
-          <a:rect l="0" t="0" r="0" b="0"/>
-          <a:pathLst>
-            <a:path>
-              <a:moveTo>
-                <a:pt x="0" y="9875"/>
-              </a:moveTo>
-              <a:lnTo>
-                <a:pt x="399550" y="9875"/>
-              </a:lnTo>
-            </a:path>
-          </a:pathLst>
-        </a:custGeom>
-        <a:noFill/>
-        <a:ln w="12700" cap="flat" cmpd="sng" algn="ctr">
-          <a:solidFill>
-            <a:schemeClr val="accent3">
-              <a:shade val="60000"/>
-              <a:hueOff val="0"/>
-              <a:satOff val="0"/>
-              <a:lumOff val="0"/>
-              <a:alphaOff val="0"/>
-            </a:schemeClr>
-          </a:solidFill>
-          <a:prstDash val="solid"/>
-          <a:miter lim="800000"/>
-        </a:ln>
-        <a:effectLst/>
-      </dsp:spPr>
-      <dsp:style>
-        <a:lnRef idx="2">
-          <a:scrgbClr r="0" g="0" b="0"/>
-        </a:lnRef>
-        <a:fillRef idx="0">
-          <a:scrgbClr r="0" g="0" b="0"/>
-        </a:fillRef>
-        <a:effectRef idx="0">
-          <a:scrgbClr r="0" g="0" b="0"/>
-        </a:effectRef>
-        <a:fontRef idx="minor"/>
-      </dsp:style>
-      <dsp:txBody>
-        <a:bodyPr spcFirstLastPara="0" vert="horz" wrap="square" lIns="12700" tIns="0" rIns="12700" bIns="0" numCol="1" spcCol="1270" anchor="ctr" anchorCtr="0">
-          <a:noAutofit/>
-        </a:bodyPr>
-        <a:lstStyle/>
-        <a:p>
-          <a:pPr lvl="0" algn="ctr" defTabSz="222250">
-            <a:lnSpc>
-              <a:spcPct val="90000"/>
-            </a:lnSpc>
-            <a:spcBef>
-              <a:spcPct val="0"/>
-            </a:spcBef>
-            <a:spcAft>
-              <a:spcPct val="35000"/>
-            </a:spcAft>
-          </a:pPr>
-          <a:endParaRPr lang="de-CH" sz="500" kern="1200"/>
-        </a:p>
-      </dsp:txBody>
-      <dsp:txXfrm>
-        <a:off x="4395270" y="3247526"/>
-        <a:ext cx="19977" cy="19977"/>
-      </dsp:txXfrm>
-    </dsp:sp>
-    <dsp:sp modelId="{2820D07E-EB23-4218-A66B-9A30725ADF7A}">
-      <dsp:nvSpPr>
-        <dsp:cNvPr id="0" name=""/>
-        <dsp:cNvSpPr/>
-      </dsp:nvSpPr>
-      <dsp:spPr>
-        <a:xfrm>
-          <a:off x="4300568" y="3359746"/>
-          <a:ext cx="891899" cy="891899"/>
-        </a:xfrm>
-        <a:prstGeom prst="ellipse">
-          <a:avLst/>
-        </a:prstGeom>
-        <a:gradFill rotWithShape="0">
-          <a:gsLst>
-            <a:gs pos="0">
-              <a:schemeClr val="accent3">
-                <a:hueOff val="0"/>
-                <a:satOff val="0"/>
-                <a:lumOff val="0"/>
-                <a:alphaOff val="0"/>
-                <a:lumMod val="110000"/>
-                <a:satMod val="105000"/>
-                <a:tint val="67000"/>
-              </a:schemeClr>
-            </a:gs>
-            <a:gs pos="50000">
-              <a:schemeClr val="accent3">
-                <a:hueOff val="0"/>
-                <a:satOff val="0"/>
-                <a:lumOff val="0"/>
-                <a:alphaOff val="0"/>
-                <a:lumMod val="105000"/>
-                <a:satMod val="103000"/>
-                <a:tint val="73000"/>
-              </a:schemeClr>
-            </a:gs>
-            <a:gs pos="100000">
-              <a:schemeClr val="accent3">
-                <a:hueOff val="0"/>
-                <a:satOff val="0"/>
-                <a:lumOff val="0"/>
-                <a:alphaOff val="0"/>
-                <a:lumMod val="105000"/>
-                <a:satMod val="109000"/>
-                <a:tint val="81000"/>
-              </a:schemeClr>
-            </a:gs>
-          </a:gsLst>
-          <a:lin ang="5400000" scaled="0"/>
-        </a:gradFill>
-        <a:ln>
-          <a:noFill/>
-        </a:ln>
-        <a:effectLst/>
-        <a:scene3d>
-          <a:camera prst="orthographicFront"/>
-          <a:lightRig rig="flat" dir="t"/>
-        </a:scene3d>
-        <a:sp3d prstMaterial="dkEdge">
-          <a:bevelT w="8200" h="38100"/>
-        </a:sp3d>
-      </dsp:spPr>
-      <dsp:style>
-        <a:lnRef idx="0">
-          <a:scrgbClr r="0" g="0" b="0"/>
-        </a:lnRef>
-        <a:fillRef idx="2">
-          <a:scrgbClr r="0" g="0" b="0"/>
-        </a:fillRef>
-        <a:effectRef idx="1">
-          <a:scrgbClr r="0" g="0" b="0"/>
-        </a:effectRef>
-        <a:fontRef idx="minor">
-          <a:schemeClr val="dk1"/>
-        </a:fontRef>
-      </dsp:style>
-      <dsp:txBody>
-        <a:bodyPr spcFirstLastPara="0" vert="horz" wrap="square" lIns="3810" tIns="3810" rIns="3810" bIns="3810" numCol="1" spcCol="1270" anchor="ctr" anchorCtr="0">
-          <a:noAutofit/>
-        </a:bodyPr>
-        <a:lstStyle/>
-        <a:p>
-          <a:pPr lvl="0" algn="ctr" defTabSz="266700">
-            <a:lnSpc>
-              <a:spcPct val="90000"/>
-            </a:lnSpc>
-            <a:spcBef>
-              <a:spcPct val="0"/>
-            </a:spcBef>
-            <a:spcAft>
-              <a:spcPct val="35000"/>
-            </a:spcAft>
-          </a:pPr>
-          <a:r>
-            <a:rPr lang="de-CH" sz="600" kern="1200" dirty="0" smtClean="0"/>
-            <a:t>Tankwart</a:t>
-          </a:r>
-        </a:p>
-      </dsp:txBody>
-      <dsp:txXfrm>
-        <a:off x="4431184" y="3490362"/>
-        <a:ext cx="630667" cy="630667"/>
-      </dsp:txXfrm>
-    </dsp:sp>
-    <dsp:sp modelId="{F5938934-26F6-4438-84F0-E37598DE5627}">
-      <dsp:nvSpPr>
-        <dsp:cNvPr id="0" name=""/>
-        <dsp:cNvSpPr/>
-      </dsp:nvSpPr>
-      <dsp:spPr>
-        <a:xfrm rot="5643405">
-          <a:off x="3597787" y="3549218"/>
-          <a:ext cx="811891" cy="19751"/>
-        </a:xfrm>
-        <a:custGeom>
-          <a:avLst/>
-          <a:gdLst/>
-          <a:ahLst/>
-          <a:cxnLst/>
-          <a:rect l="0" t="0" r="0" b="0"/>
-          <a:pathLst>
-            <a:path>
-              <a:moveTo>
-                <a:pt x="0" y="9875"/>
-              </a:moveTo>
-              <a:lnTo>
-                <a:pt x="811891" y="9875"/>
-              </a:lnTo>
-            </a:path>
-          </a:pathLst>
-        </a:custGeom>
-        <a:noFill/>
-        <a:ln w="12700" cap="flat" cmpd="sng" algn="ctr">
-          <a:solidFill>
-            <a:schemeClr val="accent3">
-              <a:shade val="60000"/>
-              <a:hueOff val="0"/>
-              <a:satOff val="0"/>
-              <a:lumOff val="0"/>
-              <a:alphaOff val="0"/>
-            </a:schemeClr>
-          </a:solidFill>
-          <a:prstDash val="solid"/>
-          <a:miter lim="800000"/>
-        </a:ln>
-        <a:effectLst/>
-      </dsp:spPr>
-      <dsp:style>
-        <a:lnRef idx="2">
-          <a:scrgbClr r="0" g="0" b="0"/>
-        </a:lnRef>
-        <a:fillRef idx="0">
-          <a:scrgbClr r="0" g="0" b="0"/>
-        </a:fillRef>
-        <a:effectRef idx="0">
-          <a:scrgbClr r="0" g="0" b="0"/>
-        </a:effectRef>
-        <a:fontRef idx="minor"/>
-      </dsp:style>
-      <dsp:txBody>
-        <a:bodyPr spcFirstLastPara="0" vert="horz" wrap="square" lIns="12700" tIns="0" rIns="12700" bIns="0" numCol="1" spcCol="1270" anchor="ctr" anchorCtr="0">
-          <a:noAutofit/>
-        </a:bodyPr>
-        <a:lstStyle/>
-        <a:p>
-          <a:pPr lvl="0" algn="ctr" defTabSz="222250">
-            <a:lnSpc>
-              <a:spcPct val="90000"/>
-            </a:lnSpc>
-            <a:spcBef>
-              <a:spcPct val="0"/>
-            </a:spcBef>
-            <a:spcAft>
-              <a:spcPct val="35000"/>
-            </a:spcAft>
-          </a:pPr>
-          <a:endParaRPr lang="de-CH" sz="500" kern="1200"/>
-        </a:p>
-      </dsp:txBody>
-      <dsp:txXfrm rot="10800000">
-        <a:off x="3983435" y="3538797"/>
-        <a:ext cx="40594" cy="40594"/>
-      </dsp:txXfrm>
-    </dsp:sp>
-    <dsp:sp modelId="{1643F6E8-A7EB-49BE-AB1F-0F6201B0979C}">
-      <dsp:nvSpPr>
-        <dsp:cNvPr id="0" name=""/>
-        <dsp:cNvSpPr/>
-      </dsp:nvSpPr>
-      <dsp:spPr>
-        <a:xfrm>
-          <a:off x="3497516" y="3962905"/>
-          <a:ext cx="891899" cy="891899"/>
-        </a:xfrm>
-        <a:prstGeom prst="ellipse">
-          <a:avLst/>
-        </a:prstGeom>
-        <a:gradFill rotWithShape="0">
-          <a:gsLst>
-            <a:gs pos="0">
-              <a:schemeClr val="accent3">
-                <a:hueOff val="0"/>
-                <a:satOff val="0"/>
-                <a:lumOff val="0"/>
-                <a:alphaOff val="0"/>
-                <a:lumMod val="110000"/>
-                <a:satMod val="105000"/>
-                <a:tint val="67000"/>
-              </a:schemeClr>
-            </a:gs>
-            <a:gs pos="50000">
-              <a:schemeClr val="accent3">
-                <a:hueOff val="0"/>
-                <a:satOff val="0"/>
-                <a:lumOff val="0"/>
-                <a:alphaOff val="0"/>
-                <a:lumMod val="105000"/>
-                <a:satMod val="103000"/>
-                <a:tint val="73000"/>
-              </a:schemeClr>
-            </a:gs>
-            <a:gs pos="100000">
-              <a:schemeClr val="accent3">
-                <a:hueOff val="0"/>
-                <a:satOff val="0"/>
-                <a:lumOff val="0"/>
-                <a:alphaOff val="0"/>
-                <a:lumMod val="105000"/>
-                <a:satMod val="109000"/>
-                <a:tint val="81000"/>
-              </a:schemeClr>
-            </a:gs>
-          </a:gsLst>
-          <a:lin ang="5400000" scaled="0"/>
-        </a:gradFill>
-        <a:ln>
-          <a:noFill/>
-        </a:ln>
-        <a:effectLst/>
-        <a:scene3d>
-          <a:camera prst="orthographicFront"/>
-          <a:lightRig rig="flat" dir="t"/>
-        </a:scene3d>
-        <a:sp3d prstMaterial="dkEdge">
-          <a:bevelT w="8200" h="38100"/>
-        </a:sp3d>
-      </dsp:spPr>
-      <dsp:style>
-        <a:lnRef idx="0">
-          <a:scrgbClr r="0" g="0" b="0"/>
-        </a:lnRef>
-        <a:fillRef idx="2">
-          <a:scrgbClr r="0" g="0" b="0"/>
-        </a:fillRef>
-        <a:effectRef idx="1">
-          <a:scrgbClr r="0" g="0" b="0"/>
-        </a:effectRef>
-        <a:fontRef idx="minor">
-          <a:schemeClr val="dk1"/>
-        </a:fontRef>
-      </dsp:style>
-      <dsp:txBody>
-        <a:bodyPr spcFirstLastPara="0" vert="horz" wrap="square" lIns="3810" tIns="3810" rIns="3810" bIns="3810" numCol="1" spcCol="1270" anchor="ctr" anchorCtr="0">
-          <a:noAutofit/>
-        </a:bodyPr>
-        <a:lstStyle/>
-        <a:p>
-          <a:pPr lvl="0" algn="ctr" defTabSz="266700">
-            <a:lnSpc>
-              <a:spcPct val="90000"/>
-            </a:lnSpc>
-            <a:spcBef>
-              <a:spcPct val="0"/>
-            </a:spcBef>
-            <a:spcAft>
-              <a:spcPct val="35000"/>
-            </a:spcAft>
-          </a:pPr>
-          <a:r>
-            <a:rPr lang="de-CH" sz="600" kern="1200" dirty="0" smtClean="0"/>
-            <a:t>Lieferant</a:t>
-          </a:r>
-        </a:p>
-      </dsp:txBody>
-      <dsp:txXfrm>
-        <a:off x="3628132" y="4093521"/>
-        <a:ext cx="630667" cy="630667"/>
-      </dsp:txXfrm>
-    </dsp:sp>
-    <dsp:sp modelId="{57A0A247-32B4-470E-A002-3ACC323FF423}">
-      <dsp:nvSpPr>
-        <dsp:cNvPr id="0" name=""/>
-        <dsp:cNvSpPr/>
-      </dsp:nvSpPr>
-      <dsp:spPr>
-        <a:xfrm rot="7501050">
-          <a:off x="3138596" y="3413072"/>
-          <a:ext cx="850800" cy="19751"/>
-        </a:xfrm>
-        <a:custGeom>
-          <a:avLst/>
-          <a:gdLst/>
-          <a:ahLst/>
-          <a:cxnLst/>
-          <a:rect l="0" t="0" r="0" b="0"/>
-          <a:pathLst>
-            <a:path>
-              <a:moveTo>
-                <a:pt x="0" y="9875"/>
-              </a:moveTo>
-              <a:lnTo>
-                <a:pt x="850800" y="9875"/>
-              </a:lnTo>
-            </a:path>
-          </a:pathLst>
-        </a:custGeom>
-        <a:noFill/>
-        <a:ln w="12700" cap="flat" cmpd="sng" algn="ctr">
-          <a:solidFill>
-            <a:schemeClr val="accent3">
-              <a:shade val="60000"/>
-              <a:hueOff val="0"/>
-              <a:satOff val="0"/>
-              <a:lumOff val="0"/>
-              <a:alphaOff val="0"/>
-            </a:schemeClr>
-          </a:solidFill>
-          <a:prstDash val="solid"/>
-          <a:miter lim="800000"/>
-        </a:ln>
-        <a:effectLst/>
-      </dsp:spPr>
-      <dsp:style>
-        <a:lnRef idx="2">
-          <a:scrgbClr r="0" g="0" b="0"/>
-        </a:lnRef>
-        <a:fillRef idx="0">
-          <a:scrgbClr r="0" g="0" b="0"/>
-        </a:fillRef>
-        <a:effectRef idx="0">
-          <a:scrgbClr r="0" g="0" b="0"/>
-        </a:effectRef>
-        <a:fontRef idx="minor"/>
-      </dsp:style>
-      <dsp:txBody>
-        <a:bodyPr spcFirstLastPara="0" vert="horz" wrap="square" lIns="12700" tIns="0" rIns="12700" bIns="0" numCol="1" spcCol="1270" anchor="ctr" anchorCtr="0">
-          <a:noAutofit/>
-        </a:bodyPr>
-        <a:lstStyle/>
-        <a:p>
-          <a:pPr lvl="0" algn="ctr" defTabSz="222250">
-            <a:lnSpc>
-              <a:spcPct val="90000"/>
-            </a:lnSpc>
-            <a:spcBef>
-              <a:spcPct val="0"/>
-            </a:spcBef>
-            <a:spcAft>
-              <a:spcPct val="35000"/>
-            </a:spcAft>
-          </a:pPr>
-          <a:endParaRPr lang="de-CH" sz="500" kern="1200"/>
-        </a:p>
-      </dsp:txBody>
-      <dsp:txXfrm rot="10800000">
-        <a:off x="3542726" y="3401678"/>
-        <a:ext cx="42540" cy="42540"/>
-      </dsp:txXfrm>
-    </dsp:sp>
-    <dsp:sp modelId="{36731F56-C670-4217-8319-F8EDAC9AED3D}">
-      <dsp:nvSpPr>
-        <dsp:cNvPr id="0" name=""/>
-        <dsp:cNvSpPr/>
-      </dsp:nvSpPr>
-      <dsp:spPr>
-        <a:xfrm>
-          <a:off x="2618043" y="3690614"/>
-          <a:ext cx="891899" cy="891899"/>
-        </a:xfrm>
-        <a:prstGeom prst="ellipse">
-          <a:avLst/>
-        </a:prstGeom>
-        <a:gradFill rotWithShape="0">
-          <a:gsLst>
-            <a:gs pos="0">
-              <a:schemeClr val="accent3">
-                <a:hueOff val="0"/>
-                <a:satOff val="0"/>
-                <a:lumOff val="0"/>
-                <a:alphaOff val="0"/>
-                <a:lumMod val="110000"/>
-                <a:satMod val="105000"/>
-                <a:tint val="67000"/>
-              </a:schemeClr>
-            </a:gs>
-            <a:gs pos="50000">
-              <a:schemeClr val="accent3">
-                <a:hueOff val="0"/>
-                <a:satOff val="0"/>
-                <a:lumOff val="0"/>
-                <a:alphaOff val="0"/>
-                <a:lumMod val="105000"/>
-                <a:satMod val="103000"/>
-                <a:tint val="73000"/>
-              </a:schemeClr>
-            </a:gs>
-            <a:gs pos="100000">
-              <a:schemeClr val="accent3">
-                <a:hueOff val="0"/>
-                <a:satOff val="0"/>
-                <a:lumOff val="0"/>
-                <a:alphaOff val="0"/>
-                <a:lumMod val="105000"/>
-                <a:satMod val="109000"/>
-                <a:tint val="81000"/>
-              </a:schemeClr>
-            </a:gs>
-          </a:gsLst>
-          <a:lin ang="5400000" scaled="0"/>
-        </a:gradFill>
-        <a:ln>
-          <a:noFill/>
-        </a:ln>
-        <a:effectLst/>
-        <a:scene3d>
-          <a:camera prst="orthographicFront"/>
-          <a:lightRig rig="flat" dir="t"/>
-        </a:scene3d>
-        <a:sp3d prstMaterial="dkEdge">
-          <a:bevelT w="8200" h="38100"/>
-        </a:sp3d>
-      </dsp:spPr>
-      <dsp:style>
-        <a:lnRef idx="0">
-          <a:scrgbClr r="0" g="0" b="0"/>
-        </a:lnRef>
-        <a:fillRef idx="2">
-          <a:scrgbClr r="0" g="0" b="0"/>
-        </a:fillRef>
-        <a:effectRef idx="1">
-          <a:scrgbClr r="0" g="0" b="0"/>
-        </a:effectRef>
-        <a:fontRef idx="minor">
-          <a:schemeClr val="dk1"/>
-        </a:fontRef>
-      </dsp:style>
-      <dsp:txBody>
-        <a:bodyPr spcFirstLastPara="0" vert="horz" wrap="square" lIns="3810" tIns="3810" rIns="3810" bIns="3810" numCol="1" spcCol="1270" anchor="ctr" anchorCtr="0">
-          <a:noAutofit/>
-        </a:bodyPr>
-        <a:lstStyle/>
-        <a:p>
-          <a:pPr lvl="0" algn="ctr" defTabSz="266700">
-            <a:lnSpc>
-              <a:spcPct val="90000"/>
-            </a:lnSpc>
-            <a:spcBef>
-              <a:spcPct val="0"/>
-            </a:spcBef>
-            <a:spcAft>
-              <a:spcPct val="35000"/>
-            </a:spcAft>
-          </a:pPr>
-          <a:r>
-            <a:rPr lang="de-CH" sz="600" kern="1200" dirty="0" smtClean="0"/>
-            <a:t>Zahlungsstelle</a:t>
-          </a:r>
-        </a:p>
-      </dsp:txBody>
-      <dsp:txXfrm>
-        <a:off x="2748659" y="3821230"/>
-        <a:ext cx="630667" cy="630667"/>
-      </dsp:txXfrm>
-    </dsp:sp>
-    <dsp:sp modelId="{C8D35826-983C-498B-BB81-C2E055925FDE}">
-      <dsp:nvSpPr>
-        <dsp:cNvPr id="0" name=""/>
-        <dsp:cNvSpPr/>
-      </dsp:nvSpPr>
-      <dsp:spPr>
-        <a:xfrm rot="9164133">
-          <a:off x="2392209" y="3213053"/>
-          <a:ext cx="1350399" cy="19751"/>
-        </a:xfrm>
-        <a:custGeom>
-          <a:avLst/>
-          <a:gdLst/>
-          <a:ahLst/>
-          <a:cxnLst/>
-          <a:rect l="0" t="0" r="0" b="0"/>
-          <a:pathLst>
-            <a:path>
-              <a:moveTo>
-                <a:pt x="0" y="9875"/>
-              </a:moveTo>
-              <a:lnTo>
-                <a:pt x="1350399" y="9875"/>
-              </a:lnTo>
-            </a:path>
-          </a:pathLst>
-        </a:custGeom>
-        <a:noFill/>
-        <a:ln w="12700" cap="flat" cmpd="sng" algn="ctr">
-          <a:solidFill>
-            <a:schemeClr val="accent3">
-              <a:shade val="60000"/>
-              <a:hueOff val="0"/>
-              <a:satOff val="0"/>
-              <a:lumOff val="0"/>
-              <a:alphaOff val="0"/>
-            </a:schemeClr>
-          </a:solidFill>
-          <a:prstDash val="solid"/>
-          <a:miter lim="800000"/>
-        </a:ln>
-        <a:effectLst/>
-      </dsp:spPr>
-      <dsp:style>
-        <a:lnRef idx="2">
-          <a:scrgbClr r="0" g="0" b="0"/>
-        </a:lnRef>
-        <a:fillRef idx="0">
-          <a:scrgbClr r="0" g="0" b="0"/>
-        </a:fillRef>
-        <a:effectRef idx="0">
-          <a:scrgbClr r="0" g="0" b="0"/>
-        </a:effectRef>
-        <a:fontRef idx="minor"/>
-      </dsp:style>
-      <dsp:txBody>
-        <a:bodyPr spcFirstLastPara="0" vert="horz" wrap="square" lIns="12700" tIns="0" rIns="12700" bIns="0" numCol="1" spcCol="1270" anchor="ctr" anchorCtr="0">
-          <a:noAutofit/>
-        </a:bodyPr>
-        <a:lstStyle/>
-        <a:p>
-          <a:pPr lvl="0" algn="ctr" defTabSz="222250">
-            <a:lnSpc>
-              <a:spcPct val="90000"/>
-            </a:lnSpc>
-            <a:spcBef>
-              <a:spcPct val="0"/>
-            </a:spcBef>
-            <a:spcAft>
-              <a:spcPct val="35000"/>
-            </a:spcAft>
-          </a:pPr>
-          <a:endParaRPr lang="de-CH" sz="500" kern="1200"/>
-        </a:p>
-      </dsp:txBody>
-      <dsp:txXfrm rot="10800000">
-        <a:off x="3033648" y="3189169"/>
-        <a:ext cx="67519" cy="67519"/>
-      </dsp:txXfrm>
-    </dsp:sp>
-    <dsp:sp modelId="{1D085E6A-9CDB-4D36-A26A-CD5B931E1170}">
-      <dsp:nvSpPr>
-        <dsp:cNvPr id="0" name=""/>
-        <dsp:cNvSpPr/>
-      </dsp:nvSpPr>
-      <dsp:spPr>
-        <a:xfrm>
-          <a:off x="1624867" y="3290576"/>
-          <a:ext cx="891899" cy="891899"/>
-        </a:xfrm>
-        <a:prstGeom prst="ellipse">
-          <a:avLst/>
-        </a:prstGeom>
-        <a:gradFill rotWithShape="0">
-          <a:gsLst>
-            <a:gs pos="0">
-              <a:schemeClr val="accent3">
-                <a:hueOff val="0"/>
-                <a:satOff val="0"/>
-                <a:lumOff val="0"/>
-                <a:alphaOff val="0"/>
-                <a:lumMod val="110000"/>
-                <a:satMod val="105000"/>
-                <a:tint val="67000"/>
-              </a:schemeClr>
-            </a:gs>
-            <a:gs pos="50000">
-              <a:schemeClr val="accent3">
-                <a:hueOff val="0"/>
-                <a:satOff val="0"/>
-                <a:lumOff val="0"/>
-                <a:alphaOff val="0"/>
-                <a:lumMod val="105000"/>
-                <a:satMod val="103000"/>
-                <a:tint val="73000"/>
-              </a:schemeClr>
-            </a:gs>
-            <a:gs pos="100000">
-              <a:schemeClr val="accent3">
-                <a:hueOff val="0"/>
-                <a:satOff val="0"/>
-                <a:lumOff val="0"/>
-                <a:alphaOff val="0"/>
-                <a:lumMod val="105000"/>
-                <a:satMod val="109000"/>
-                <a:tint val="81000"/>
-              </a:schemeClr>
-            </a:gs>
-          </a:gsLst>
-          <a:lin ang="5400000" scaled="0"/>
-        </a:gradFill>
-        <a:ln>
-          <a:noFill/>
-        </a:ln>
-        <a:effectLst/>
-        <a:scene3d>
-          <a:camera prst="orthographicFront"/>
-          <a:lightRig rig="flat" dir="t"/>
-        </a:scene3d>
-        <a:sp3d prstMaterial="dkEdge">
-          <a:bevelT w="8200" h="38100"/>
-        </a:sp3d>
-      </dsp:spPr>
-      <dsp:style>
-        <a:lnRef idx="0">
-          <a:scrgbClr r="0" g="0" b="0"/>
-        </a:lnRef>
-        <a:fillRef idx="2">
-          <a:scrgbClr r="0" g="0" b="0"/>
-        </a:fillRef>
-        <a:effectRef idx="1">
-          <a:scrgbClr r="0" g="0" b="0"/>
-        </a:effectRef>
-        <a:fontRef idx="minor">
-          <a:schemeClr val="dk1"/>
-        </a:fontRef>
-      </dsp:style>
-      <dsp:txBody>
-        <a:bodyPr spcFirstLastPara="0" vert="horz" wrap="square" lIns="3810" tIns="3810" rIns="3810" bIns="3810" numCol="1" spcCol="1270" anchor="ctr" anchorCtr="0">
-          <a:noAutofit/>
-        </a:bodyPr>
-        <a:lstStyle/>
-        <a:p>
-          <a:pPr lvl="0" algn="ctr" defTabSz="266700">
-            <a:lnSpc>
-              <a:spcPct val="90000"/>
-            </a:lnSpc>
-            <a:spcBef>
-              <a:spcPct val="0"/>
-            </a:spcBef>
-            <a:spcAft>
-              <a:spcPct val="35000"/>
-            </a:spcAft>
-          </a:pPr>
-          <a:r>
-            <a:rPr lang="de-CH" sz="600" kern="1200" dirty="0" smtClean="0"/>
-            <a:t>Tanksäulen-Techniker</a:t>
-          </a:r>
-          <a:endParaRPr lang="de-CH" sz="600" kern="1200" dirty="0"/>
-        </a:p>
-      </dsp:txBody>
-      <dsp:txXfrm>
-        <a:off x="1755483" y="3421192"/>
-        <a:ext cx="630667" cy="630667"/>
-      </dsp:txXfrm>
-    </dsp:sp>
-    <dsp:sp modelId="{255640C7-42AD-41CB-B390-BC7231523B34}">
-      <dsp:nvSpPr>
-        <dsp:cNvPr id="0" name=""/>
-        <dsp:cNvSpPr/>
-      </dsp:nvSpPr>
-      <dsp:spPr>
-        <a:xfrm rot="10646172">
-          <a:off x="2576210" y="2742729"/>
-          <a:ext cx="1042808" cy="19751"/>
-        </a:xfrm>
-        <a:custGeom>
-          <a:avLst/>
-          <a:gdLst/>
-          <a:ahLst/>
-          <a:cxnLst/>
-          <a:rect l="0" t="0" r="0" b="0"/>
-          <a:pathLst>
-            <a:path>
-              <a:moveTo>
-                <a:pt x="0" y="9875"/>
-              </a:moveTo>
-              <a:lnTo>
-                <a:pt x="1042808" y="9875"/>
-              </a:lnTo>
-            </a:path>
-          </a:pathLst>
-        </a:custGeom>
-        <a:noFill/>
-        <a:ln w="12700" cap="flat" cmpd="sng" algn="ctr">
-          <a:solidFill>
-            <a:schemeClr val="accent3">
-              <a:shade val="60000"/>
-              <a:hueOff val="0"/>
-              <a:satOff val="0"/>
-              <a:lumOff val="0"/>
-              <a:alphaOff val="0"/>
-            </a:schemeClr>
-          </a:solidFill>
-          <a:prstDash val="solid"/>
-          <a:miter lim="800000"/>
-        </a:ln>
-        <a:effectLst/>
-      </dsp:spPr>
-      <dsp:style>
-        <a:lnRef idx="2">
-          <a:scrgbClr r="0" g="0" b="0"/>
-        </a:lnRef>
-        <a:fillRef idx="0">
-          <a:scrgbClr r="0" g="0" b="0"/>
-        </a:fillRef>
-        <a:effectRef idx="0">
-          <a:scrgbClr r="0" g="0" b="0"/>
-        </a:effectRef>
-        <a:fontRef idx="minor"/>
-      </dsp:style>
-      <dsp:txBody>
-        <a:bodyPr spcFirstLastPara="0" vert="horz" wrap="square" lIns="12700" tIns="0" rIns="12700" bIns="0" numCol="1" spcCol="1270" anchor="ctr" anchorCtr="0">
-          <a:noAutofit/>
-        </a:bodyPr>
-        <a:lstStyle/>
-        <a:p>
-          <a:pPr lvl="0" algn="ctr" defTabSz="222250">
-            <a:lnSpc>
-              <a:spcPct val="90000"/>
-            </a:lnSpc>
-            <a:spcBef>
-              <a:spcPct val="0"/>
-            </a:spcBef>
-            <a:spcAft>
-              <a:spcPct val="35000"/>
-            </a:spcAft>
-          </a:pPr>
-          <a:endParaRPr lang="de-CH" sz="500" kern="1200"/>
-        </a:p>
-      </dsp:txBody>
-      <dsp:txXfrm rot="10800000">
-        <a:off x="3071544" y="2726534"/>
-        <a:ext cx="52140" cy="52140"/>
-      </dsp:txXfrm>
-    </dsp:sp>
-    <dsp:sp modelId="{2E26A752-646F-4235-8D28-9523DCB6CDC8}">
-      <dsp:nvSpPr>
-        <dsp:cNvPr id="0" name=""/>
-        <dsp:cNvSpPr/>
-      </dsp:nvSpPr>
-      <dsp:spPr>
-        <a:xfrm>
-          <a:off x="1685279" y="2349926"/>
-          <a:ext cx="891899" cy="891899"/>
-        </a:xfrm>
-        <a:prstGeom prst="ellipse">
-          <a:avLst/>
-        </a:prstGeom>
-        <a:gradFill rotWithShape="0">
-          <a:gsLst>
-            <a:gs pos="0">
-              <a:schemeClr val="accent3">
-                <a:hueOff val="0"/>
-                <a:satOff val="0"/>
-                <a:lumOff val="0"/>
-                <a:alphaOff val="0"/>
-                <a:lumMod val="110000"/>
-                <a:satMod val="105000"/>
-                <a:tint val="67000"/>
-              </a:schemeClr>
-            </a:gs>
-            <a:gs pos="50000">
-              <a:schemeClr val="accent3">
-                <a:hueOff val="0"/>
-                <a:satOff val="0"/>
-                <a:lumOff val="0"/>
-                <a:alphaOff val="0"/>
-                <a:lumMod val="105000"/>
-                <a:satMod val="103000"/>
-                <a:tint val="73000"/>
-              </a:schemeClr>
-            </a:gs>
-            <a:gs pos="100000">
-              <a:schemeClr val="accent3">
-                <a:hueOff val="0"/>
-                <a:satOff val="0"/>
-                <a:lumOff val="0"/>
-                <a:alphaOff val="0"/>
-                <a:lumMod val="105000"/>
-                <a:satMod val="109000"/>
-                <a:tint val="81000"/>
-              </a:schemeClr>
-            </a:gs>
-          </a:gsLst>
-          <a:lin ang="5400000" scaled="0"/>
-        </a:gradFill>
-        <a:ln>
-          <a:noFill/>
-        </a:ln>
-        <a:effectLst/>
-        <a:scene3d>
-          <a:camera prst="orthographicFront"/>
-          <a:lightRig rig="flat" dir="t"/>
-        </a:scene3d>
-        <a:sp3d prstMaterial="dkEdge">
-          <a:bevelT w="8200" h="38100"/>
-        </a:sp3d>
-      </dsp:spPr>
-      <dsp:style>
-        <a:lnRef idx="0">
-          <a:scrgbClr r="0" g="0" b="0"/>
-        </a:lnRef>
-        <a:fillRef idx="2">
-          <a:scrgbClr r="0" g="0" b="0"/>
-        </a:fillRef>
-        <a:effectRef idx="1">
-          <a:scrgbClr r="0" g="0" b="0"/>
-        </a:effectRef>
-        <a:fontRef idx="minor">
-          <a:schemeClr val="dk1"/>
-        </a:fontRef>
-      </dsp:style>
-      <dsp:txBody>
-        <a:bodyPr spcFirstLastPara="0" vert="horz" wrap="square" lIns="3810" tIns="3810" rIns="3810" bIns="3810" numCol="1" spcCol="1270" anchor="ctr" anchorCtr="0">
-          <a:noAutofit/>
-        </a:bodyPr>
-        <a:lstStyle/>
-        <a:p>
-          <a:pPr lvl="0" algn="ctr" defTabSz="266700">
-            <a:lnSpc>
-              <a:spcPct val="90000"/>
-            </a:lnSpc>
-            <a:spcBef>
-              <a:spcPct val="0"/>
-            </a:spcBef>
-            <a:spcAft>
-              <a:spcPct val="35000"/>
-            </a:spcAft>
-          </a:pPr>
-          <a:r>
-            <a:rPr lang="de-CH" sz="600" kern="1200" dirty="0" smtClean="0"/>
-            <a:t>Informatiker</a:t>
-          </a:r>
-          <a:endParaRPr lang="de-CH" sz="600" kern="1200" dirty="0"/>
-        </a:p>
-      </dsp:txBody>
-      <dsp:txXfrm>
-        <a:off x="1815895" y="2480542"/>
-        <a:ext cx="630667" cy="630667"/>
-      </dsp:txXfrm>
-    </dsp:sp>
-    <dsp:sp modelId="{2419DFE4-9B14-401E-A90E-EF438F2786C7}">
-      <dsp:nvSpPr>
-        <dsp:cNvPr id="0" name=""/>
-        <dsp:cNvSpPr/>
-      </dsp:nvSpPr>
-      <dsp:spPr>
-        <a:xfrm rot="12328407">
-          <a:off x="3196571" y="2402590"/>
-          <a:ext cx="488580" cy="19751"/>
-        </a:xfrm>
-        <a:custGeom>
-          <a:avLst/>
-          <a:gdLst/>
-          <a:ahLst/>
-          <a:cxnLst/>
-          <a:rect l="0" t="0" r="0" b="0"/>
-          <a:pathLst>
-            <a:path>
-              <a:moveTo>
-                <a:pt x="0" y="9875"/>
-              </a:moveTo>
-              <a:lnTo>
-                <a:pt x="488580" y="9875"/>
-              </a:lnTo>
-            </a:path>
-          </a:pathLst>
-        </a:custGeom>
-        <a:noFill/>
-        <a:ln w="12700" cap="flat" cmpd="sng" algn="ctr">
-          <a:solidFill>
-            <a:schemeClr val="accent3">
-              <a:shade val="60000"/>
-              <a:hueOff val="0"/>
-              <a:satOff val="0"/>
-              <a:lumOff val="0"/>
-              <a:alphaOff val="0"/>
-            </a:schemeClr>
-          </a:solidFill>
-          <a:prstDash val="solid"/>
-          <a:miter lim="800000"/>
-        </a:ln>
-        <a:effectLst/>
-      </dsp:spPr>
-      <dsp:style>
-        <a:lnRef idx="2">
-          <a:scrgbClr r="0" g="0" b="0"/>
-        </a:lnRef>
-        <a:fillRef idx="0">
-          <a:scrgbClr r="0" g="0" b="0"/>
-        </a:fillRef>
-        <a:effectRef idx="0">
-          <a:scrgbClr r="0" g="0" b="0"/>
-        </a:effectRef>
-        <a:fontRef idx="minor"/>
-      </dsp:style>
-      <dsp:txBody>
-        <a:bodyPr spcFirstLastPara="0" vert="horz" wrap="square" lIns="12700" tIns="0" rIns="12700" bIns="0" numCol="1" spcCol="1270" anchor="ctr" anchorCtr="0">
-          <a:noAutofit/>
-        </a:bodyPr>
-        <a:lstStyle/>
-        <a:p>
-          <a:pPr lvl="0" algn="ctr" defTabSz="222250">
-            <a:lnSpc>
-              <a:spcPct val="90000"/>
-            </a:lnSpc>
-            <a:spcBef>
-              <a:spcPct val="0"/>
-            </a:spcBef>
-            <a:spcAft>
-              <a:spcPct val="35000"/>
-            </a:spcAft>
-          </a:pPr>
-          <a:endParaRPr lang="de-CH" sz="500" kern="1200"/>
-        </a:p>
-      </dsp:txBody>
-      <dsp:txXfrm rot="10800000">
-        <a:off x="3428647" y="2400251"/>
-        <a:ext cx="24429" cy="24429"/>
-      </dsp:txXfrm>
-    </dsp:sp>
-    <dsp:sp modelId="{C27A88B3-4722-46D0-A005-01966C4A79EB}">
-      <dsp:nvSpPr>
-        <dsp:cNvPr id="0" name=""/>
-        <dsp:cNvSpPr/>
-      </dsp:nvSpPr>
-      <dsp:spPr>
-        <a:xfrm>
-          <a:off x="2371774" y="1669649"/>
-          <a:ext cx="891899" cy="891899"/>
-        </a:xfrm>
-        <a:prstGeom prst="ellipse">
-          <a:avLst/>
-        </a:prstGeom>
-        <a:gradFill rotWithShape="0">
-          <a:gsLst>
-            <a:gs pos="0">
-              <a:schemeClr val="accent3">
-                <a:hueOff val="0"/>
-                <a:satOff val="0"/>
-                <a:lumOff val="0"/>
-                <a:alphaOff val="0"/>
-                <a:lumMod val="110000"/>
-                <a:satMod val="105000"/>
-                <a:tint val="67000"/>
-              </a:schemeClr>
-            </a:gs>
-            <a:gs pos="50000">
-              <a:schemeClr val="accent3">
-                <a:hueOff val="0"/>
-                <a:satOff val="0"/>
-                <a:lumOff val="0"/>
-                <a:alphaOff val="0"/>
-                <a:lumMod val="105000"/>
-                <a:satMod val="103000"/>
-                <a:tint val="73000"/>
-              </a:schemeClr>
-            </a:gs>
-            <a:gs pos="100000">
-              <a:schemeClr val="accent3">
-                <a:hueOff val="0"/>
-                <a:satOff val="0"/>
-                <a:lumOff val="0"/>
-                <a:alphaOff val="0"/>
-                <a:lumMod val="105000"/>
-                <a:satMod val="109000"/>
-                <a:tint val="81000"/>
-              </a:schemeClr>
-            </a:gs>
-          </a:gsLst>
-          <a:lin ang="5400000" scaled="0"/>
-        </a:gradFill>
-        <a:ln>
-          <a:noFill/>
-        </a:ln>
-        <a:effectLst/>
-        <a:scene3d>
-          <a:camera prst="orthographicFront"/>
-          <a:lightRig rig="flat" dir="t"/>
-        </a:scene3d>
-        <a:sp3d prstMaterial="dkEdge">
-          <a:bevelT w="8200" h="38100"/>
-        </a:sp3d>
-      </dsp:spPr>
-      <dsp:style>
-        <a:lnRef idx="0">
-          <a:scrgbClr r="0" g="0" b="0"/>
-        </a:lnRef>
-        <a:fillRef idx="2">
-          <a:scrgbClr r="0" g="0" b="0"/>
-        </a:fillRef>
-        <a:effectRef idx="1">
-          <a:scrgbClr r="0" g="0" b="0"/>
-        </a:effectRef>
-        <a:fontRef idx="minor">
-          <a:schemeClr val="dk1"/>
-        </a:fontRef>
-      </dsp:style>
-      <dsp:txBody>
-        <a:bodyPr spcFirstLastPara="0" vert="horz" wrap="square" lIns="3810" tIns="3810" rIns="3810" bIns="3810" numCol="1" spcCol="1270" anchor="ctr" anchorCtr="0">
-          <a:noAutofit/>
-        </a:bodyPr>
-        <a:lstStyle/>
-        <a:p>
-          <a:pPr lvl="0" algn="ctr" defTabSz="266700">
-            <a:lnSpc>
-              <a:spcPct val="90000"/>
-            </a:lnSpc>
-            <a:spcBef>
-              <a:spcPct val="0"/>
-            </a:spcBef>
-            <a:spcAft>
-              <a:spcPct val="35000"/>
-            </a:spcAft>
-          </a:pPr>
-          <a:r>
-            <a:rPr lang="de-CH" sz="600" kern="1200" dirty="0" smtClean="0"/>
-            <a:t>Angestellte</a:t>
-          </a:r>
-          <a:endParaRPr lang="de-CH" sz="600" kern="1200" dirty="0"/>
-        </a:p>
-      </dsp:txBody>
-      <dsp:txXfrm>
-        <a:off x="2502390" y="1800265"/>
-        <a:ext cx="630667" cy="630667"/>
-      </dsp:txXfrm>
-    </dsp:sp>
-    <dsp:sp modelId="{07D48153-ADA1-4540-9842-4665B49EFAED}">
-      <dsp:nvSpPr>
-        <dsp:cNvPr id="0" name=""/>
-        <dsp:cNvSpPr/>
-      </dsp:nvSpPr>
-      <dsp:spPr>
-        <a:xfrm rot="14263560">
-          <a:off x="3093827" y="1918909"/>
-          <a:ext cx="954451" cy="19751"/>
-        </a:xfrm>
-        <a:custGeom>
-          <a:avLst/>
-          <a:gdLst/>
-          <a:ahLst/>
-          <a:cxnLst/>
-          <a:rect l="0" t="0" r="0" b="0"/>
-          <a:pathLst>
-            <a:path>
-              <a:moveTo>
-                <a:pt x="0" y="9875"/>
-              </a:moveTo>
-              <a:lnTo>
-                <a:pt x="954451" y="9875"/>
-              </a:lnTo>
-            </a:path>
-          </a:pathLst>
-        </a:custGeom>
-        <a:noFill/>
-        <a:ln w="12700" cap="flat" cmpd="sng" algn="ctr">
-          <a:solidFill>
-            <a:schemeClr val="accent3">
-              <a:shade val="60000"/>
-              <a:hueOff val="0"/>
-              <a:satOff val="0"/>
-              <a:lumOff val="0"/>
-              <a:alphaOff val="0"/>
-            </a:schemeClr>
-          </a:solidFill>
-          <a:prstDash val="solid"/>
-          <a:miter lim="800000"/>
-        </a:ln>
-        <a:effectLst/>
-      </dsp:spPr>
-      <dsp:style>
-        <a:lnRef idx="2">
-          <a:scrgbClr r="0" g="0" b="0"/>
-        </a:lnRef>
-        <a:fillRef idx="0">
-          <a:scrgbClr r="0" g="0" b="0"/>
-        </a:fillRef>
-        <a:effectRef idx="0">
-          <a:scrgbClr r="0" g="0" b="0"/>
-        </a:effectRef>
-        <a:fontRef idx="minor"/>
-      </dsp:style>
-      <dsp:txBody>
-        <a:bodyPr spcFirstLastPara="0" vert="horz" wrap="square" lIns="12700" tIns="0" rIns="12700" bIns="0" numCol="1" spcCol="1270" anchor="ctr" anchorCtr="0">
-          <a:noAutofit/>
-        </a:bodyPr>
-        <a:lstStyle/>
-        <a:p>
-          <a:pPr lvl="0" algn="ctr" defTabSz="222250">
-            <a:lnSpc>
-              <a:spcPct val="90000"/>
-            </a:lnSpc>
-            <a:spcBef>
-              <a:spcPct val="0"/>
-            </a:spcBef>
-            <a:spcAft>
-              <a:spcPct val="35000"/>
-            </a:spcAft>
-          </a:pPr>
-          <a:endParaRPr lang="de-CH" sz="500" kern="1200"/>
-        </a:p>
-      </dsp:txBody>
-      <dsp:txXfrm rot="10800000">
-        <a:off x="3547191" y="1904923"/>
-        <a:ext cx="47722" cy="47722"/>
-      </dsp:txXfrm>
-    </dsp:sp>
-    <dsp:sp modelId="{56AB0F57-412B-4437-8190-87BB72D5D7E1}">
-      <dsp:nvSpPr>
-        <dsp:cNvPr id="0" name=""/>
-        <dsp:cNvSpPr/>
-      </dsp:nvSpPr>
-      <dsp:spPr>
-        <a:xfrm>
-          <a:off x="2632157" y="702286"/>
-          <a:ext cx="891899" cy="891899"/>
-        </a:xfrm>
-        <a:prstGeom prst="ellipse">
-          <a:avLst/>
-        </a:prstGeom>
-        <a:gradFill rotWithShape="0">
-          <a:gsLst>
-            <a:gs pos="0">
-              <a:schemeClr val="accent3">
-                <a:hueOff val="0"/>
-                <a:satOff val="0"/>
-                <a:lumOff val="0"/>
-                <a:alphaOff val="0"/>
-                <a:lumMod val="110000"/>
-                <a:satMod val="105000"/>
-                <a:tint val="67000"/>
-              </a:schemeClr>
-            </a:gs>
-            <a:gs pos="50000">
-              <a:schemeClr val="accent3">
-                <a:hueOff val="0"/>
-                <a:satOff val="0"/>
-                <a:lumOff val="0"/>
-                <a:alphaOff val="0"/>
-                <a:lumMod val="105000"/>
-                <a:satMod val="103000"/>
-                <a:tint val="73000"/>
-              </a:schemeClr>
-            </a:gs>
-            <a:gs pos="100000">
-              <a:schemeClr val="accent3">
-                <a:hueOff val="0"/>
-                <a:satOff val="0"/>
-                <a:lumOff val="0"/>
-                <a:alphaOff val="0"/>
-                <a:lumMod val="105000"/>
-                <a:satMod val="109000"/>
-                <a:tint val="81000"/>
-              </a:schemeClr>
-            </a:gs>
-          </a:gsLst>
-          <a:lin ang="5400000" scaled="0"/>
-        </a:gradFill>
-        <a:ln>
-          <a:noFill/>
-        </a:ln>
-        <a:effectLst/>
-        <a:scene3d>
-          <a:camera prst="orthographicFront"/>
-          <a:lightRig rig="flat" dir="t"/>
-        </a:scene3d>
-        <a:sp3d prstMaterial="dkEdge">
-          <a:bevelT w="8200" h="38100"/>
-        </a:sp3d>
-      </dsp:spPr>
-      <dsp:style>
-        <a:lnRef idx="0">
-          <a:scrgbClr r="0" g="0" b="0"/>
-        </a:lnRef>
-        <a:fillRef idx="2">
-          <a:scrgbClr r="0" g="0" b="0"/>
-        </a:fillRef>
-        <a:effectRef idx="1">
-          <a:scrgbClr r="0" g="0" b="0"/>
-        </a:effectRef>
-        <a:fontRef idx="minor">
-          <a:schemeClr val="dk1"/>
-        </a:fontRef>
-      </dsp:style>
-      <dsp:txBody>
-        <a:bodyPr spcFirstLastPara="0" vert="horz" wrap="square" lIns="3810" tIns="3810" rIns="3810" bIns="3810" numCol="1" spcCol="1270" anchor="ctr" anchorCtr="0">
-          <a:noAutofit/>
-        </a:bodyPr>
-        <a:lstStyle/>
-        <a:p>
-          <a:pPr lvl="0" algn="ctr" defTabSz="266700">
-            <a:lnSpc>
-              <a:spcPct val="90000"/>
-            </a:lnSpc>
-            <a:spcBef>
-              <a:spcPct val="0"/>
-            </a:spcBef>
-            <a:spcAft>
-              <a:spcPct val="35000"/>
-            </a:spcAft>
-          </a:pPr>
-          <a:r>
-            <a:rPr lang="de-CH" sz="600" kern="1200" dirty="0" smtClean="0"/>
-            <a:t>Angehörige der Angestellten</a:t>
-          </a:r>
-          <a:endParaRPr lang="de-CH" sz="600" kern="1200" dirty="0"/>
-        </a:p>
-      </dsp:txBody>
-      <dsp:txXfrm>
-        <a:off x="2762773" y="832902"/>
-        <a:ext cx="630667" cy="630667"/>
+        <a:off x="2900941" y="800270"/>
+        <a:ext cx="729514" cy="729514"/>
       </dsp:txXfrm>
     </dsp:sp>
   </dsp:spTree>
@@ -5466,7 +5158,7 @@
           <a:p>
             <a:fld id="{B875FFFB-F070-420D-AD34-B9E345545E7F}" type="datetimeFigureOut">
               <a:rPr lang="de-CH" smtClean="0"/>
-              <a:t>24.11.2013</a:t>
+              <a:t>02.12.2013</a:t>
             </a:fld>
             <a:endParaRPr lang="de-CH"/>
           </a:p>
@@ -5636,7 +5328,7 @@
           <a:p>
             <a:fld id="{B875FFFB-F070-420D-AD34-B9E345545E7F}" type="datetimeFigureOut">
               <a:rPr lang="de-CH" smtClean="0"/>
-              <a:t>24.11.2013</a:t>
+              <a:t>02.12.2013</a:t>
             </a:fld>
             <a:endParaRPr lang="de-CH"/>
           </a:p>
@@ -5816,7 +5508,7 @@
           <a:p>
             <a:fld id="{B875FFFB-F070-420D-AD34-B9E345545E7F}" type="datetimeFigureOut">
               <a:rPr lang="de-CH" smtClean="0"/>
-              <a:t>24.11.2013</a:t>
+              <a:t>02.12.2013</a:t>
             </a:fld>
             <a:endParaRPr lang="de-CH"/>
           </a:p>
@@ -5986,7 +5678,7 @@
           <a:p>
             <a:fld id="{B875FFFB-F070-420D-AD34-B9E345545E7F}" type="datetimeFigureOut">
               <a:rPr lang="de-CH" smtClean="0"/>
-              <a:t>24.11.2013</a:t>
+              <a:t>02.12.2013</a:t>
             </a:fld>
             <a:endParaRPr lang="de-CH"/>
           </a:p>
@@ -6232,7 +5924,7 @@
           <a:p>
             <a:fld id="{B875FFFB-F070-420D-AD34-B9E345545E7F}" type="datetimeFigureOut">
               <a:rPr lang="de-CH" smtClean="0"/>
-              <a:t>24.11.2013</a:t>
+              <a:t>02.12.2013</a:t>
             </a:fld>
             <a:endParaRPr lang="de-CH"/>
           </a:p>
@@ -6464,7 +6156,7 @@
           <a:p>
             <a:fld id="{B875FFFB-F070-420D-AD34-B9E345545E7F}" type="datetimeFigureOut">
               <a:rPr lang="de-CH" smtClean="0"/>
-              <a:t>24.11.2013</a:t>
+              <a:t>02.12.2013</a:t>
             </a:fld>
             <a:endParaRPr lang="de-CH"/>
           </a:p>
@@ -6831,7 +6523,7 @@
           <a:p>
             <a:fld id="{B875FFFB-F070-420D-AD34-B9E345545E7F}" type="datetimeFigureOut">
               <a:rPr lang="de-CH" smtClean="0"/>
-              <a:t>24.11.2013</a:t>
+              <a:t>02.12.2013</a:t>
             </a:fld>
             <a:endParaRPr lang="de-CH"/>
           </a:p>
@@ -6949,7 +6641,7 @@
           <a:p>
             <a:fld id="{B875FFFB-F070-420D-AD34-B9E345545E7F}" type="datetimeFigureOut">
               <a:rPr lang="de-CH" smtClean="0"/>
-              <a:t>24.11.2013</a:t>
+              <a:t>02.12.2013</a:t>
             </a:fld>
             <a:endParaRPr lang="de-CH"/>
           </a:p>
@@ -7044,7 +6736,7 @@
           <a:p>
             <a:fld id="{B875FFFB-F070-420D-AD34-B9E345545E7F}" type="datetimeFigureOut">
               <a:rPr lang="de-CH" smtClean="0"/>
-              <a:t>24.11.2013</a:t>
+              <a:t>02.12.2013</a:t>
             </a:fld>
             <a:endParaRPr lang="de-CH"/>
           </a:p>
@@ -7321,7 +7013,7 @@
           <a:p>
             <a:fld id="{B875FFFB-F070-420D-AD34-B9E345545E7F}" type="datetimeFigureOut">
               <a:rPr lang="de-CH" smtClean="0"/>
-              <a:t>24.11.2013</a:t>
+              <a:t>02.12.2013</a:t>
             </a:fld>
             <a:endParaRPr lang="de-CH"/>
           </a:p>
@@ -7574,7 +7266,7 @@
           <a:p>
             <a:fld id="{B875FFFB-F070-420D-AD34-B9E345545E7F}" type="datetimeFigureOut">
               <a:rPr lang="de-CH" smtClean="0"/>
-              <a:t>24.11.2013</a:t>
+              <a:t>02.12.2013</a:t>
             </a:fld>
             <a:endParaRPr lang="de-CH"/>
           </a:p>
@@ -7787,7 +7479,7 @@
           <a:p>
             <a:fld id="{B875FFFB-F070-420D-AD34-B9E345545E7F}" type="datetimeFigureOut">
               <a:rPr lang="de-CH" smtClean="0"/>
-              <a:t>24.11.2013</a:t>
+              <a:t>02.12.2013</a:t>
             </a:fld>
             <a:endParaRPr lang="de-CH"/>
           </a:p>
@@ -8199,7 +7891,7 @@
           <p:nvPr>
             <p:extLst>
               <p:ext uri="{D42A27DB-BD31-4B8C-83A1-F6EECF244321}">
-                <p14:modId xmlns:p14="http://schemas.microsoft.com/office/powerpoint/2010/main" val="2887394593"/>
+                <p14:modId xmlns:p14="http://schemas.microsoft.com/office/powerpoint/2010/main" val="2137920877"/>
               </p:ext>
             </p:extLst>
           </p:nvPr>

</xml_diff>

<commit_message>
Zusammenfassung erster Wurf (Grob-Korrekturen/Layout)
</commit_message>
<xml_diff>
--- a/Stakeholder.pptx
+++ b/Stakeholder.pptx
@@ -881,10 +881,10 @@
         <a:lstStyle/>
         <a:p>
           <a:r>
-            <a:rPr lang="de-CH" dirty="0" smtClean="0"/>
+            <a:rPr lang="de-CH" b="1" dirty="0" smtClean="0"/>
             <a:t>Tankstelle</a:t>
           </a:r>
-          <a:endParaRPr lang="de-CH" dirty="0"/>
+          <a:endParaRPr lang="de-CH" b="1" dirty="0"/>
         </a:p>
       </dgm:t>
     </dgm:pt>
@@ -911,14 +911,14 @@
       </dgm:t>
     </dgm:pt>
     <dgm:pt modelId="{FD965C98-CDC0-4CEF-B2F6-E24016E9D1BD}">
-      <dgm:prSet phldrT="[Text]"/>
+      <dgm:prSet phldrT="[Text]" custT="1"/>
       <dgm:spPr/>
       <dgm:t>
         <a:bodyPr/>
         <a:lstStyle/>
         <a:p>
           <a:r>
-            <a:rPr lang="de-CH" dirty="0" smtClean="0"/>
+            <a:rPr lang="de-CH" sz="1000" baseline="0" dirty="0" smtClean="0"/>
             <a:t>Management</a:t>
           </a:r>
         </a:p>
@@ -947,21 +947,37 @@
       </dgm:t>
     </dgm:pt>
     <dgm:pt modelId="{A91865F9-C54C-4CC5-B71A-7E9DF270B440}">
-      <dgm:prSet phldrT="[Text]"/>
+      <dgm:prSet phldrT="[Text]" custT="1"/>
       <dgm:spPr/>
       <dgm:t>
         <a:bodyPr/>
         <a:lstStyle/>
         <a:p>
           <a:r>
-            <a:rPr lang="de-CH" dirty="0" smtClean="0"/>
-            <a:t>Buchhaltung</a:t>
+            <a:rPr lang="de-CH" sz="700" b="1" baseline="0" dirty="0" smtClean="0"/>
+            <a:t>Rechnungswesen</a:t>
           </a:r>
+          <a:endParaRPr lang="de-CH" sz="700" b="1" baseline="0" dirty="0" smtClean="0"/>
         </a:p>
       </dgm:t>
     </dgm:pt>
     <dgm:pt modelId="{8DB5FD83-FCC0-4F58-9508-F11ECE372DD1}" type="parTrans" cxnId="{5A897222-F1E5-4C2A-ABC4-89090CF31436}">
-      <dgm:prSet/>
+      <dgm:prSet>
+        <dgm:style>
+          <a:lnRef idx="3">
+            <a:schemeClr val="dk1"/>
+          </a:lnRef>
+          <a:fillRef idx="0">
+            <a:schemeClr val="dk1"/>
+          </a:fillRef>
+          <a:effectRef idx="2">
+            <a:schemeClr val="dk1"/>
+          </a:effectRef>
+          <a:fontRef idx="minor">
+            <a:schemeClr val="tx1"/>
+          </a:fontRef>
+        </dgm:style>
+      </dgm:prSet>
       <dgm:spPr/>
       <dgm:t>
         <a:bodyPr/>
@@ -990,7 +1006,7 @@
         <a:lstStyle/>
         <a:p>
           <a:r>
-            <a:rPr lang="de-CH" sz="1200" dirty="0" smtClean="0"/>
+            <a:rPr lang="de-CH" sz="1200" b="1" dirty="0" smtClean="0"/>
             <a:t>Tankwart</a:t>
           </a:r>
         </a:p>
@@ -1034,17 +1050,17 @@
       </dgm:t>
     </dgm:pt>
     <dgm:pt modelId="{C2D3B850-0E26-4E2B-BB79-F2BF8777AB32}">
-      <dgm:prSet phldrT="[Text]"/>
+      <dgm:prSet phldrT="[Text]" custT="1"/>
       <dgm:spPr/>
       <dgm:t>
         <a:bodyPr/>
         <a:lstStyle/>
         <a:p>
           <a:r>
-            <a:rPr lang="de-CH" dirty="0" smtClean="0"/>
+            <a:rPr lang="de-CH" sz="1000" baseline="0" dirty="0" smtClean="0"/>
             <a:t>Angestellte</a:t>
           </a:r>
-          <a:endParaRPr lang="de-CH" dirty="0"/>
+          <a:endParaRPr lang="de-CH" sz="1000" baseline="0" dirty="0"/>
         </a:p>
       </dgm:t>
     </dgm:pt>
@@ -1071,14 +1087,14 @@
       </dgm:t>
     </dgm:pt>
     <dgm:pt modelId="{6FB7F775-7FDB-4AC9-9E50-BF012053C1C3}">
-      <dgm:prSet phldrT="[Text]"/>
+      <dgm:prSet phldrT="[Text]" custT="1"/>
       <dgm:spPr/>
       <dgm:t>
         <a:bodyPr/>
         <a:lstStyle/>
         <a:p>
           <a:r>
-            <a:rPr lang="de-CH" dirty="0" smtClean="0"/>
+            <a:rPr lang="de-CH" sz="1000" baseline="0" dirty="0" smtClean="0"/>
             <a:t>Inhaber</a:t>
           </a:r>
         </a:p>
@@ -1107,17 +1123,17 @@
       </dgm:t>
     </dgm:pt>
     <dgm:pt modelId="{76902F48-F9E7-4DFF-9A31-977209D36290}">
-      <dgm:prSet phldrT="[Text]"/>
+      <dgm:prSet phldrT="[Text]" custT="1"/>
       <dgm:spPr/>
       <dgm:t>
         <a:bodyPr/>
         <a:lstStyle/>
         <a:p>
           <a:r>
-            <a:rPr lang="de-CH" dirty="0" smtClean="0"/>
+            <a:rPr lang="de-CH" sz="1000" baseline="0" dirty="0" smtClean="0"/>
             <a:t>Angehörige der Angestellten</a:t>
           </a:r>
-          <a:endParaRPr lang="de-CH" dirty="0"/>
+          <a:endParaRPr lang="de-CH" sz="1000" baseline="0" dirty="0"/>
         </a:p>
       </dgm:t>
     </dgm:pt>
@@ -1144,21 +1160,36 @@
       </dgm:t>
     </dgm:pt>
     <dgm:pt modelId="{DCFE77C9-DC67-4002-BB6C-943C073AEFFD}">
-      <dgm:prSet phldrT="[Text]"/>
+      <dgm:prSet phldrT="[Text]" custT="1"/>
       <dgm:spPr/>
       <dgm:t>
         <a:bodyPr/>
         <a:lstStyle/>
         <a:p>
           <a:r>
-            <a:rPr lang="de-CH" dirty="0" smtClean="0"/>
+            <a:rPr lang="de-CH" sz="700" b="1" baseline="0" dirty="0" smtClean="0"/>
             <a:t>Personalabteilung</a:t>
           </a:r>
         </a:p>
       </dgm:t>
     </dgm:pt>
     <dgm:pt modelId="{7779DAFC-2072-4A74-8EF6-4C449FD50C76}" type="parTrans" cxnId="{76B0831D-6054-4B8A-97D6-8DD159C66415}">
-      <dgm:prSet/>
+      <dgm:prSet>
+        <dgm:style>
+          <a:lnRef idx="3">
+            <a:schemeClr val="dk1"/>
+          </a:lnRef>
+          <a:fillRef idx="0">
+            <a:schemeClr val="dk1"/>
+          </a:fillRef>
+          <a:effectRef idx="2">
+            <a:schemeClr val="dk1"/>
+          </a:effectRef>
+          <a:fontRef idx="minor">
+            <a:schemeClr val="tx1"/>
+          </a:fontRef>
+        </dgm:style>
+      </dgm:prSet>
       <dgm:spPr/>
       <dgm:t>
         <a:bodyPr/>
@@ -1180,21 +1211,36 @@
       </dgm:t>
     </dgm:pt>
     <dgm:pt modelId="{C6048AE7-17C9-4954-86AF-EE225F62B516}">
-      <dgm:prSet phldrT="[Text]"/>
+      <dgm:prSet phldrT="[Text]" custT="1"/>
       <dgm:spPr/>
       <dgm:t>
         <a:bodyPr/>
         <a:lstStyle/>
         <a:p>
           <a:r>
-            <a:rPr lang="de-CH" dirty="0" smtClean="0"/>
+            <a:rPr lang="de-CH" sz="1000" b="0" dirty="0" smtClean="0"/>
             <a:t>Lieferant</a:t>
           </a:r>
         </a:p>
       </dgm:t>
     </dgm:pt>
     <dgm:pt modelId="{5FD42421-315B-436E-B6F0-AF709CD4118D}" type="parTrans" cxnId="{1117ADA7-A8A7-4972-9BCC-C0B7E16DB436}">
-      <dgm:prSet/>
+      <dgm:prSet>
+        <dgm:style>
+          <a:lnRef idx="1">
+            <a:schemeClr val="dk1"/>
+          </a:lnRef>
+          <a:fillRef idx="0">
+            <a:schemeClr val="dk1"/>
+          </a:fillRef>
+          <a:effectRef idx="0">
+            <a:schemeClr val="dk1"/>
+          </a:effectRef>
+          <a:fontRef idx="minor">
+            <a:schemeClr val="tx1"/>
+          </a:fontRef>
+        </dgm:style>
+      </dgm:prSet>
       <dgm:spPr/>
       <dgm:t>
         <a:bodyPr/>
@@ -1216,21 +1262,37 @@
       </dgm:t>
     </dgm:pt>
     <dgm:pt modelId="{D229CB6F-46C1-4CC5-82DE-DF9A645642DF}">
-      <dgm:prSet phldrT="[Text]"/>
+      <dgm:prSet phldrT="[Text]" custT="1"/>
       <dgm:spPr/>
       <dgm:t>
         <a:bodyPr/>
         <a:lstStyle/>
         <a:p>
           <a:r>
-            <a:rPr lang="de-CH" dirty="0" smtClean="0"/>
-            <a:t>Zahlungsstelle</a:t>
+            <a:rPr lang="de-CH" sz="800" b="1" dirty="0" smtClean="0"/>
+            <a:t>Debit-/Kreditkarten System</a:t>
           </a:r>
+          <a:endParaRPr lang="de-CH" sz="800" b="1" dirty="0" smtClean="0"/>
         </a:p>
       </dgm:t>
     </dgm:pt>
     <dgm:pt modelId="{C23B5222-784D-4F37-9766-B728A9144611}" type="parTrans" cxnId="{9A7879E1-2ED0-45A5-82FC-BCCE33BCCB6A}">
-      <dgm:prSet/>
+      <dgm:prSet>
+        <dgm:style>
+          <a:lnRef idx="3">
+            <a:schemeClr val="dk1"/>
+          </a:lnRef>
+          <a:fillRef idx="0">
+            <a:schemeClr val="dk1"/>
+          </a:fillRef>
+          <a:effectRef idx="2">
+            <a:schemeClr val="dk1"/>
+          </a:effectRef>
+          <a:fontRef idx="minor">
+            <a:schemeClr val="tx1"/>
+          </a:fontRef>
+        </dgm:style>
+      </dgm:prSet>
       <dgm:spPr/>
       <dgm:t>
         <a:bodyPr/>
@@ -1252,21 +1314,36 @@
       </dgm:t>
     </dgm:pt>
     <dgm:pt modelId="{C7EFF620-3989-402C-BF0C-C72EBCCAC402}">
-      <dgm:prSet phldrT="[Text]"/>
+      <dgm:prSet phldrT="[Text]" custT="1"/>
       <dgm:spPr/>
       <dgm:t>
         <a:bodyPr/>
         <a:lstStyle/>
         <a:p>
           <a:r>
-            <a:rPr lang="de-CH" dirty="0" smtClean="0"/>
+            <a:rPr lang="de-CH" sz="700" b="1" baseline="0" dirty="0" smtClean="0"/>
             <a:t>Fahrzeugabteilung</a:t>
           </a:r>
         </a:p>
       </dgm:t>
     </dgm:pt>
     <dgm:pt modelId="{859EE249-9892-42B0-8673-06FADE8F37B5}" type="parTrans" cxnId="{0103B071-3473-4DB2-BEF0-F2904CAD30DA}">
-      <dgm:prSet/>
+      <dgm:prSet>
+        <dgm:style>
+          <a:lnRef idx="3">
+            <a:schemeClr val="dk1"/>
+          </a:lnRef>
+          <a:fillRef idx="0">
+            <a:schemeClr val="dk1"/>
+          </a:fillRef>
+          <a:effectRef idx="2">
+            <a:schemeClr val="dk1"/>
+          </a:effectRef>
+          <a:fontRef idx="minor">
+            <a:schemeClr val="tx1"/>
+          </a:fontRef>
+        </dgm:style>
+      </dgm:prSet>
       <dgm:spPr/>
       <dgm:t>
         <a:bodyPr/>
@@ -1413,7 +1490,7 @@
       </dgm:t>
     </dgm:pt>
     <dgm:pt modelId="{1E2E3932-484B-4D4E-B189-A5E9A6B9B96E}" type="pres">
-      <dgm:prSet presAssocID="{A91865F9-C54C-4CC5-B71A-7E9DF270B440}" presName="node" presStyleLbl="node1" presStyleIdx="2" presStyleCnt="10" custRadScaleRad="84366" custRadScaleInc="-33772">
+      <dgm:prSet presAssocID="{A91865F9-C54C-4CC5-B71A-7E9DF270B440}" presName="node" presStyleLbl="node1" presStyleIdx="2" presStyleCnt="10" custScaleX="96529" custScaleY="96055" custRadScaleRad="94253" custRadScaleInc="-23833">
         <dgm:presLayoutVars>
           <dgm:bulletEnabled val="1"/>
         </dgm:presLayoutVars>
@@ -1487,7 +1564,7 @@
       </dgm:t>
     </dgm:pt>
     <dgm:pt modelId="{E9003DBF-681F-46D8-AC9A-B2AD218C89BD}" type="pres">
-      <dgm:prSet presAssocID="{C7EFF620-3989-402C-BF0C-C72EBCCAC402}" presName="node" presStyleLbl="node1" presStyleIdx="4" presStyleCnt="10" custRadScaleRad="87021" custRadScaleInc="-29771">
+      <dgm:prSet presAssocID="{C7EFF620-3989-402C-BF0C-C72EBCCAC402}" presName="node" presStyleLbl="node1" presStyleIdx="4" presStyleCnt="10" custRadScaleRad="81103" custRadScaleInc="-30400">
         <dgm:presLayoutVars>
           <dgm:bulletEnabled val="1"/>
         </dgm:presLayoutVars>
@@ -1598,7 +1675,7 @@
       </dgm:t>
     </dgm:pt>
     <dgm:pt modelId="{36731F56-C670-4217-8319-F8EDAC9AED3D}" type="pres">
-      <dgm:prSet presAssocID="{D229CB6F-46C1-4CC5-82DE-DF9A645642DF}" presName="node" presStyleLbl="node1" presStyleIdx="7" presStyleCnt="10" custRadScaleRad="78863" custRadScaleInc="26602">
+      <dgm:prSet presAssocID="{D229CB6F-46C1-4CC5-82DE-DF9A645642DF}" presName="node" presStyleLbl="node1" presStyleIdx="7" presStyleCnt="10" custRadScaleRad="77388" custRadScaleInc="25177">
         <dgm:presLayoutVars>
           <dgm:bulletEnabled val="1"/>
         </dgm:presLayoutVars>
@@ -1876,10 +1953,10 @@
             </a:spcAft>
           </a:pPr>
           <a:r>
-            <a:rPr lang="de-CH" sz="1300" kern="1200" dirty="0" smtClean="0"/>
+            <a:rPr lang="de-CH" sz="1300" b="1" kern="1200" dirty="0" smtClean="0"/>
             <a:t>Tankstelle</a:t>
           </a:r>
-          <a:endParaRPr lang="de-CH" sz="1300" kern="1200" dirty="0"/>
+          <a:endParaRPr lang="de-CH" sz="1300" b="1" kern="1200" dirty="0"/>
         </a:p>
       </dsp:txBody>
       <dsp:txXfrm>
@@ -2045,12 +2122,12 @@
         </a:fontRef>
       </dsp:style>
       <dsp:txBody>
-        <a:bodyPr spcFirstLastPara="0" vert="horz" wrap="square" lIns="4445" tIns="4445" rIns="4445" bIns="4445" numCol="1" spcCol="1270" anchor="ctr" anchorCtr="0">
+        <a:bodyPr spcFirstLastPara="0" vert="horz" wrap="square" lIns="6350" tIns="6350" rIns="6350" bIns="6350" numCol="1" spcCol="1270" anchor="ctr" anchorCtr="0">
           <a:noAutofit/>
         </a:bodyPr>
         <a:lstStyle/>
         <a:p>
-          <a:pPr lvl="0" algn="ctr" defTabSz="311150">
+          <a:pPr lvl="0" algn="ctr" defTabSz="444500">
             <a:lnSpc>
               <a:spcPct val="90000"/>
             </a:lnSpc>
@@ -2062,7 +2139,7 @@
             </a:spcAft>
           </a:pPr>
           <a:r>
-            <a:rPr lang="de-CH" sz="700" kern="1200" dirty="0" smtClean="0"/>
+            <a:rPr lang="de-CH" sz="1000" kern="1200" baseline="0" dirty="0" smtClean="0"/>
             <a:t>Management</a:t>
           </a:r>
         </a:p>
@@ -2230,12 +2307,12 @@
         </a:fontRef>
       </dsp:style>
       <dsp:txBody>
-        <a:bodyPr spcFirstLastPara="0" vert="horz" wrap="square" lIns="4445" tIns="4445" rIns="4445" bIns="4445" numCol="1" spcCol="1270" anchor="ctr" anchorCtr="0">
+        <a:bodyPr spcFirstLastPara="0" vert="horz" wrap="square" lIns="6350" tIns="6350" rIns="6350" bIns="6350" numCol="1" spcCol="1270" anchor="ctr" anchorCtr="0">
           <a:noAutofit/>
         </a:bodyPr>
         <a:lstStyle/>
         <a:p>
-          <a:pPr lvl="0" algn="ctr" defTabSz="311150">
+          <a:pPr lvl="0" algn="ctr" defTabSz="444500">
             <a:lnSpc>
               <a:spcPct val="90000"/>
             </a:lnSpc>
@@ -2247,7 +2324,7 @@
             </a:spcAft>
           </a:pPr>
           <a:r>
-            <a:rPr lang="de-CH" sz="700" kern="1200" dirty="0" smtClean="0"/>
+            <a:rPr lang="de-CH" sz="1000" kern="1200" baseline="0" dirty="0" smtClean="0"/>
             <a:t>Inhaber</a:t>
           </a:r>
         </a:p>
@@ -2263,9 +2340,9 @@
         <dsp:cNvSpPr/>
       </dsp:nvSpPr>
       <dsp:spPr>
-        <a:xfrm rot="20155262">
-          <a:off x="4500062" y="2323834"/>
-          <a:ext cx="802035" cy="22847"/>
+        <a:xfrm rot="20262604">
+          <a:off x="4502622" y="2305932"/>
+          <a:ext cx="1035192" cy="22847"/>
         </a:xfrm>
         <a:custGeom>
           <a:avLst/>
@@ -2279,21 +2356,15 @@
                 <a:pt x="0" y="11423"/>
               </a:moveTo>
               <a:lnTo>
-                <a:pt x="802035" y="11423"/>
+                <a:pt x="1035192" y="11423"/>
               </a:lnTo>
             </a:path>
           </a:pathLst>
         </a:custGeom>
         <a:noFill/>
-        <a:ln w="12700" cap="flat" cmpd="sng" algn="ctr">
+        <a:ln w="19050" cap="flat" cmpd="sng" algn="ctr">
           <a:solidFill>
-            <a:schemeClr val="accent3">
-              <a:shade val="60000"/>
-              <a:hueOff val="0"/>
-              <a:satOff val="0"/>
-              <a:lumOff val="0"/>
-              <a:alphaOff val="0"/>
-            </a:schemeClr>
+            <a:schemeClr val="dk1"/>
           </a:solidFill>
           <a:prstDash val="solid"/>
           <a:miter lim="800000"/>
@@ -2301,16 +2372,18 @@
         <a:effectLst/>
       </dsp:spPr>
       <dsp:style>
-        <a:lnRef idx="2">
-          <a:scrgbClr r="0" g="0" b="0"/>
+        <a:lnRef idx="3">
+          <a:schemeClr val="dk1"/>
         </a:lnRef>
         <a:fillRef idx="0">
-          <a:scrgbClr r="0" g="0" b="0"/>
+          <a:schemeClr val="dk1"/>
         </a:fillRef>
-        <a:effectRef idx="0">
-          <a:scrgbClr r="0" g="0" b="0"/>
+        <a:effectRef idx="2">
+          <a:schemeClr val="dk1"/>
         </a:effectRef>
-        <a:fontRef idx="minor"/>
+        <a:fontRef idx="minor">
+          <a:schemeClr val="tx1"/>
+        </a:fontRef>
       </dsp:style>
       <dsp:txBody>
         <a:bodyPr spcFirstLastPara="0" vert="horz" wrap="square" lIns="12700" tIns="0" rIns="12700" bIns="0" numCol="1" spcCol="1270" anchor="ctr" anchorCtr="0">
@@ -2333,8 +2406,8 @@
         </a:p>
       </dsp:txBody>
       <dsp:txXfrm>
-        <a:off x="4881029" y="2315207"/>
-        <a:ext cx="40101" cy="40101"/>
+        <a:off x="4994338" y="2291476"/>
+        <a:ext cx="51759" cy="51759"/>
       </dsp:txXfrm>
     </dsp:sp>
     <dsp:sp modelId="{1E2E3932-484B-4D4E-B189-A5E9A6B9B96E}">
@@ -2344,8 +2417,8 @@
       </dsp:nvSpPr>
       <dsp:spPr>
         <a:xfrm>
-          <a:off x="5222317" y="1445338"/>
-          <a:ext cx="1031688" cy="1031688"/>
+          <a:off x="5461602" y="1436809"/>
+          <a:ext cx="995879" cy="990988"/>
         </a:xfrm>
         <a:prstGeom prst="ellipse">
           <a:avLst/>
@@ -2432,14 +2505,15 @@
             </a:spcAft>
           </a:pPr>
           <a:r>
-            <a:rPr lang="de-CH" sz="700" kern="1200" dirty="0" smtClean="0"/>
-            <a:t>Buchhaltung</a:t>
+            <a:rPr lang="de-CH" sz="700" b="1" kern="1200" baseline="0" dirty="0" smtClean="0"/>
+            <a:t>Rechnungswesen</a:t>
           </a:r>
+          <a:endParaRPr lang="de-CH" sz="700" b="1" kern="1200" baseline="0" dirty="0" smtClean="0"/>
         </a:p>
       </dsp:txBody>
       <dsp:txXfrm>
-        <a:off x="5373404" y="1596425"/>
-        <a:ext cx="729514" cy="729514"/>
+        <a:off x="5607445" y="1581936"/>
+        <a:ext cx="704193" cy="700734"/>
       </dsp:txXfrm>
     </dsp:sp>
     <dsp:sp modelId="{04003D1F-A720-4ED6-BF63-F06E487ED93B}">
@@ -2470,15 +2544,9 @@
           </a:pathLst>
         </a:custGeom>
         <a:noFill/>
-        <a:ln w="12700" cap="flat" cmpd="sng" algn="ctr">
+        <a:ln w="19050" cap="flat" cmpd="sng" algn="ctr">
           <a:solidFill>
-            <a:schemeClr val="accent3">
-              <a:shade val="60000"/>
-              <a:hueOff val="0"/>
-              <a:satOff val="0"/>
-              <a:lumOff val="0"/>
-              <a:alphaOff val="0"/>
-            </a:schemeClr>
+            <a:schemeClr val="dk1"/>
           </a:solidFill>
           <a:prstDash val="solid"/>
           <a:miter lim="800000"/>
@@ -2486,16 +2554,18 @@
         <a:effectLst/>
       </dsp:spPr>
       <dsp:style>
-        <a:lnRef idx="2">
-          <a:scrgbClr r="0" g="0" b="0"/>
+        <a:lnRef idx="3">
+          <a:schemeClr val="dk1"/>
         </a:lnRef>
         <a:fillRef idx="0">
-          <a:scrgbClr r="0" g="0" b="0"/>
+          <a:schemeClr val="dk1"/>
         </a:fillRef>
-        <a:effectRef idx="0">
-          <a:scrgbClr r="0" g="0" b="0"/>
+        <a:effectRef idx="2">
+          <a:schemeClr val="dk1"/>
         </a:effectRef>
-        <a:fontRef idx="minor"/>
+        <a:fontRef idx="minor">
+          <a:schemeClr val="tx1"/>
+        </a:fontRef>
       </dsp:style>
       <dsp:txBody>
         <a:bodyPr spcFirstLastPara="0" vert="horz" wrap="square" lIns="12700" tIns="0" rIns="12700" bIns="0" numCol="1" spcCol="1270" anchor="ctr" anchorCtr="0">
@@ -2617,7 +2687,7 @@
             </a:spcAft>
           </a:pPr>
           <a:r>
-            <a:rPr lang="de-CH" sz="700" kern="1200" dirty="0" smtClean="0"/>
+            <a:rPr lang="de-CH" sz="700" b="1" kern="1200" baseline="0" dirty="0" smtClean="0"/>
             <a:t>Personalabteilung</a:t>
           </a:r>
         </a:p>
@@ -2633,9 +2703,9 @@
         <dsp:cNvSpPr/>
       </dsp:nvSpPr>
       <dsp:spPr>
-        <a:xfrm rot="2918473">
-          <a:off x="4259031" y="3407751"/>
-          <a:ext cx="859743" cy="22847"/>
+        <a:xfrm rot="2911680">
+          <a:off x="4282154" y="3358325"/>
+          <a:ext cx="731113" cy="22847"/>
         </a:xfrm>
         <a:custGeom>
           <a:avLst/>
@@ -2649,21 +2719,15 @@
                 <a:pt x="0" y="11423"/>
               </a:moveTo>
               <a:lnTo>
-                <a:pt x="859743" y="11423"/>
+                <a:pt x="731113" y="11423"/>
               </a:lnTo>
             </a:path>
           </a:pathLst>
         </a:custGeom>
         <a:noFill/>
-        <a:ln w="12700" cap="flat" cmpd="sng" algn="ctr">
+        <a:ln w="19050" cap="flat" cmpd="sng" algn="ctr">
           <a:solidFill>
-            <a:schemeClr val="accent3">
-              <a:shade val="60000"/>
-              <a:hueOff val="0"/>
-              <a:satOff val="0"/>
-              <a:lumOff val="0"/>
-              <a:alphaOff val="0"/>
-            </a:schemeClr>
+            <a:schemeClr val="dk1"/>
           </a:solidFill>
           <a:prstDash val="solid"/>
           <a:miter lim="800000"/>
@@ -2671,16 +2735,18 @@
         <a:effectLst/>
       </dsp:spPr>
       <dsp:style>
-        <a:lnRef idx="2">
-          <a:scrgbClr r="0" g="0" b="0"/>
+        <a:lnRef idx="3">
+          <a:schemeClr val="dk1"/>
         </a:lnRef>
         <a:fillRef idx="0">
-          <a:scrgbClr r="0" g="0" b="0"/>
+          <a:schemeClr val="dk1"/>
         </a:fillRef>
-        <a:effectRef idx="0">
-          <a:scrgbClr r="0" g="0" b="0"/>
+        <a:effectRef idx="2">
+          <a:schemeClr val="dk1"/>
         </a:effectRef>
-        <a:fontRef idx="minor"/>
+        <a:fontRef idx="minor">
+          <a:schemeClr val="tx1"/>
+        </a:fontRef>
       </dsp:style>
       <dsp:txBody>
         <a:bodyPr spcFirstLastPara="0" vert="horz" wrap="square" lIns="12700" tIns="0" rIns="12700" bIns="0" numCol="1" spcCol="1270" anchor="ctr" anchorCtr="0">
@@ -2703,8 +2769,8 @@
         </a:p>
       </dsp:txBody>
       <dsp:txXfrm>
-        <a:off x="4667409" y="3397681"/>
-        <a:ext cx="42987" cy="42987"/>
+        <a:off x="4629433" y="3351471"/>
+        <a:ext cx="36555" cy="36555"/>
       </dsp:txXfrm>
     </dsp:sp>
     <dsp:sp modelId="{E9003DBF-681F-46D8-AC9A-B2AD218C89BD}">
@@ -2714,7 +2780,7 @@
       </dsp:nvSpPr>
       <dsp:spPr>
         <a:xfrm>
-          <a:off x="4797961" y="3613172"/>
+          <a:off x="4715578" y="3514320"/>
           <a:ext cx="1031688" cy="1031688"/>
         </a:xfrm>
         <a:prstGeom prst="ellipse">
@@ -2802,13 +2868,13 @@
             </a:spcAft>
           </a:pPr>
           <a:r>
-            <a:rPr lang="de-CH" sz="700" kern="1200" dirty="0" smtClean="0"/>
+            <a:rPr lang="de-CH" sz="700" b="1" kern="1200" baseline="0" dirty="0" smtClean="0"/>
             <a:t>Fahrzeugabteilung</a:t>
           </a:r>
         </a:p>
       </dsp:txBody>
       <dsp:txXfrm>
-        <a:off x="4949048" y="3764259"/>
+        <a:off x="4866665" y="3665407"/>
         <a:ext cx="729514" cy="729514"/>
       </dsp:txXfrm>
     </dsp:sp>
@@ -2983,7 +3049,7 @@
             </a:spcAft>
           </a:pPr>
           <a:r>
-            <a:rPr lang="de-CH" sz="1200" kern="1200" dirty="0" smtClean="0"/>
+            <a:rPr lang="de-CH" sz="1200" b="1" kern="1200" dirty="0" smtClean="0"/>
             <a:t>Tankwart</a:t>
           </a:r>
         </a:p>
@@ -3021,15 +3087,9 @@
           </a:pathLst>
         </a:custGeom>
         <a:noFill/>
-        <a:ln w="12700" cap="flat" cmpd="sng" algn="ctr">
+        <a:ln w="6350" cap="flat" cmpd="sng" algn="ctr">
           <a:solidFill>
-            <a:schemeClr val="accent3">
-              <a:shade val="60000"/>
-              <a:hueOff val="0"/>
-              <a:satOff val="0"/>
-              <a:lumOff val="0"/>
-              <a:alphaOff val="0"/>
-            </a:schemeClr>
+            <a:schemeClr val="dk1"/>
           </a:solidFill>
           <a:prstDash val="solid"/>
           <a:miter lim="800000"/>
@@ -3037,16 +3097,18 @@
         <a:effectLst/>
       </dsp:spPr>
       <dsp:style>
-        <a:lnRef idx="2">
-          <a:scrgbClr r="0" g="0" b="0"/>
+        <a:lnRef idx="1">
+          <a:schemeClr val="dk1"/>
         </a:lnRef>
         <a:fillRef idx="0">
-          <a:scrgbClr r="0" g="0" b="0"/>
+          <a:schemeClr val="dk1"/>
         </a:fillRef>
         <a:effectRef idx="0">
-          <a:scrgbClr r="0" g="0" b="0"/>
+          <a:schemeClr val="dk1"/>
         </a:effectRef>
-        <a:fontRef idx="minor"/>
+        <a:fontRef idx="minor">
+          <a:schemeClr val="tx1"/>
+        </a:fontRef>
       </dsp:style>
       <dsp:txBody>
         <a:bodyPr spcFirstLastPara="0" vert="horz" wrap="square" lIns="12700" tIns="0" rIns="12700" bIns="0" numCol="1" spcCol="1270" anchor="ctr" anchorCtr="0">
@@ -3151,12 +3213,12 @@
         </a:fontRef>
       </dsp:style>
       <dsp:txBody>
-        <a:bodyPr spcFirstLastPara="0" vert="horz" wrap="square" lIns="4445" tIns="4445" rIns="4445" bIns="4445" numCol="1" spcCol="1270" anchor="ctr" anchorCtr="0">
+        <a:bodyPr spcFirstLastPara="0" vert="horz" wrap="square" lIns="6350" tIns="6350" rIns="6350" bIns="6350" numCol="1" spcCol="1270" anchor="ctr" anchorCtr="0">
           <a:noAutofit/>
         </a:bodyPr>
         <a:lstStyle/>
         <a:p>
-          <a:pPr lvl="0" algn="ctr" defTabSz="311150">
+          <a:pPr lvl="0" algn="ctr" defTabSz="444500">
             <a:lnSpc>
               <a:spcPct val="90000"/>
             </a:lnSpc>
@@ -3168,7 +3230,7 @@
             </a:spcAft>
           </a:pPr>
           <a:r>
-            <a:rPr lang="de-CH" sz="700" kern="1200" dirty="0" smtClean="0"/>
+            <a:rPr lang="de-CH" sz="1000" b="0" kern="1200" dirty="0" smtClean="0"/>
             <a:t>Lieferant</a:t>
           </a:r>
         </a:p>
@@ -3184,9 +3246,9 @@
         <dsp:cNvSpPr/>
       </dsp:nvSpPr>
       <dsp:spPr>
-        <a:xfrm rot="10007302">
-          <a:off x="2888413" y="2893789"/>
-          <a:ext cx="682426" cy="22847"/>
+        <a:xfrm rot="9991912">
+          <a:off x="2920917" y="2893789"/>
+          <a:ext cx="650366" cy="22847"/>
         </a:xfrm>
         <a:custGeom>
           <a:avLst/>
@@ -3200,21 +3262,15 @@
                 <a:pt x="0" y="11423"/>
               </a:moveTo>
               <a:lnTo>
-                <a:pt x="682426" y="11423"/>
+                <a:pt x="650366" y="11423"/>
               </a:lnTo>
             </a:path>
           </a:pathLst>
         </a:custGeom>
         <a:noFill/>
-        <a:ln w="12700" cap="flat" cmpd="sng" algn="ctr">
+        <a:ln w="19050" cap="flat" cmpd="sng" algn="ctr">
           <a:solidFill>
-            <a:schemeClr val="accent3">
-              <a:shade val="60000"/>
-              <a:hueOff val="0"/>
-              <a:satOff val="0"/>
-              <a:lumOff val="0"/>
-              <a:alphaOff val="0"/>
-            </a:schemeClr>
+            <a:schemeClr val="dk1"/>
           </a:solidFill>
           <a:prstDash val="solid"/>
           <a:miter lim="800000"/>
@@ -3222,16 +3278,18 @@
         <a:effectLst/>
       </dsp:spPr>
       <dsp:style>
-        <a:lnRef idx="2">
-          <a:scrgbClr r="0" g="0" b="0"/>
+        <a:lnRef idx="3">
+          <a:schemeClr val="dk1"/>
         </a:lnRef>
         <a:fillRef idx="0">
-          <a:scrgbClr r="0" g="0" b="0"/>
+          <a:schemeClr val="dk1"/>
         </a:fillRef>
-        <a:effectRef idx="0">
-          <a:scrgbClr r="0" g="0" b="0"/>
+        <a:effectRef idx="2">
+          <a:schemeClr val="dk1"/>
         </a:effectRef>
-        <a:fontRef idx="minor"/>
+        <a:fontRef idx="minor">
+          <a:schemeClr val="tx1"/>
+        </a:fontRef>
       </dsp:style>
       <dsp:txBody>
         <a:bodyPr spcFirstLastPara="0" vert="horz" wrap="square" lIns="12700" tIns="0" rIns="12700" bIns="0" numCol="1" spcCol="1270" anchor="ctr" anchorCtr="0">
@@ -3254,8 +3312,8 @@
         </a:p>
       </dsp:txBody>
       <dsp:txXfrm rot="10800000">
-        <a:off x="3212565" y="2888152"/>
-        <a:ext cx="34121" cy="34121"/>
+        <a:off x="3229841" y="2888953"/>
+        <a:ext cx="32518" cy="32518"/>
       </dsp:txXfrm>
     </dsp:sp>
     <dsp:sp modelId="{36731F56-C670-4217-8319-F8EDAC9AED3D}">
@@ -3265,7 +3323,7 @@
       </dsp:nvSpPr>
       <dsp:spPr>
         <a:xfrm>
-          <a:off x="1879408" y="2585247"/>
+          <a:off x="1912357" y="2585247"/>
           <a:ext cx="1031688" cy="1031688"/>
         </a:xfrm>
         <a:prstGeom prst="ellipse">
@@ -3336,12 +3394,12 @@
         </a:fontRef>
       </dsp:style>
       <dsp:txBody>
-        <a:bodyPr spcFirstLastPara="0" vert="horz" wrap="square" lIns="4445" tIns="4445" rIns="4445" bIns="4445" numCol="1" spcCol="1270" anchor="ctr" anchorCtr="0">
+        <a:bodyPr spcFirstLastPara="0" vert="horz" wrap="square" lIns="5080" tIns="5080" rIns="5080" bIns="5080" numCol="1" spcCol="1270" anchor="ctr" anchorCtr="0">
           <a:noAutofit/>
         </a:bodyPr>
         <a:lstStyle/>
         <a:p>
-          <a:pPr lvl="0" algn="ctr" defTabSz="311150">
+          <a:pPr lvl="0" algn="ctr" defTabSz="355600">
             <a:lnSpc>
               <a:spcPct val="90000"/>
             </a:lnSpc>
@@ -3353,13 +3411,14 @@
             </a:spcAft>
           </a:pPr>
           <a:r>
-            <a:rPr lang="de-CH" sz="700" kern="1200" dirty="0" smtClean="0"/>
-            <a:t>Zahlungsstelle</a:t>
+            <a:rPr lang="de-CH" sz="800" b="1" kern="1200" dirty="0" smtClean="0"/>
+            <a:t>Debit-/Kreditkarten System</a:t>
           </a:r>
+          <a:endParaRPr lang="de-CH" sz="800" b="1" kern="1200" dirty="0" smtClean="0"/>
         </a:p>
       </dsp:txBody>
       <dsp:txXfrm>
-        <a:off x="2030495" y="2736334"/>
+        <a:off x="2063444" y="2736334"/>
         <a:ext cx="729514" cy="729514"/>
       </dsp:txXfrm>
     </dsp:sp>
@@ -3521,12 +3580,12 @@
         </a:fontRef>
       </dsp:style>
       <dsp:txBody>
-        <a:bodyPr spcFirstLastPara="0" vert="horz" wrap="square" lIns="4445" tIns="4445" rIns="4445" bIns="4445" numCol="1" spcCol="1270" anchor="ctr" anchorCtr="0">
+        <a:bodyPr spcFirstLastPara="0" vert="horz" wrap="square" lIns="6350" tIns="6350" rIns="6350" bIns="6350" numCol="1" spcCol="1270" anchor="ctr" anchorCtr="0">
           <a:noAutofit/>
         </a:bodyPr>
         <a:lstStyle/>
         <a:p>
-          <a:pPr lvl="0" algn="ctr" defTabSz="311150">
+          <a:pPr lvl="0" algn="ctr" defTabSz="444500">
             <a:lnSpc>
               <a:spcPct val="90000"/>
             </a:lnSpc>
@@ -3538,10 +3597,10 @@
             </a:spcAft>
           </a:pPr>
           <a:r>
-            <a:rPr lang="de-CH" sz="700" kern="1200" dirty="0" smtClean="0"/>
+            <a:rPr lang="de-CH" sz="1000" kern="1200" baseline="0" dirty="0" smtClean="0"/>
             <a:t>Angestellte</a:t>
           </a:r>
-          <a:endParaRPr lang="de-CH" sz="700" kern="1200" dirty="0"/>
+          <a:endParaRPr lang="de-CH" sz="1000" kern="1200" baseline="0" dirty="0"/>
         </a:p>
       </dsp:txBody>
       <dsp:txXfrm>
@@ -3707,12 +3766,12 @@
         </a:fontRef>
       </dsp:style>
       <dsp:txBody>
-        <a:bodyPr spcFirstLastPara="0" vert="horz" wrap="square" lIns="4445" tIns="4445" rIns="4445" bIns="4445" numCol="1" spcCol="1270" anchor="ctr" anchorCtr="0">
+        <a:bodyPr spcFirstLastPara="0" vert="horz" wrap="square" lIns="6350" tIns="6350" rIns="6350" bIns="6350" numCol="1" spcCol="1270" anchor="ctr" anchorCtr="0">
           <a:noAutofit/>
         </a:bodyPr>
         <a:lstStyle/>
         <a:p>
-          <a:pPr lvl="0" algn="ctr" defTabSz="311150">
+          <a:pPr lvl="0" algn="ctr" defTabSz="444500">
             <a:lnSpc>
               <a:spcPct val="90000"/>
             </a:lnSpc>
@@ -3724,10 +3783,10 @@
             </a:spcAft>
           </a:pPr>
           <a:r>
-            <a:rPr lang="de-CH" sz="700" kern="1200" dirty="0" smtClean="0"/>
+            <a:rPr lang="de-CH" sz="1000" kern="1200" baseline="0" dirty="0" smtClean="0"/>
             <a:t>Angehörige der Angestellten</a:t>
           </a:r>
-          <a:endParaRPr lang="de-CH" sz="700" kern="1200" dirty="0"/>
+          <a:endParaRPr lang="de-CH" sz="1000" kern="1200" baseline="0" dirty="0"/>
         </a:p>
       </dsp:txBody>
       <dsp:txXfrm>
@@ -5158,7 +5217,7 @@
           <a:p>
             <a:fld id="{B875FFFB-F070-420D-AD34-B9E345545E7F}" type="datetimeFigureOut">
               <a:rPr lang="de-CH" smtClean="0"/>
-              <a:t>02.12.2013</a:t>
+              <a:t>12.12.2013</a:t>
             </a:fld>
             <a:endParaRPr lang="de-CH"/>
           </a:p>
@@ -5328,7 +5387,7 @@
           <a:p>
             <a:fld id="{B875FFFB-F070-420D-AD34-B9E345545E7F}" type="datetimeFigureOut">
               <a:rPr lang="de-CH" smtClean="0"/>
-              <a:t>02.12.2013</a:t>
+              <a:t>12.12.2013</a:t>
             </a:fld>
             <a:endParaRPr lang="de-CH"/>
           </a:p>
@@ -5508,7 +5567,7 @@
           <a:p>
             <a:fld id="{B875FFFB-F070-420D-AD34-B9E345545E7F}" type="datetimeFigureOut">
               <a:rPr lang="de-CH" smtClean="0"/>
-              <a:t>02.12.2013</a:t>
+              <a:t>12.12.2013</a:t>
             </a:fld>
             <a:endParaRPr lang="de-CH"/>
           </a:p>
@@ -5678,7 +5737,7 @@
           <a:p>
             <a:fld id="{B875FFFB-F070-420D-AD34-B9E345545E7F}" type="datetimeFigureOut">
               <a:rPr lang="de-CH" smtClean="0"/>
-              <a:t>02.12.2013</a:t>
+              <a:t>12.12.2013</a:t>
             </a:fld>
             <a:endParaRPr lang="de-CH"/>
           </a:p>
@@ -5924,7 +5983,7 @@
           <a:p>
             <a:fld id="{B875FFFB-F070-420D-AD34-B9E345545E7F}" type="datetimeFigureOut">
               <a:rPr lang="de-CH" smtClean="0"/>
-              <a:t>02.12.2013</a:t>
+              <a:t>12.12.2013</a:t>
             </a:fld>
             <a:endParaRPr lang="de-CH"/>
           </a:p>
@@ -6156,7 +6215,7 @@
           <a:p>
             <a:fld id="{B875FFFB-F070-420D-AD34-B9E345545E7F}" type="datetimeFigureOut">
               <a:rPr lang="de-CH" smtClean="0"/>
-              <a:t>02.12.2013</a:t>
+              <a:t>12.12.2013</a:t>
             </a:fld>
             <a:endParaRPr lang="de-CH"/>
           </a:p>
@@ -6523,7 +6582,7 @@
           <a:p>
             <a:fld id="{B875FFFB-F070-420D-AD34-B9E345545E7F}" type="datetimeFigureOut">
               <a:rPr lang="de-CH" smtClean="0"/>
-              <a:t>02.12.2013</a:t>
+              <a:t>12.12.2013</a:t>
             </a:fld>
             <a:endParaRPr lang="de-CH"/>
           </a:p>
@@ -6641,7 +6700,7 @@
           <a:p>
             <a:fld id="{B875FFFB-F070-420D-AD34-B9E345545E7F}" type="datetimeFigureOut">
               <a:rPr lang="de-CH" smtClean="0"/>
-              <a:t>02.12.2013</a:t>
+              <a:t>12.12.2013</a:t>
             </a:fld>
             <a:endParaRPr lang="de-CH"/>
           </a:p>
@@ -6736,7 +6795,7 @@
           <a:p>
             <a:fld id="{B875FFFB-F070-420D-AD34-B9E345545E7F}" type="datetimeFigureOut">
               <a:rPr lang="de-CH" smtClean="0"/>
-              <a:t>02.12.2013</a:t>
+              <a:t>12.12.2013</a:t>
             </a:fld>
             <a:endParaRPr lang="de-CH"/>
           </a:p>
@@ -7013,7 +7072,7 @@
           <a:p>
             <a:fld id="{B875FFFB-F070-420D-AD34-B9E345545E7F}" type="datetimeFigureOut">
               <a:rPr lang="de-CH" smtClean="0"/>
-              <a:t>02.12.2013</a:t>
+              <a:t>12.12.2013</a:t>
             </a:fld>
             <a:endParaRPr lang="de-CH"/>
           </a:p>
@@ -7266,7 +7325,7 @@
           <a:p>
             <a:fld id="{B875FFFB-F070-420D-AD34-B9E345545E7F}" type="datetimeFigureOut">
               <a:rPr lang="de-CH" smtClean="0"/>
-              <a:t>02.12.2013</a:t>
+              <a:t>12.12.2013</a:t>
             </a:fld>
             <a:endParaRPr lang="de-CH"/>
           </a:p>
@@ -7479,7 +7538,7 @@
           <a:p>
             <a:fld id="{B875FFFB-F070-420D-AD34-B9E345545E7F}" type="datetimeFigureOut">
               <a:rPr lang="de-CH" smtClean="0"/>
-              <a:t>02.12.2013</a:t>
+              <a:t>12.12.2013</a:t>
             </a:fld>
             <a:endParaRPr lang="de-CH"/>
           </a:p>
@@ -7891,7 +7950,7 @@
           <p:nvPr>
             <p:extLst>
               <p:ext uri="{D42A27DB-BD31-4B8C-83A1-F6EECF244321}">
-                <p14:modId xmlns:p14="http://schemas.microsoft.com/office/powerpoint/2010/main" val="2137920877"/>
+                <p14:modId xmlns:p14="http://schemas.microsoft.com/office/powerpoint/2010/main" val="2190247621"/>
               </p:ext>
             </p:extLst>
           </p:nvPr>

</xml_diff>